<commit_message>
adding updated images of the working app for the ReadMe file
</commit_message>
<xml_diff>
--- a/ProjectTwo_TeamTwo_OpportunityZonesInvestmentTool.pptx
+++ b/ProjectTwo_TeamTwo_OpportunityZonesInvestmentTool.pptx
@@ -1,44 +1,45 @@
 
 <file path=ppt/presentation.xml><?xml version="1.0" encoding="utf-8"?>
-<p:presentation xmlns:a="http://schemas.openxmlformats.org/drawingml/2006/main" xmlns:r="http://schemas.openxmlformats.org/officeDocument/2006/relationships" xmlns:mc="http://schemas.openxmlformats.org/markup-compatibility/2006" xmlns:mv="urn:schemas-microsoft-com:mac:vml" xmlns:p="http://schemas.openxmlformats.org/presentationml/2006/main" xmlns:c="http://schemas.openxmlformats.org/drawingml/2006/chart" xmlns:dgm="http://schemas.openxmlformats.org/drawingml/2006/diagram" xmlns:o="urn:schemas-microsoft-com:office:office" xmlns:v="urn:schemas-microsoft-com:vml" xmlns:pvml="urn:schemas-microsoft-com:office:powerpoint" xmlns:com="http://schemas.openxmlformats.org/drawingml/2006/compatibility" xmlns:p14="http://schemas.microsoft.com/office/powerpoint/2010/main" xmlns:p15="http://schemas.microsoft.com/office/powerpoint/2012/main" autoCompressPictures="0" embedTrueTypeFonts="1" strictFirstAndLastChars="0" saveSubsetFonts="1">
+<p:presentation xmlns:a="http://schemas.openxmlformats.org/drawingml/2006/main" xmlns:r="http://schemas.openxmlformats.org/officeDocument/2006/relationships" xmlns:p="http://schemas.openxmlformats.org/presentationml/2006/main" strictFirstAndLastChars="0" embedTrueTypeFonts="1" saveSubsetFonts="1" autoCompressPictures="0">
   <p:sldMasterIdLst>
-    <p:sldMasterId id="2147483659" r:id="rId4"/>
+    <p:sldMasterId id="2147483659" r:id="rId1"/>
   </p:sldMasterIdLst>
   <p:notesMasterIdLst>
-    <p:notesMasterId r:id="rId5"/>
+    <p:notesMasterId r:id="rId8"/>
   </p:notesMasterIdLst>
   <p:sldIdLst>
-    <p:sldId id="256" r:id="rId6"/>
-    <p:sldId id="257" r:id="rId7"/>
-    <p:sldId id="258" r:id="rId8"/>
-    <p:sldId id="259" r:id="rId9"/>
-    <p:sldId id="260" r:id="rId10"/>
+    <p:sldId id="256" r:id="rId2"/>
+    <p:sldId id="257" r:id="rId3"/>
+    <p:sldId id="258" r:id="rId4"/>
+    <p:sldId id="259" r:id="rId5"/>
+    <p:sldId id="260" r:id="rId6"/>
+    <p:sldId id="261" r:id="rId7"/>
   </p:sldIdLst>
-  <p:sldSz cy="5143500" cx="9144000"/>
+  <p:sldSz cx="9144000" cy="5143500" type="screen16x9"/>
   <p:notesSz cx="6858000" cy="9144000"/>
   <p:embeddedFontLst>
     <p:embeddedFont>
-      <p:font typeface="Roboto"/>
-      <p:regular r:id="rId11"/>
-      <p:bold r:id="rId12"/>
-      <p:italic r:id="rId13"/>
-      <p:boldItalic r:id="rId14"/>
+      <p:font typeface="Open Sans" panose="020B0604020202020204" charset="0"/>
+      <p:regular r:id="rId9"/>
+      <p:bold r:id="rId10"/>
+      <p:italic r:id="rId11"/>
+      <p:boldItalic r:id="rId12"/>
     </p:embeddedFont>
     <p:embeddedFont>
-      <p:font typeface="PT Sans Narrow"/>
+      <p:font typeface="PT Sans Narrow" panose="020B0604020202020204" charset="0"/>
+      <p:regular r:id="rId13"/>
+      <p:bold r:id="rId14"/>
+    </p:embeddedFont>
+    <p:embeddedFont>
+      <p:font typeface="Roboto" pitchFamily="2" charset="0"/>
       <p:regular r:id="rId15"/>
       <p:bold r:id="rId16"/>
-    </p:embeddedFont>
-    <p:embeddedFont>
-      <p:font typeface="Open Sans"/>
-      <p:regular r:id="rId17"/>
-      <p:bold r:id="rId18"/>
-      <p:italic r:id="rId19"/>
-      <p:boldItalic r:id="rId20"/>
+      <p:italic r:id="rId17"/>
+      <p:boldItalic r:id="rId18"/>
     </p:embeddedFont>
   </p:embeddedFontLst>
   <p:defaultTextStyle>
-    <a:defPPr lvl="0" marR="0" rtl="0" algn="l">
+    <a:defPPr marR="0" lvl="0" algn="l" rtl="0">
       <a:lnSpc>
         <a:spcPct val="100000"/>
       </a:lnSpc>
@@ -49,7 +50,7 @@
         <a:spcPts val="0"/>
       </a:spcAft>
     </a:defPPr>
-    <a:lvl1pPr lvl="0" marR="0" rtl="0" algn="l">
+    <a:lvl1pPr marR="0" lvl="0" algn="l" rtl="0">
       <a:lnSpc>
         <a:spcPct val="100000"/>
       </a:lnSpc>
@@ -63,7 +64,7 @@
         <a:srgbClr val="000000"/>
       </a:buClr>
       <a:buFont typeface="Arial"/>
-      <a:defRPr b="0" i="0" sz="1400" u="none" cap="none" strike="noStrike">
+      <a:defRPr sz="1400" b="0" i="0" u="none" strike="noStrike" cap="none">
         <a:solidFill>
           <a:srgbClr val="000000"/>
         </a:solidFill>
@@ -73,7 +74,7 @@
         <a:sym typeface="Arial"/>
       </a:defRPr>
     </a:lvl1pPr>
-    <a:lvl2pPr lvl="1" marR="0" rtl="0" algn="l">
+    <a:lvl2pPr marR="0" lvl="1" algn="l" rtl="0">
       <a:lnSpc>
         <a:spcPct val="100000"/>
       </a:lnSpc>
@@ -87,7 +88,7 @@
         <a:srgbClr val="000000"/>
       </a:buClr>
       <a:buFont typeface="Arial"/>
-      <a:defRPr b="0" i="0" sz="1400" u="none" cap="none" strike="noStrike">
+      <a:defRPr sz="1400" b="0" i="0" u="none" strike="noStrike" cap="none">
         <a:solidFill>
           <a:srgbClr val="000000"/>
         </a:solidFill>
@@ -97,7 +98,7 @@
         <a:sym typeface="Arial"/>
       </a:defRPr>
     </a:lvl2pPr>
-    <a:lvl3pPr lvl="2" marR="0" rtl="0" algn="l">
+    <a:lvl3pPr marR="0" lvl="2" algn="l" rtl="0">
       <a:lnSpc>
         <a:spcPct val="100000"/>
       </a:lnSpc>
@@ -111,7 +112,7 @@
         <a:srgbClr val="000000"/>
       </a:buClr>
       <a:buFont typeface="Arial"/>
-      <a:defRPr b="0" i="0" sz="1400" u="none" cap="none" strike="noStrike">
+      <a:defRPr sz="1400" b="0" i="0" u="none" strike="noStrike" cap="none">
         <a:solidFill>
           <a:srgbClr val="000000"/>
         </a:solidFill>
@@ -121,7 +122,7 @@
         <a:sym typeface="Arial"/>
       </a:defRPr>
     </a:lvl3pPr>
-    <a:lvl4pPr lvl="3" marR="0" rtl="0" algn="l">
+    <a:lvl4pPr marR="0" lvl="3" algn="l" rtl="0">
       <a:lnSpc>
         <a:spcPct val="100000"/>
       </a:lnSpc>
@@ -135,7 +136,7 @@
         <a:srgbClr val="000000"/>
       </a:buClr>
       <a:buFont typeface="Arial"/>
-      <a:defRPr b="0" i="0" sz="1400" u="none" cap="none" strike="noStrike">
+      <a:defRPr sz="1400" b="0" i="0" u="none" strike="noStrike" cap="none">
         <a:solidFill>
           <a:srgbClr val="000000"/>
         </a:solidFill>
@@ -145,7 +146,7 @@
         <a:sym typeface="Arial"/>
       </a:defRPr>
     </a:lvl4pPr>
-    <a:lvl5pPr lvl="4" marR="0" rtl="0" algn="l">
+    <a:lvl5pPr marR="0" lvl="4" algn="l" rtl="0">
       <a:lnSpc>
         <a:spcPct val="100000"/>
       </a:lnSpc>
@@ -159,7 +160,7 @@
         <a:srgbClr val="000000"/>
       </a:buClr>
       <a:buFont typeface="Arial"/>
-      <a:defRPr b="0" i="0" sz="1400" u="none" cap="none" strike="noStrike">
+      <a:defRPr sz="1400" b="0" i="0" u="none" strike="noStrike" cap="none">
         <a:solidFill>
           <a:srgbClr val="000000"/>
         </a:solidFill>
@@ -169,7 +170,7 @@
         <a:sym typeface="Arial"/>
       </a:defRPr>
     </a:lvl5pPr>
-    <a:lvl6pPr lvl="5" marR="0" rtl="0" algn="l">
+    <a:lvl6pPr marR="0" lvl="5" algn="l" rtl="0">
       <a:lnSpc>
         <a:spcPct val="100000"/>
       </a:lnSpc>
@@ -183,7 +184,7 @@
         <a:srgbClr val="000000"/>
       </a:buClr>
       <a:buFont typeface="Arial"/>
-      <a:defRPr b="0" i="0" sz="1400" u="none" cap="none" strike="noStrike">
+      <a:defRPr sz="1400" b="0" i="0" u="none" strike="noStrike" cap="none">
         <a:solidFill>
           <a:srgbClr val="000000"/>
         </a:solidFill>
@@ -193,7 +194,7 @@
         <a:sym typeface="Arial"/>
       </a:defRPr>
     </a:lvl6pPr>
-    <a:lvl7pPr lvl="6" marR="0" rtl="0" algn="l">
+    <a:lvl7pPr marR="0" lvl="6" algn="l" rtl="0">
       <a:lnSpc>
         <a:spcPct val="100000"/>
       </a:lnSpc>
@@ -207,7 +208,7 @@
         <a:srgbClr val="000000"/>
       </a:buClr>
       <a:buFont typeface="Arial"/>
-      <a:defRPr b="0" i="0" sz="1400" u="none" cap="none" strike="noStrike">
+      <a:defRPr sz="1400" b="0" i="0" u="none" strike="noStrike" cap="none">
         <a:solidFill>
           <a:srgbClr val="000000"/>
         </a:solidFill>
@@ -217,7 +218,7 @@
         <a:sym typeface="Arial"/>
       </a:defRPr>
     </a:lvl7pPr>
-    <a:lvl8pPr lvl="7" marR="0" rtl="0" algn="l">
+    <a:lvl8pPr marR="0" lvl="7" algn="l" rtl="0">
       <a:lnSpc>
         <a:spcPct val="100000"/>
       </a:lnSpc>
@@ -231,7 +232,7 @@
         <a:srgbClr val="000000"/>
       </a:buClr>
       <a:buFont typeface="Arial"/>
-      <a:defRPr b="0" i="0" sz="1400" u="none" cap="none" strike="noStrike">
+      <a:defRPr sz="1400" b="0" i="0" u="none" strike="noStrike" cap="none">
         <a:solidFill>
           <a:srgbClr val="000000"/>
         </a:solidFill>
@@ -241,7 +242,7 @@
         <a:sym typeface="Arial"/>
       </a:defRPr>
     </a:lvl8pPr>
-    <a:lvl9pPr lvl="8" marR="0" rtl="0" algn="l">
+    <a:lvl9pPr marR="0" lvl="8" algn="l" rtl="0">
       <a:lnSpc>
         <a:spcPct val="100000"/>
       </a:lnSpc>
@@ -255,7 +256,7 @@
         <a:srgbClr val="000000"/>
       </a:buClr>
       <a:buFont typeface="Arial"/>
-      <a:defRPr b="0" i="0" sz="1400" u="none" cap="none" strike="noStrike">
+      <a:defRPr sz="1400" b="0" i="0" u="none" strike="noStrike" cap="none">
         <a:solidFill>
           <a:srgbClr val="000000"/>
         </a:solidFill>
@@ -268,7 +269,7 @@
   </p:defaultTextStyle>
   <p:extLst>
     <p:ext uri="{EFAFB233-063F-42B5-8137-9DF3F51BA10A}">
-      <p15:sldGuideLst>
+      <p15:sldGuideLst xmlns:p15="http://schemas.microsoft.com/office/powerpoint/2012/main">
         <p15:guide id="1" orient="horz" pos="1620">
           <p15:clr>
             <a:srgbClr val="A4A3A4"/>
@@ -286,11 +287,16 @@
 </file>
 
 <file path=ppt/notesMasters/notesMaster1.xml><?xml version="1.0" encoding="utf-8"?>
-<p:notesMaster xmlns:a="http://schemas.openxmlformats.org/drawingml/2006/main" xmlns:r="http://schemas.openxmlformats.org/officeDocument/2006/relationships" xmlns:mc="http://schemas.openxmlformats.org/markup-compatibility/2006" xmlns:mv="urn:schemas-microsoft-com:mac:vml" xmlns:p="http://schemas.openxmlformats.org/presentationml/2006/main" xmlns:c="http://schemas.openxmlformats.org/drawingml/2006/chart" xmlns:dgm="http://schemas.openxmlformats.org/drawingml/2006/diagram" xmlns:o="urn:schemas-microsoft-com:office:office" xmlns:v="urn:schemas-microsoft-com:vml" xmlns:pvml="urn:schemas-microsoft-com:office:powerpoint" xmlns:com="http://schemas.openxmlformats.org/drawingml/2006/compatibility" xmlns:p14="http://schemas.microsoft.com/office/powerpoint/2010/main" xmlns:p15="http://schemas.microsoft.com/office/powerpoint/2012/main">
+<p:notesMaster xmlns:a="http://schemas.openxmlformats.org/drawingml/2006/main" xmlns:r="http://schemas.openxmlformats.org/officeDocument/2006/relationships" xmlns:p="http://schemas.openxmlformats.org/presentationml/2006/main">
   <p:cSld>
+    <p:bg>
+      <p:bgRef idx="1001">
+        <a:schemeClr val="bg1"/>
+      </p:bgRef>
+    </p:bg>
     <p:spTree>
       <p:nvGrpSpPr>
-        <p:cNvPr id="2" name="Shape 2"/>
+        <p:cNvPr id="1" name="Shape 2"/>
         <p:cNvGrpSpPr/>
         <p:nvPr/>
       </p:nvGrpSpPr>
@@ -305,9 +311,11 @@
       <p:sp>
         <p:nvSpPr>
           <p:cNvPr id="3" name="Google Shape;3;n"/>
-          <p:cNvSpPr/>
+          <p:cNvSpPr>
+            <a:spLocks noGrp="1" noRot="1" noChangeAspect="1"/>
+          </p:cNvSpPr>
           <p:nvPr>
-            <p:ph idx="2" type="sldImg"/>
+            <p:ph type="sldImg" idx="2"/>
           </p:nvPr>
         </p:nvSpPr>
         <p:spPr>
@@ -316,9 +324,13 @@
             <a:ext cx="6096075" cy="3429000"/>
           </a:xfrm>
           <a:custGeom>
-            <a:rect b="b" l="l" r="r" t="t"/>
+            <a:avLst/>
+            <a:gdLst/>
+            <a:ahLst/>
+            <a:cxnLst/>
+            <a:rect l="l" t="t" r="r" b="b"/>
             <a:pathLst>
-              <a:path extrusionOk="0" h="120000" w="120000">
+              <a:path w="120000" h="120000" extrusionOk="0">
                 <a:moveTo>
                   <a:pt x="0" y="0"/>
                 </a:moveTo>
@@ -336,23 +348,25 @@
             </a:pathLst>
           </a:custGeom>
           <a:noFill/>
-          <a:ln cap="flat" cmpd="sng" w="9525">
+          <a:ln w="9525" cap="flat" cmpd="sng">
             <a:solidFill>
               <a:srgbClr val="000000"/>
             </a:solidFill>
             <a:prstDash val="solid"/>
             <a:round/>
-            <a:headEnd len="sm" w="sm" type="none"/>
-            <a:tailEnd len="sm" w="sm" type="none"/>
+            <a:headEnd type="none" w="sm" len="sm"/>
+            <a:tailEnd type="none" w="sm" len="sm"/>
           </a:ln>
         </p:spPr>
       </p:sp>
       <p:sp>
         <p:nvSpPr>
           <p:cNvPr id="4" name="Google Shape;4;n"/>
-          <p:cNvSpPr txBox="1"/>
+          <p:cNvSpPr txBox="1">
+            <a:spLocks noGrp="1"/>
+          </p:cNvSpPr>
           <p:nvPr>
-            <p:ph idx="1" type="body"/>
+            <p:ph type="body" idx="1"/>
           </p:nvPr>
         </p:nvSpPr>
         <p:spPr>
@@ -369,9 +383,9 @@
           </a:ln>
         </p:spPr>
         <p:txBody>
-          <a:bodyPr anchorCtr="0" anchor="t" bIns="91425" lIns="91425" spcFirstLastPara="1" rIns="91425" wrap="square" tIns="91425"/>
+          <a:bodyPr spcFirstLastPara="1" wrap="square" lIns="91425" tIns="91425" rIns="91425" bIns="91425" anchor="t" anchorCtr="0"/>
           <a:lstStyle>
-            <a:lvl1pPr indent="-298450" lvl="0" marL="457200">
+            <a:lvl1pPr marL="457200" lvl="0" indent="-298450">
               <a:spcBef>
                 <a:spcPts val="0"/>
               </a:spcBef>
@@ -382,7 +396,7 @@
               <a:buChar char="●"/>
               <a:defRPr sz="1100"/>
             </a:lvl1pPr>
-            <a:lvl2pPr indent="-298450" lvl="1" marL="914400">
+            <a:lvl2pPr marL="914400" lvl="1" indent="-298450">
               <a:spcBef>
                 <a:spcPts val="0"/>
               </a:spcBef>
@@ -393,7 +407,7 @@
               <a:buChar char="○"/>
               <a:defRPr sz="1100"/>
             </a:lvl2pPr>
-            <a:lvl3pPr indent="-298450" lvl="2" marL="1371600">
+            <a:lvl3pPr marL="1371600" lvl="2" indent="-298450">
               <a:spcBef>
                 <a:spcPts val="0"/>
               </a:spcBef>
@@ -404,7 +418,7 @@
               <a:buChar char="■"/>
               <a:defRPr sz="1100"/>
             </a:lvl3pPr>
-            <a:lvl4pPr indent="-298450" lvl="3" marL="1828800">
+            <a:lvl4pPr marL="1828800" lvl="3" indent="-298450">
               <a:spcBef>
                 <a:spcPts val="0"/>
               </a:spcBef>
@@ -415,7 +429,7 @@
               <a:buChar char="●"/>
               <a:defRPr sz="1100"/>
             </a:lvl4pPr>
-            <a:lvl5pPr indent="-298450" lvl="4" marL="2286000">
+            <a:lvl5pPr marL="2286000" lvl="4" indent="-298450">
               <a:spcBef>
                 <a:spcPts val="0"/>
               </a:spcBef>
@@ -426,7 +440,7 @@
               <a:buChar char="○"/>
               <a:defRPr sz="1100"/>
             </a:lvl5pPr>
-            <a:lvl6pPr indent="-298450" lvl="5" marL="2743200">
+            <a:lvl6pPr marL="2743200" lvl="5" indent="-298450">
               <a:spcBef>
                 <a:spcPts val="0"/>
               </a:spcBef>
@@ -437,7 +451,7 @@
               <a:buChar char="■"/>
               <a:defRPr sz="1100"/>
             </a:lvl6pPr>
-            <a:lvl7pPr indent="-298450" lvl="6" marL="3200400">
+            <a:lvl7pPr marL="3200400" lvl="6" indent="-298450">
               <a:spcBef>
                 <a:spcPts val="0"/>
               </a:spcBef>
@@ -448,7 +462,7 @@
               <a:buChar char="●"/>
               <a:defRPr sz="1100"/>
             </a:lvl7pPr>
-            <a:lvl8pPr indent="-298450" lvl="7" marL="3657600">
+            <a:lvl8pPr marL="3657600" lvl="7" indent="-298450">
               <a:spcBef>
                 <a:spcPts val="0"/>
               </a:spcBef>
@@ -459,7 +473,7 @@
               <a:buChar char="○"/>
               <a:defRPr sz="1100"/>
             </a:lvl8pPr>
-            <a:lvl9pPr indent="-298450" lvl="8" marL="4114800">
+            <a:lvl9pPr marL="4114800" lvl="8" indent="-298450">
               <a:spcBef>
                 <a:spcPts val="0"/>
               </a:spcBef>
@@ -471,14 +485,16 @@
               <a:defRPr sz="1100"/>
             </a:lvl9pPr>
           </a:lstStyle>
-          <a:p/>
+          <a:p>
+            <a:endParaRPr/>
+          </a:p>
         </p:txBody>
       </p:sp>
     </p:spTree>
   </p:cSld>
-  <p:clrMap accent1="accent1" accent2="accent2" accent3="accent3" accent4="accent4" accent5="accent5" accent6="accent6" bg1="lt1" bg2="dk2" tx1="dk1" tx2="lt2" folHlink="folHlink" hlink="hlink"/>
+  <p:clrMap bg1="lt1" tx1="dk1" bg2="dk2" tx2="lt2" accent1="accent1" accent2="accent2" accent3="accent3" accent4="accent4" accent5="accent5" accent6="accent6" hlink="hlink" folHlink="folHlink"/>
   <p:notesStyle>
-    <a:defPPr lvl="0" marR="0" rtl="0" algn="l">
+    <a:defPPr marR="0" lvl="0" algn="l" rtl="0">
       <a:lnSpc>
         <a:spcPct val="100000"/>
       </a:lnSpc>
@@ -489,7 +505,7 @@
         <a:spcPts val="0"/>
       </a:spcAft>
     </a:defPPr>
-    <a:lvl1pPr lvl="0" marR="0" rtl="0" algn="l">
+    <a:lvl1pPr marR="0" lvl="0" algn="l" rtl="0">
       <a:lnSpc>
         <a:spcPct val="100000"/>
       </a:lnSpc>
@@ -503,7 +519,7 @@
         <a:srgbClr val="000000"/>
       </a:buClr>
       <a:buFont typeface="Arial"/>
-      <a:defRPr b="0" i="0" sz="1400" u="none" cap="none" strike="noStrike">
+      <a:defRPr sz="1400" b="0" i="0" u="none" strike="noStrike" cap="none">
         <a:solidFill>
           <a:srgbClr val="000000"/>
         </a:solidFill>
@@ -513,7 +529,7 @@
         <a:sym typeface="Arial"/>
       </a:defRPr>
     </a:lvl1pPr>
-    <a:lvl2pPr lvl="1" marR="0" rtl="0" algn="l">
+    <a:lvl2pPr marR="0" lvl="1" algn="l" rtl="0">
       <a:lnSpc>
         <a:spcPct val="100000"/>
       </a:lnSpc>
@@ -527,7 +543,7 @@
         <a:srgbClr val="000000"/>
       </a:buClr>
       <a:buFont typeface="Arial"/>
-      <a:defRPr b="0" i="0" sz="1400" u="none" cap="none" strike="noStrike">
+      <a:defRPr sz="1400" b="0" i="0" u="none" strike="noStrike" cap="none">
         <a:solidFill>
           <a:srgbClr val="000000"/>
         </a:solidFill>
@@ -537,7 +553,7 @@
         <a:sym typeface="Arial"/>
       </a:defRPr>
     </a:lvl2pPr>
-    <a:lvl3pPr lvl="2" marR="0" rtl="0" algn="l">
+    <a:lvl3pPr marR="0" lvl="2" algn="l" rtl="0">
       <a:lnSpc>
         <a:spcPct val="100000"/>
       </a:lnSpc>
@@ -551,7 +567,7 @@
         <a:srgbClr val="000000"/>
       </a:buClr>
       <a:buFont typeface="Arial"/>
-      <a:defRPr b="0" i="0" sz="1400" u="none" cap="none" strike="noStrike">
+      <a:defRPr sz="1400" b="0" i="0" u="none" strike="noStrike" cap="none">
         <a:solidFill>
           <a:srgbClr val="000000"/>
         </a:solidFill>
@@ -561,7 +577,7 @@
         <a:sym typeface="Arial"/>
       </a:defRPr>
     </a:lvl3pPr>
-    <a:lvl4pPr lvl="3" marR="0" rtl="0" algn="l">
+    <a:lvl4pPr marR="0" lvl="3" algn="l" rtl="0">
       <a:lnSpc>
         <a:spcPct val="100000"/>
       </a:lnSpc>
@@ -575,7 +591,7 @@
         <a:srgbClr val="000000"/>
       </a:buClr>
       <a:buFont typeface="Arial"/>
-      <a:defRPr b="0" i="0" sz="1400" u="none" cap="none" strike="noStrike">
+      <a:defRPr sz="1400" b="0" i="0" u="none" strike="noStrike" cap="none">
         <a:solidFill>
           <a:srgbClr val="000000"/>
         </a:solidFill>
@@ -585,7 +601,7 @@
         <a:sym typeface="Arial"/>
       </a:defRPr>
     </a:lvl4pPr>
-    <a:lvl5pPr lvl="4" marR="0" rtl="0" algn="l">
+    <a:lvl5pPr marR="0" lvl="4" algn="l" rtl="0">
       <a:lnSpc>
         <a:spcPct val="100000"/>
       </a:lnSpc>
@@ -599,7 +615,7 @@
         <a:srgbClr val="000000"/>
       </a:buClr>
       <a:buFont typeface="Arial"/>
-      <a:defRPr b="0" i="0" sz="1400" u="none" cap="none" strike="noStrike">
+      <a:defRPr sz="1400" b="0" i="0" u="none" strike="noStrike" cap="none">
         <a:solidFill>
           <a:srgbClr val="000000"/>
         </a:solidFill>
@@ -609,7 +625,7 @@
         <a:sym typeface="Arial"/>
       </a:defRPr>
     </a:lvl5pPr>
-    <a:lvl6pPr lvl="5" marR="0" rtl="0" algn="l">
+    <a:lvl6pPr marR="0" lvl="5" algn="l" rtl="0">
       <a:lnSpc>
         <a:spcPct val="100000"/>
       </a:lnSpc>
@@ -623,7 +639,7 @@
         <a:srgbClr val="000000"/>
       </a:buClr>
       <a:buFont typeface="Arial"/>
-      <a:defRPr b="0" i="0" sz="1400" u="none" cap="none" strike="noStrike">
+      <a:defRPr sz="1400" b="0" i="0" u="none" strike="noStrike" cap="none">
         <a:solidFill>
           <a:srgbClr val="000000"/>
         </a:solidFill>
@@ -633,7 +649,7 @@
         <a:sym typeface="Arial"/>
       </a:defRPr>
     </a:lvl6pPr>
-    <a:lvl7pPr lvl="6" marR="0" rtl="0" algn="l">
+    <a:lvl7pPr marR="0" lvl="6" algn="l" rtl="0">
       <a:lnSpc>
         <a:spcPct val="100000"/>
       </a:lnSpc>
@@ -647,7 +663,7 @@
         <a:srgbClr val="000000"/>
       </a:buClr>
       <a:buFont typeface="Arial"/>
-      <a:defRPr b="0" i="0" sz="1400" u="none" cap="none" strike="noStrike">
+      <a:defRPr sz="1400" b="0" i="0" u="none" strike="noStrike" cap="none">
         <a:solidFill>
           <a:srgbClr val="000000"/>
         </a:solidFill>
@@ -657,7 +673,7 @@
         <a:sym typeface="Arial"/>
       </a:defRPr>
     </a:lvl7pPr>
-    <a:lvl8pPr lvl="7" marR="0" rtl="0" algn="l">
+    <a:lvl8pPr marR="0" lvl="7" algn="l" rtl="0">
       <a:lnSpc>
         <a:spcPct val="100000"/>
       </a:lnSpc>
@@ -671,7 +687,7 @@
         <a:srgbClr val="000000"/>
       </a:buClr>
       <a:buFont typeface="Arial"/>
-      <a:defRPr b="0" i="0" sz="1400" u="none" cap="none" strike="noStrike">
+      <a:defRPr sz="1400" b="0" i="0" u="none" strike="noStrike" cap="none">
         <a:solidFill>
           <a:srgbClr val="000000"/>
         </a:solidFill>
@@ -681,7 +697,7 @@
         <a:sym typeface="Arial"/>
       </a:defRPr>
     </a:lvl8pPr>
-    <a:lvl9pPr lvl="8" marR="0" rtl="0" algn="l">
+    <a:lvl9pPr marR="0" lvl="8" algn="l" rtl="0">
       <a:lnSpc>
         <a:spcPct val="100000"/>
       </a:lnSpc>
@@ -695,7 +711,7 @@
         <a:srgbClr val="000000"/>
       </a:buClr>
       <a:buFont typeface="Arial"/>
-      <a:defRPr b="0" i="0" sz="1400" u="none" cap="none" strike="noStrike">
+      <a:defRPr sz="1400" b="0" i="0" u="none" strike="noStrike" cap="none">
         <a:solidFill>
           <a:srgbClr val="000000"/>
         </a:solidFill>
@@ -710,11 +726,11 @@
 </file>
 
 <file path=ppt/notesSlides/notesSlide1.xml><?xml version="1.0" encoding="utf-8"?>
-<p:notes xmlns:a="http://schemas.openxmlformats.org/drawingml/2006/main" xmlns:r="http://schemas.openxmlformats.org/officeDocument/2006/relationships" xmlns:mc="http://schemas.openxmlformats.org/markup-compatibility/2006" xmlns:mv="urn:schemas-microsoft-com:mac:vml" xmlns:p="http://schemas.openxmlformats.org/presentationml/2006/main" xmlns:c="http://schemas.openxmlformats.org/drawingml/2006/chart" xmlns:dgm="http://schemas.openxmlformats.org/drawingml/2006/diagram" xmlns:o="urn:schemas-microsoft-com:office:office" xmlns:v="urn:schemas-microsoft-com:vml" xmlns:pvml="urn:schemas-microsoft-com:office:powerpoint" xmlns:com="http://schemas.openxmlformats.org/drawingml/2006/compatibility" xmlns:p14="http://schemas.microsoft.com/office/powerpoint/2010/main" xmlns:p15="http://schemas.microsoft.com/office/powerpoint/2012/main" showMasterPhAnim="0" showMasterSp="0">
+<p:notes xmlns:a="http://schemas.openxmlformats.org/drawingml/2006/main" xmlns:r="http://schemas.openxmlformats.org/officeDocument/2006/relationships" xmlns:p="http://schemas.openxmlformats.org/presentationml/2006/main" showMasterSp="0" showMasterPhAnim="0">
   <p:cSld>
     <p:spTree>
       <p:nvGrpSpPr>
-        <p:cNvPr id="62" name="Shape 62"/>
+        <p:cNvPr id="1" name="Shape 62"/>
         <p:cNvGrpSpPr/>
         <p:nvPr/>
       </p:nvGrpSpPr>
@@ -729,9 +745,11 @@
       <p:sp>
         <p:nvSpPr>
           <p:cNvPr id="63" name="Google Shape;63;p:notes"/>
-          <p:cNvSpPr/>
+          <p:cNvSpPr>
+            <a:spLocks noGrp="1" noRot="1" noChangeAspect="1"/>
+          </p:cNvSpPr>
           <p:nvPr>
-            <p:ph idx="2" type="sldImg"/>
+            <p:ph type="sldImg" idx="2"/>
           </p:nvPr>
         </p:nvSpPr>
         <p:spPr>
@@ -740,9 +758,13 @@
             <a:ext cx="6096075" cy="3429000"/>
           </a:xfrm>
           <a:custGeom>
-            <a:rect b="b" l="l" r="r" t="t"/>
+            <a:avLst/>
+            <a:gdLst/>
+            <a:ahLst/>
+            <a:cxnLst/>
+            <a:rect l="l" t="t" r="r" b="b"/>
             <a:pathLst>
-              <a:path extrusionOk="0" h="120000" w="120000">
+              <a:path w="120000" h="120000" extrusionOk="0">
                 <a:moveTo>
                   <a:pt x="0" y="0"/>
                 </a:moveTo>
@@ -764,9 +786,11 @@
       <p:sp>
         <p:nvSpPr>
           <p:cNvPr id="64" name="Google Shape;64;p:notes"/>
-          <p:cNvSpPr txBox="1"/>
+          <p:cNvSpPr txBox="1">
+            <a:spLocks noGrp="1"/>
+          </p:cNvSpPr>
           <p:nvPr>
-            <p:ph idx="1" type="body"/>
+            <p:ph type="body" idx="1"/>
           </p:nvPr>
         </p:nvSpPr>
         <p:spPr>
@@ -779,12 +803,12 @@
           </a:prstGeom>
         </p:spPr>
         <p:txBody>
-          <a:bodyPr anchorCtr="0" anchor="t" bIns="91425" lIns="91425" spcFirstLastPara="1" rIns="91425" wrap="square" tIns="91425">
+          <a:bodyPr spcFirstLastPara="1" wrap="square" lIns="91425" tIns="91425" rIns="91425" bIns="91425" anchor="t" anchorCtr="0">
             <a:noAutofit/>
           </a:bodyPr>
           <a:lstStyle/>
           <a:p>
-            <a:pPr indent="0" lvl="0" marL="0" rtl="0" algn="l">
+            <a:pPr marL="0" lvl="0" indent="0" algn="l" rtl="0">
               <a:spcBef>
                 <a:spcPts val="0"/>
               </a:spcBef>
@@ -793,9 +817,6 @@
               </a:spcAft>
               <a:buNone/>
             </a:pPr>
-            <a:r>
-              <a:t/>
-            </a:r>
             <a:endParaRPr/>
           </a:p>
         </p:txBody>
@@ -809,11 +830,11 @@
 </file>
 
 <file path=ppt/notesSlides/notesSlide2.xml><?xml version="1.0" encoding="utf-8"?>
-<p:notes xmlns:a="http://schemas.openxmlformats.org/drawingml/2006/main" xmlns:r="http://schemas.openxmlformats.org/officeDocument/2006/relationships" xmlns:mc="http://schemas.openxmlformats.org/markup-compatibility/2006" xmlns:mv="urn:schemas-microsoft-com:mac:vml" xmlns:p="http://schemas.openxmlformats.org/presentationml/2006/main" xmlns:c="http://schemas.openxmlformats.org/drawingml/2006/chart" xmlns:dgm="http://schemas.openxmlformats.org/drawingml/2006/diagram" xmlns:o="urn:schemas-microsoft-com:office:office" xmlns:v="urn:schemas-microsoft-com:vml" xmlns:pvml="urn:schemas-microsoft-com:office:powerpoint" xmlns:com="http://schemas.openxmlformats.org/drawingml/2006/compatibility" xmlns:p14="http://schemas.microsoft.com/office/powerpoint/2010/main" xmlns:p15="http://schemas.microsoft.com/office/powerpoint/2012/main" showMasterPhAnim="0" showMasterSp="0">
+<p:notes xmlns:a="http://schemas.openxmlformats.org/drawingml/2006/main" xmlns:r="http://schemas.openxmlformats.org/officeDocument/2006/relationships" xmlns:p="http://schemas.openxmlformats.org/presentationml/2006/main" showMasterSp="0" showMasterPhAnim="0">
   <p:cSld>
     <p:spTree>
       <p:nvGrpSpPr>
-        <p:cNvPr id="68" name="Shape 68"/>
+        <p:cNvPr id="1" name="Shape 68"/>
         <p:cNvGrpSpPr/>
         <p:nvPr/>
       </p:nvGrpSpPr>
@@ -828,20 +849,26 @@
       <p:sp>
         <p:nvSpPr>
           <p:cNvPr id="69" name="Google Shape;69;g5be336017e_1_5:notes"/>
-          <p:cNvSpPr/>
+          <p:cNvSpPr>
+            <a:spLocks noGrp="1" noRot="1" noChangeAspect="1"/>
+          </p:cNvSpPr>
           <p:nvPr>
-            <p:ph idx="2" type="sldImg"/>
+            <p:ph type="sldImg" idx="2"/>
           </p:nvPr>
         </p:nvSpPr>
         <p:spPr>
           <a:xfrm>
-            <a:off x="381300" y="685800"/>
+            <a:off x="381000" y="685800"/>
             <a:ext cx="6096000" cy="3429000"/>
           </a:xfrm>
           <a:custGeom>
-            <a:rect b="b" l="l" r="r" t="t"/>
+            <a:avLst/>
+            <a:gdLst/>
+            <a:ahLst/>
+            <a:cxnLst/>
+            <a:rect l="l" t="t" r="r" b="b"/>
             <a:pathLst>
-              <a:path extrusionOk="0" h="120000" w="120000">
+              <a:path w="120000" h="120000" extrusionOk="0">
                 <a:moveTo>
                   <a:pt x="0" y="0"/>
                 </a:moveTo>
@@ -863,9 +890,11 @@
       <p:sp>
         <p:nvSpPr>
           <p:cNvPr id="70" name="Google Shape;70;g5be336017e_1_5:notes"/>
-          <p:cNvSpPr txBox="1"/>
+          <p:cNvSpPr txBox="1">
+            <a:spLocks noGrp="1"/>
+          </p:cNvSpPr>
           <p:nvPr>
-            <p:ph idx="1" type="body"/>
+            <p:ph type="body" idx="1"/>
           </p:nvPr>
         </p:nvSpPr>
         <p:spPr>
@@ -878,12 +907,12 @@
           </a:prstGeom>
         </p:spPr>
         <p:txBody>
-          <a:bodyPr anchorCtr="0" anchor="t" bIns="91425" lIns="91425" spcFirstLastPara="1" rIns="91425" wrap="square" tIns="91425">
+          <a:bodyPr spcFirstLastPara="1" wrap="square" lIns="91425" tIns="91425" rIns="91425" bIns="91425" anchor="t" anchorCtr="0">
             <a:noAutofit/>
           </a:bodyPr>
           <a:lstStyle/>
           <a:p>
-            <a:pPr indent="0" lvl="0" marL="0" rtl="0" algn="l">
+            <a:pPr marL="0" lvl="0" indent="0" algn="l" rtl="0">
               <a:spcBef>
                 <a:spcPts val="0"/>
               </a:spcBef>
@@ -896,6 +925,72 @@
               <a:rPr lang="en"/>
               <a:t>Anthony</a:t>
             </a:r>
+            <a:endParaRPr/>
+          </a:p>
+          <a:p>
+            <a:pPr marL="0" lvl="0" indent="0" algn="l" rtl="0">
+              <a:spcBef>
+                <a:spcPts val="0"/>
+              </a:spcBef>
+              <a:spcAft>
+                <a:spcPts val="0"/>
+              </a:spcAft>
+              <a:buNone/>
+            </a:pPr>
+            <a:endParaRPr/>
+          </a:p>
+          <a:p>
+            <a:pPr marL="0" lvl="0" indent="0" algn="l" rtl="0">
+              <a:lnSpc>
+                <a:spcPct val="115000"/>
+              </a:lnSpc>
+              <a:spcBef>
+                <a:spcPts val="0"/>
+              </a:spcBef>
+              <a:spcAft>
+                <a:spcPts val="0"/>
+              </a:spcAft>
+              <a:buNone/>
+            </a:pPr>
+            <a:r>
+              <a:rPr lang="en" sz="1200">
+                <a:solidFill>
+                  <a:srgbClr val="333333"/>
+                </a:solidFill>
+              </a:rPr>
+              <a:t>Opportunity Zones are designed to spur economic development by providing tax benefits to investors. First, investors can defer tax on any prior gains invested in a Qualified Opportunity Fund (QOF) until the earlier of the date on which the investment in a QOF is sold or exchanged, or December 31, 2026.   If the QOF investment is held for longer than 5 years, there is a 10% exclusion of the deferred gain.  If held for more than 7 years, the 10% becomes 15%.  Second, if the investor holds the investment in the Opportunity Fund for at least ten years, the investor is eligible for an increase in basis of the QOF investment equal to its fair market value on the date that the QOF investment is sold or exchanged.</a:t>
+            </a:r>
+            <a:endParaRPr sz="1200">
+              <a:solidFill>
+                <a:srgbClr val="333333"/>
+              </a:solidFill>
+            </a:endParaRPr>
+          </a:p>
+          <a:p>
+            <a:pPr marL="0" lvl="0" indent="0" algn="l" rtl="0">
+              <a:lnSpc>
+                <a:spcPct val="115000"/>
+              </a:lnSpc>
+              <a:spcBef>
+                <a:spcPts val="800"/>
+              </a:spcBef>
+              <a:spcAft>
+                <a:spcPts val="0"/>
+              </a:spcAft>
+              <a:buNone/>
+            </a:pPr>
+            <a:endParaRPr/>
+          </a:p>
+          <a:p>
+            <a:pPr marL="0" lvl="0" indent="0" algn="l" rtl="0">
+              <a:spcBef>
+                <a:spcPts val="0"/>
+              </a:spcBef>
+              <a:spcAft>
+                <a:spcPts val="0"/>
+              </a:spcAft>
+              <a:buNone/>
+            </a:pPr>
             <a:endParaRPr/>
           </a:p>
         </p:txBody>
@@ -909,11 +1004,11 @@
 </file>
 
 <file path=ppt/notesSlides/notesSlide3.xml><?xml version="1.0" encoding="utf-8"?>
-<p:notes xmlns:a="http://schemas.openxmlformats.org/drawingml/2006/main" xmlns:r="http://schemas.openxmlformats.org/officeDocument/2006/relationships" xmlns:mc="http://schemas.openxmlformats.org/markup-compatibility/2006" xmlns:mv="urn:schemas-microsoft-com:mac:vml" xmlns:p="http://schemas.openxmlformats.org/presentationml/2006/main" xmlns:c="http://schemas.openxmlformats.org/drawingml/2006/chart" xmlns:dgm="http://schemas.openxmlformats.org/drawingml/2006/diagram" xmlns:o="urn:schemas-microsoft-com:office:office" xmlns:v="urn:schemas-microsoft-com:vml" xmlns:pvml="urn:schemas-microsoft-com:office:powerpoint" xmlns:com="http://schemas.openxmlformats.org/drawingml/2006/compatibility" xmlns:p14="http://schemas.microsoft.com/office/powerpoint/2010/main" xmlns:p15="http://schemas.microsoft.com/office/powerpoint/2012/main" showMasterPhAnim="0" showMasterSp="0">
+<p:notes xmlns:a="http://schemas.openxmlformats.org/drawingml/2006/main" xmlns:r="http://schemas.openxmlformats.org/officeDocument/2006/relationships" xmlns:p="http://schemas.openxmlformats.org/presentationml/2006/main" showMasterSp="0" showMasterPhAnim="0">
   <p:cSld>
     <p:spTree>
       <p:nvGrpSpPr>
-        <p:cNvPr id="74" name="Shape 74"/>
+        <p:cNvPr id="1" name="Shape 74"/>
         <p:cNvGrpSpPr/>
         <p:nvPr/>
       </p:nvGrpSpPr>
@@ -928,9 +1023,11 @@
       <p:sp>
         <p:nvSpPr>
           <p:cNvPr id="75" name="Google Shape;75;g5beeb67248_2_0:notes"/>
-          <p:cNvSpPr/>
+          <p:cNvSpPr>
+            <a:spLocks noGrp="1" noRot="1" noChangeAspect="1"/>
+          </p:cNvSpPr>
           <p:nvPr>
-            <p:ph idx="2" type="sldImg"/>
+            <p:ph type="sldImg" idx="2"/>
           </p:nvPr>
         </p:nvSpPr>
         <p:spPr>
@@ -939,9 +1036,13 @@
             <a:ext cx="6096000" cy="3429000"/>
           </a:xfrm>
           <a:custGeom>
-            <a:rect b="b" l="l" r="r" t="t"/>
+            <a:avLst/>
+            <a:gdLst/>
+            <a:ahLst/>
+            <a:cxnLst/>
+            <a:rect l="l" t="t" r="r" b="b"/>
             <a:pathLst>
-              <a:path extrusionOk="0" h="120000" w="120000">
+              <a:path w="120000" h="120000" extrusionOk="0">
                 <a:moveTo>
                   <a:pt x="0" y="0"/>
                 </a:moveTo>
@@ -963,9 +1064,11 @@
       <p:sp>
         <p:nvSpPr>
           <p:cNvPr id="76" name="Google Shape;76;g5beeb67248_2_0:notes"/>
-          <p:cNvSpPr txBox="1"/>
+          <p:cNvSpPr txBox="1">
+            <a:spLocks noGrp="1"/>
+          </p:cNvSpPr>
           <p:nvPr>
-            <p:ph idx="1" type="body"/>
+            <p:ph type="body" idx="1"/>
           </p:nvPr>
         </p:nvSpPr>
         <p:spPr>
@@ -978,12 +1081,12 @@
           </a:prstGeom>
         </p:spPr>
         <p:txBody>
-          <a:bodyPr anchorCtr="0" anchor="t" bIns="91425" lIns="91425" spcFirstLastPara="1" rIns="91425" wrap="square" tIns="91425">
+          <a:bodyPr spcFirstLastPara="1" wrap="square" lIns="91425" tIns="91425" rIns="91425" bIns="91425" anchor="t" anchorCtr="0">
             <a:noAutofit/>
           </a:bodyPr>
           <a:lstStyle/>
           <a:p>
-            <a:pPr indent="0" lvl="0" marL="0" rtl="0" algn="l">
+            <a:pPr marL="0" lvl="0" indent="0" algn="l" rtl="0">
               <a:spcBef>
                 <a:spcPts val="0"/>
               </a:spcBef>
@@ -1009,11 +1112,11 @@
 </file>
 
 <file path=ppt/notesSlides/notesSlide4.xml><?xml version="1.0" encoding="utf-8"?>
-<p:notes xmlns:a="http://schemas.openxmlformats.org/drawingml/2006/main" xmlns:r="http://schemas.openxmlformats.org/officeDocument/2006/relationships" xmlns:mc="http://schemas.openxmlformats.org/markup-compatibility/2006" xmlns:mv="urn:schemas-microsoft-com:mac:vml" xmlns:p="http://schemas.openxmlformats.org/presentationml/2006/main" xmlns:c="http://schemas.openxmlformats.org/drawingml/2006/chart" xmlns:dgm="http://schemas.openxmlformats.org/drawingml/2006/diagram" xmlns:o="urn:schemas-microsoft-com:office:office" xmlns:v="urn:schemas-microsoft-com:vml" xmlns:pvml="urn:schemas-microsoft-com:office:powerpoint" xmlns:com="http://schemas.openxmlformats.org/drawingml/2006/compatibility" xmlns:p14="http://schemas.microsoft.com/office/powerpoint/2010/main" xmlns:p15="http://schemas.microsoft.com/office/powerpoint/2012/main" showMasterPhAnim="0" showMasterSp="0">
+<p:notes xmlns:a="http://schemas.openxmlformats.org/drawingml/2006/main" xmlns:r="http://schemas.openxmlformats.org/officeDocument/2006/relationships" xmlns:p="http://schemas.openxmlformats.org/presentationml/2006/main" showMasterSp="0" showMasterPhAnim="0">
   <p:cSld>
     <p:spTree>
       <p:nvGrpSpPr>
-        <p:cNvPr id="80" name="Shape 80"/>
+        <p:cNvPr id="1" name="Shape 80"/>
         <p:cNvGrpSpPr/>
         <p:nvPr/>
       </p:nvGrpSpPr>
@@ -1027,10 +1130,12 @@
       </p:grpSpPr>
       <p:sp>
         <p:nvSpPr>
-          <p:cNvPr id="81" name="Google Shape;81;g5be336017e_2_1:notes"/>
-          <p:cNvSpPr/>
+          <p:cNvPr id="81" name="Google Shape;81;g5c06d8b72f_0_0:notes"/>
+          <p:cNvSpPr>
+            <a:spLocks noGrp="1" noRot="1" noChangeAspect="1"/>
+          </p:cNvSpPr>
           <p:nvPr>
-            <p:ph idx="2" type="sldImg"/>
+            <p:ph type="sldImg" idx="2"/>
           </p:nvPr>
         </p:nvSpPr>
         <p:spPr>
@@ -1039,9 +1144,13 @@
             <a:ext cx="6096000" cy="3429000"/>
           </a:xfrm>
           <a:custGeom>
-            <a:rect b="b" l="l" r="r" t="t"/>
+            <a:avLst/>
+            <a:gdLst/>
+            <a:ahLst/>
+            <a:cxnLst/>
+            <a:rect l="l" t="t" r="r" b="b"/>
             <a:pathLst>
-              <a:path extrusionOk="0" h="120000" w="120000">
+              <a:path w="120000" h="120000" extrusionOk="0">
                 <a:moveTo>
                   <a:pt x="0" y="0"/>
                 </a:moveTo>
@@ -1062,10 +1171,12 @@
       </p:sp>
       <p:sp>
         <p:nvSpPr>
-          <p:cNvPr id="82" name="Google Shape;82;g5be336017e_2_1:notes"/>
-          <p:cNvSpPr txBox="1"/>
+          <p:cNvPr id="82" name="Google Shape;82;g5c06d8b72f_0_0:notes"/>
+          <p:cNvSpPr txBox="1">
+            <a:spLocks noGrp="1"/>
+          </p:cNvSpPr>
           <p:nvPr>
-            <p:ph idx="1" type="body"/>
+            <p:ph type="body" idx="1"/>
           </p:nvPr>
         </p:nvSpPr>
         <p:spPr>
@@ -1078,12 +1189,12 @@
           </a:prstGeom>
         </p:spPr>
         <p:txBody>
-          <a:bodyPr anchorCtr="0" anchor="t" bIns="91425" lIns="91425" spcFirstLastPara="1" rIns="91425" wrap="square" tIns="91425">
+          <a:bodyPr spcFirstLastPara="1" wrap="square" lIns="91425" tIns="91425" rIns="91425" bIns="91425" anchor="t" anchorCtr="0">
             <a:noAutofit/>
           </a:bodyPr>
           <a:lstStyle/>
           <a:p>
-            <a:pPr indent="0" lvl="0" marL="0" rtl="0" algn="l">
+            <a:pPr marL="0" lvl="0" indent="0" algn="l" rtl="0">
               <a:spcBef>
                 <a:spcPts val="0"/>
               </a:spcBef>
@@ -1094,7 +1205,7 @@
             </a:pPr>
             <a:r>
               <a:rPr lang="en"/>
-              <a:t>Wuyan</a:t>
+              <a:t>Lydia</a:t>
             </a:r>
             <a:endParaRPr/>
           </a:p>
@@ -1109,11 +1220,11 @@
 </file>
 
 <file path=ppt/notesSlides/notesSlide5.xml><?xml version="1.0" encoding="utf-8"?>
-<p:notes xmlns:a="http://schemas.openxmlformats.org/drawingml/2006/main" xmlns:r="http://schemas.openxmlformats.org/officeDocument/2006/relationships" xmlns:mc="http://schemas.openxmlformats.org/markup-compatibility/2006" xmlns:mv="urn:schemas-microsoft-com:mac:vml" xmlns:p="http://schemas.openxmlformats.org/presentationml/2006/main" xmlns:c="http://schemas.openxmlformats.org/drawingml/2006/chart" xmlns:dgm="http://schemas.openxmlformats.org/drawingml/2006/diagram" xmlns:o="urn:schemas-microsoft-com:office:office" xmlns:v="urn:schemas-microsoft-com:vml" xmlns:pvml="urn:schemas-microsoft-com:office:powerpoint" xmlns:com="http://schemas.openxmlformats.org/drawingml/2006/compatibility" xmlns:p14="http://schemas.microsoft.com/office/powerpoint/2010/main" xmlns:p15="http://schemas.microsoft.com/office/powerpoint/2012/main" showMasterPhAnim="0" showMasterSp="0">
+<p:notes xmlns:a="http://schemas.openxmlformats.org/drawingml/2006/main" xmlns:r="http://schemas.openxmlformats.org/officeDocument/2006/relationships" xmlns:p="http://schemas.openxmlformats.org/presentationml/2006/main" showMasterSp="0" showMasterPhAnim="0">
   <p:cSld>
     <p:spTree>
       <p:nvGrpSpPr>
-        <p:cNvPr id="86" name="Shape 86"/>
+        <p:cNvPr id="1" name="Shape 85"/>
         <p:cNvGrpSpPr/>
         <p:nvPr/>
       </p:nvGrpSpPr>
@@ -1127,10 +1238,12 @@
       </p:grpSpPr>
       <p:sp>
         <p:nvSpPr>
-          <p:cNvPr id="87" name="Google Shape;87;g5beeb67248_2_5:notes"/>
-          <p:cNvSpPr/>
+          <p:cNvPr id="86" name="Google Shape;86;g5be336017e_2_1:notes"/>
+          <p:cNvSpPr>
+            <a:spLocks noGrp="1" noRot="1" noChangeAspect="1"/>
+          </p:cNvSpPr>
           <p:nvPr>
-            <p:ph idx="2" type="sldImg"/>
+            <p:ph type="sldImg" idx="2"/>
           </p:nvPr>
         </p:nvSpPr>
         <p:spPr>
@@ -1139,9 +1252,13 @@
             <a:ext cx="6096000" cy="3429000"/>
           </a:xfrm>
           <a:custGeom>
-            <a:rect b="b" l="l" r="r" t="t"/>
+            <a:avLst/>
+            <a:gdLst/>
+            <a:ahLst/>
+            <a:cxnLst/>
+            <a:rect l="l" t="t" r="r" b="b"/>
             <a:pathLst>
-              <a:path extrusionOk="0" h="120000" w="120000">
+              <a:path w="120000" h="120000" extrusionOk="0">
                 <a:moveTo>
                   <a:pt x="0" y="0"/>
                 </a:moveTo>
@@ -1162,10 +1279,12 @@
       </p:sp>
       <p:sp>
         <p:nvSpPr>
-          <p:cNvPr id="88" name="Google Shape;88;g5beeb67248_2_5:notes"/>
-          <p:cNvSpPr txBox="1"/>
+          <p:cNvPr id="87" name="Google Shape;87;g5be336017e_2_1:notes"/>
+          <p:cNvSpPr txBox="1">
+            <a:spLocks noGrp="1"/>
+          </p:cNvSpPr>
           <p:nvPr>
-            <p:ph idx="1" type="body"/>
+            <p:ph type="body" idx="1"/>
           </p:nvPr>
         </p:nvSpPr>
         <p:spPr>
@@ -1178,12 +1297,120 @@
           </a:prstGeom>
         </p:spPr>
         <p:txBody>
-          <a:bodyPr anchorCtr="0" anchor="t" bIns="91425" lIns="91425" spcFirstLastPara="1" rIns="91425" wrap="square" tIns="91425">
+          <a:bodyPr spcFirstLastPara="1" wrap="square" lIns="91425" tIns="91425" rIns="91425" bIns="91425" anchor="t" anchorCtr="0">
             <a:noAutofit/>
           </a:bodyPr>
           <a:lstStyle/>
           <a:p>
-            <a:pPr indent="0" lvl="0" marL="0" rtl="0" algn="l">
+            <a:pPr marL="0" lvl="0" indent="0" algn="l" rtl="0">
+              <a:spcBef>
+                <a:spcPts val="0"/>
+              </a:spcBef>
+              <a:spcAft>
+                <a:spcPts val="0"/>
+              </a:spcAft>
+              <a:buNone/>
+            </a:pPr>
+            <a:r>
+              <a:rPr lang="en"/>
+              <a:t>Wuyan</a:t>
+            </a:r>
+            <a:endParaRPr/>
+          </a:p>
+        </p:txBody>
+      </p:sp>
+    </p:spTree>
+  </p:cSld>
+  <p:clrMapOvr>
+    <a:masterClrMapping/>
+  </p:clrMapOvr>
+</p:notes>
+</file>
+
+<file path=ppt/notesSlides/notesSlide6.xml><?xml version="1.0" encoding="utf-8"?>
+<p:notes xmlns:a="http://schemas.openxmlformats.org/drawingml/2006/main" xmlns:r="http://schemas.openxmlformats.org/officeDocument/2006/relationships" xmlns:p="http://schemas.openxmlformats.org/presentationml/2006/main" showMasterSp="0" showMasterPhAnim="0">
+  <p:cSld>
+    <p:spTree>
+      <p:nvGrpSpPr>
+        <p:cNvPr id="1" name="Shape 91"/>
+        <p:cNvGrpSpPr/>
+        <p:nvPr/>
+      </p:nvGrpSpPr>
+      <p:grpSpPr>
+        <a:xfrm>
+          <a:off x="0" y="0"/>
+          <a:ext cx="0" cy="0"/>
+          <a:chOff x="0" y="0"/>
+          <a:chExt cx="0" cy="0"/>
+        </a:xfrm>
+      </p:grpSpPr>
+      <p:sp>
+        <p:nvSpPr>
+          <p:cNvPr id="92" name="Google Shape;92;g5beeb67248_2_5:notes"/>
+          <p:cNvSpPr>
+            <a:spLocks noGrp="1" noRot="1" noChangeAspect="1"/>
+          </p:cNvSpPr>
+          <p:nvPr>
+            <p:ph type="sldImg" idx="2"/>
+          </p:nvPr>
+        </p:nvSpPr>
+        <p:spPr>
+          <a:xfrm>
+            <a:off x="381300" y="685800"/>
+            <a:ext cx="6096000" cy="3429000"/>
+          </a:xfrm>
+          <a:custGeom>
+            <a:avLst/>
+            <a:gdLst/>
+            <a:ahLst/>
+            <a:cxnLst/>
+            <a:rect l="l" t="t" r="r" b="b"/>
+            <a:pathLst>
+              <a:path w="120000" h="120000" extrusionOk="0">
+                <a:moveTo>
+                  <a:pt x="0" y="0"/>
+                </a:moveTo>
+                <a:lnTo>
+                  <a:pt x="120000" y="0"/>
+                </a:lnTo>
+                <a:lnTo>
+                  <a:pt x="120000" y="120000"/>
+                </a:lnTo>
+                <a:lnTo>
+                  <a:pt x="0" y="120000"/>
+                </a:lnTo>
+                <a:close/>
+              </a:path>
+            </a:pathLst>
+          </a:custGeom>
+        </p:spPr>
+      </p:sp>
+      <p:sp>
+        <p:nvSpPr>
+          <p:cNvPr id="93" name="Google Shape;93;g5beeb67248_2_5:notes"/>
+          <p:cNvSpPr txBox="1">
+            <a:spLocks noGrp="1"/>
+          </p:cNvSpPr>
+          <p:nvPr>
+            <p:ph type="body" idx="1"/>
+          </p:nvPr>
+        </p:nvSpPr>
+        <p:spPr>
+          <a:xfrm>
+            <a:off x="685800" y="4343400"/>
+            <a:ext cx="5486400" cy="4114800"/>
+          </a:xfrm>
+          <a:prstGeom prst="rect">
+            <a:avLst/>
+          </a:prstGeom>
+        </p:spPr>
+        <p:txBody>
+          <a:bodyPr spcFirstLastPara="1" wrap="square" lIns="91425" tIns="91425" rIns="91425" bIns="91425" anchor="t" anchorCtr="0">
+            <a:noAutofit/>
+          </a:bodyPr>
+          <a:lstStyle/>
+          <a:p>
+            <a:pPr marL="0" lvl="0" indent="0" algn="l" rtl="0">
               <a:spcBef>
                 <a:spcPts val="0"/>
               </a:spcBef>
@@ -1209,11 +1436,11 @@
 </file>
 
 <file path=ppt/slideLayouts/slideLayout1.xml><?xml version="1.0" encoding="utf-8"?>
-<p:sldLayout xmlns:a="http://schemas.openxmlformats.org/drawingml/2006/main" xmlns:r="http://schemas.openxmlformats.org/officeDocument/2006/relationships" xmlns:mc="http://schemas.openxmlformats.org/markup-compatibility/2006" xmlns:mv="urn:schemas-microsoft-com:mac:vml" xmlns:p="http://schemas.openxmlformats.org/presentationml/2006/main" xmlns:c="http://schemas.openxmlformats.org/drawingml/2006/chart" xmlns:dgm="http://schemas.openxmlformats.org/drawingml/2006/diagram" xmlns:o="urn:schemas-microsoft-com:office:office" xmlns:v="urn:schemas-microsoft-com:vml" xmlns:pvml="urn:schemas-microsoft-com:office:powerpoint" xmlns:com="http://schemas.openxmlformats.org/drawingml/2006/compatibility" xmlns:p14="http://schemas.microsoft.com/office/powerpoint/2010/main" xmlns:p15="http://schemas.microsoft.com/office/powerpoint/2012/main" matchingName="Title slide" type="title">
+<p:sldLayout xmlns:a="http://schemas.openxmlformats.org/drawingml/2006/main" xmlns:r="http://schemas.openxmlformats.org/officeDocument/2006/relationships" xmlns:p="http://schemas.openxmlformats.org/presentationml/2006/main" matchingName="Title slide" type="title">
   <p:cSld name="TITLE">
     <p:spTree>
       <p:nvGrpSpPr>
-        <p:cNvPr id="9" name="Shape 9"/>
+        <p:cNvPr id="1" name="Shape 9"/>
         <p:cNvGrpSpPr/>
         <p:nvPr/>
       </p:nvGrpSpPr>
@@ -1240,14 +1467,14 @@
             <a:avLst/>
           </a:prstGeom>
           <a:noFill/>
-          <a:ln cap="flat" cmpd="sng" w="76200">
+          <a:ln w="76200" cap="flat" cmpd="sng">
             <a:solidFill>
               <a:schemeClr val="lt2"/>
             </a:solidFill>
             <a:prstDash val="solid"/>
             <a:round/>
-            <a:headEnd len="sm" w="sm" type="none"/>
-            <a:tailEnd len="sm" w="sm" type="none"/>
+            <a:headEnd type="none" w="sm" len="sm"/>
+            <a:tailEnd type="none" w="sm" len="sm"/>
           </a:ln>
         </p:spPr>
       </p:cxnSp>
@@ -1266,14 +1493,14 @@
             <a:avLst/>
           </a:prstGeom>
           <a:noFill/>
-          <a:ln cap="flat" cmpd="sng" w="76200">
+          <a:ln w="76200" cap="flat" cmpd="sng">
             <a:solidFill>
               <a:schemeClr val="lt2"/>
             </a:solidFill>
             <a:prstDash val="solid"/>
             <a:round/>
-            <a:headEnd len="sm" w="sm" type="none"/>
-            <a:tailEnd len="sm" w="sm" type="none"/>
+            <a:headEnd type="none" w="sm" len="sm"/>
+            <a:tailEnd type="none" w="sm" len="sm"/>
           </a:ln>
         </p:spPr>
       </p:cxnSp>
@@ -1306,14 +1533,14 @@
               <a:avLst/>
             </a:prstGeom>
             <a:noFill/>
-            <a:ln cap="flat" cmpd="sng" w="76200">
+            <a:ln w="76200" cap="flat" cmpd="sng">
               <a:solidFill>
                 <a:schemeClr val="accent3"/>
               </a:solidFill>
               <a:prstDash val="solid"/>
               <a:round/>
-              <a:headEnd len="sm" w="sm" type="none"/>
-              <a:tailEnd len="sm" w="sm" type="none"/>
+              <a:headEnd type="none" w="sm" len="sm"/>
+              <a:tailEnd type="none" w="sm" len="sm"/>
             </a:ln>
           </p:spPr>
         </p:cxnSp>
@@ -1332,14 +1559,14 @@
               <a:avLst/>
             </a:prstGeom>
             <a:noFill/>
-            <a:ln cap="flat" cmpd="sng" w="9525">
+            <a:ln w="9525" cap="flat" cmpd="sng">
               <a:solidFill>
                 <a:schemeClr val="accent3"/>
               </a:solidFill>
               <a:prstDash val="solid"/>
               <a:round/>
-              <a:headEnd len="sm" w="sm" type="none"/>
-              <a:tailEnd len="sm" w="sm" type="none"/>
+              <a:headEnd type="none" w="sm" len="sm"/>
+              <a:tailEnd type="none" w="sm" len="sm"/>
             </a:ln>
           </p:spPr>
         </p:cxnSp>
@@ -1373,14 +1600,14 @@
               <a:avLst/>
             </a:prstGeom>
             <a:noFill/>
-            <a:ln cap="flat" cmpd="sng" w="76200">
+            <a:ln w="76200" cap="flat" cmpd="sng">
               <a:solidFill>
                 <a:schemeClr val="accent3"/>
               </a:solidFill>
               <a:prstDash val="solid"/>
               <a:round/>
-              <a:headEnd len="sm" w="sm" type="none"/>
-              <a:tailEnd len="sm" w="sm" type="none"/>
+              <a:headEnd type="none" w="sm" len="sm"/>
+              <a:tailEnd type="none" w="sm" len="sm"/>
             </a:ln>
           </p:spPr>
         </p:cxnSp>
@@ -1399,14 +1626,14 @@
               <a:avLst/>
             </a:prstGeom>
             <a:noFill/>
-            <a:ln cap="flat" cmpd="sng" w="9525">
+            <a:ln w="9525" cap="flat" cmpd="sng">
               <a:solidFill>
                 <a:schemeClr val="accent3"/>
               </a:solidFill>
               <a:prstDash val="solid"/>
               <a:round/>
-              <a:headEnd len="sm" w="sm" type="none"/>
-              <a:tailEnd len="sm" w="sm" type="none"/>
+              <a:headEnd type="none" w="sm" len="sm"/>
+              <a:tailEnd type="none" w="sm" len="sm"/>
             </a:ln>
           </p:spPr>
         </p:cxnSp>
@@ -1414,7 +1641,9 @@
       <p:sp>
         <p:nvSpPr>
           <p:cNvPr id="18" name="Google Shape;18;p2"/>
-          <p:cNvSpPr txBox="1"/>
+          <p:cNvSpPr txBox="1">
+            <a:spLocks noGrp="1"/>
+          </p:cNvSpPr>
           <p:nvPr>
             <p:ph type="ctrTitle"/>
           </p:nvPr>
@@ -1429,7 +1658,7 @@
           </a:prstGeom>
         </p:spPr>
         <p:txBody>
-          <a:bodyPr anchorCtr="0" anchor="b" bIns="91425" lIns="91425" spcFirstLastPara="1" rIns="91425" wrap="square" tIns="91425"/>
+          <a:bodyPr spcFirstLastPara="1" wrap="square" lIns="91425" tIns="91425" rIns="91425" bIns="91425" anchor="b" anchorCtr="0"/>
           <a:lstStyle>
             <a:lvl1pPr lvl="0" algn="ctr">
               <a:spcBef>
@@ -1531,15 +1760,19 @@
               <a:defRPr sz="5400"/>
             </a:lvl9pPr>
           </a:lstStyle>
-          <a:p/>
+          <a:p>
+            <a:endParaRPr/>
+          </a:p>
         </p:txBody>
       </p:sp>
       <p:sp>
         <p:nvSpPr>
           <p:cNvPr id="19" name="Google Shape;19;p2"/>
-          <p:cNvSpPr txBox="1"/>
+          <p:cNvSpPr txBox="1">
+            <a:spLocks noGrp="1"/>
+          </p:cNvSpPr>
           <p:nvPr>
-            <p:ph idx="1" type="subTitle"/>
+            <p:ph type="subTitle" idx="1"/>
           </p:nvPr>
         </p:nvSpPr>
         <p:spPr>
@@ -1552,7 +1785,7 @@
           </a:prstGeom>
         </p:spPr>
         <p:txBody>
-          <a:bodyPr anchorCtr="0" anchor="t" bIns="91425" lIns="91425" spcFirstLastPara="1" rIns="91425" wrap="square" tIns="91425"/>
+          <a:bodyPr spcFirstLastPara="1" wrap="square" lIns="91425" tIns="91425" rIns="91425" bIns="91425" anchor="t" anchorCtr="0"/>
           <a:lstStyle>
             <a:lvl1pPr lvl="0" algn="ctr">
               <a:lnSpc>
@@ -1681,15 +1914,19 @@
               <a:defRPr sz="2400"/>
             </a:lvl9pPr>
           </a:lstStyle>
-          <a:p/>
+          <a:p>
+            <a:endParaRPr/>
+          </a:p>
         </p:txBody>
       </p:sp>
       <p:sp>
         <p:nvSpPr>
           <p:cNvPr id="20" name="Google Shape;20;p2"/>
-          <p:cNvSpPr txBox="1"/>
+          <p:cNvSpPr txBox="1">
+            <a:spLocks noGrp="1"/>
+          </p:cNvSpPr>
           <p:nvPr>
-            <p:ph idx="12" type="sldNum"/>
+            <p:ph type="sldNum" idx="12"/>
           </p:nvPr>
         </p:nvSpPr>
         <p:spPr>
@@ -1702,7 +1939,7 @@
           </a:prstGeom>
         </p:spPr>
         <p:txBody>
-          <a:bodyPr anchorCtr="0" anchor="ctr" bIns="91425" lIns="91425" spcFirstLastPara="1" rIns="91425" wrap="square" tIns="91425">
+          <a:bodyPr spcFirstLastPara="1" wrap="square" lIns="91425" tIns="91425" rIns="91425" bIns="91425" anchor="ctr" anchorCtr="0">
             <a:noAutofit/>
           </a:bodyPr>
           <a:lstStyle>
@@ -1744,7 +1981,7 @@
             </a:lvl9pPr>
           </a:lstStyle>
           <a:p>
-            <a:pPr indent="0" lvl="0" marL="0" rtl="0" algn="r">
+            <a:pPr marL="0" lvl="0" indent="0" algn="r" rtl="0">
               <a:spcBef>
                 <a:spcPts val="0"/>
               </a:spcBef>
@@ -1770,11 +2007,11 @@
 </file>
 
 <file path=ppt/slideLayouts/slideLayout10.xml><?xml version="1.0" encoding="utf-8"?>
-<p:sldLayout xmlns:a="http://schemas.openxmlformats.org/drawingml/2006/main" xmlns:r="http://schemas.openxmlformats.org/officeDocument/2006/relationships" xmlns:mc="http://schemas.openxmlformats.org/markup-compatibility/2006" xmlns:mv="urn:schemas-microsoft-com:mac:vml" xmlns:p="http://schemas.openxmlformats.org/presentationml/2006/main" xmlns:c="http://schemas.openxmlformats.org/drawingml/2006/chart" xmlns:dgm="http://schemas.openxmlformats.org/drawingml/2006/diagram" xmlns:o="urn:schemas-microsoft-com:office:office" xmlns:v="urn:schemas-microsoft-com:vml" xmlns:pvml="urn:schemas-microsoft-com:office:powerpoint" xmlns:com="http://schemas.openxmlformats.org/drawingml/2006/compatibility" xmlns:p14="http://schemas.microsoft.com/office/powerpoint/2010/main" xmlns:p15="http://schemas.microsoft.com/office/powerpoint/2012/main" matchingName="Big number">
+<p:sldLayout xmlns:a="http://schemas.openxmlformats.org/drawingml/2006/main" xmlns:r="http://schemas.openxmlformats.org/officeDocument/2006/relationships" xmlns:p="http://schemas.openxmlformats.org/presentationml/2006/main" matchingName="Big number">
   <p:cSld name="BIG_NUMBER">
     <p:spTree>
       <p:nvGrpSpPr>
-        <p:cNvPr id="55" name="Shape 55"/>
+        <p:cNvPr id="1" name="Shape 55"/>
         <p:cNvGrpSpPr/>
         <p:nvPr/>
       </p:nvGrpSpPr>
@@ -1808,12 +2045,12 @@
           </a:ln>
         </p:spPr>
         <p:txBody>
-          <a:bodyPr anchorCtr="0" anchor="ctr" bIns="91425" lIns="91425" spcFirstLastPara="1" rIns="91425" wrap="square" tIns="91425">
+          <a:bodyPr spcFirstLastPara="1" wrap="square" lIns="91425" tIns="91425" rIns="91425" bIns="91425" anchor="ctr" anchorCtr="0">
             <a:noAutofit/>
           </a:bodyPr>
           <a:lstStyle/>
           <a:p>
-            <a:pPr indent="0" lvl="0" marL="0" rtl="0" algn="l">
+            <a:pPr marL="0" lvl="0" indent="0" algn="l" rtl="0">
               <a:spcBef>
                 <a:spcPts val="0"/>
               </a:spcBef>
@@ -1822,9 +2059,6 @@
               </a:spcAft>
               <a:buNone/>
             </a:pPr>
-            <a:r>
-              <a:t/>
-            </a:r>
             <a:endParaRPr/>
           </a:p>
         </p:txBody>
@@ -1832,9 +2066,11 @@
       <p:sp>
         <p:nvSpPr>
           <p:cNvPr id="57" name="Google Shape;57;p11"/>
-          <p:cNvSpPr txBox="1"/>
+          <p:cNvSpPr txBox="1">
+            <a:spLocks noGrp="1"/>
+          </p:cNvSpPr>
           <p:nvPr>
-            <p:ph hasCustomPrompt="1" type="title"/>
+            <p:ph type="title" hasCustomPrompt="1"/>
           </p:nvPr>
         </p:nvSpPr>
         <p:spPr>
@@ -1847,7 +2083,7 @@
           </a:prstGeom>
         </p:spPr>
         <p:txBody>
-          <a:bodyPr anchorCtr="0" anchor="ctr" bIns="91425" lIns="91425" spcFirstLastPara="1" rIns="91425" wrap="square" tIns="91425"/>
+          <a:bodyPr spcFirstLastPara="1" wrap="square" lIns="91425" tIns="91425" rIns="91425" bIns="91425" anchor="ctr" anchorCtr="0"/>
           <a:lstStyle>
             <a:lvl1pPr lvl="0" algn="ctr">
               <a:spcBef>
@@ -2022,9 +2258,11 @@
       <p:sp>
         <p:nvSpPr>
           <p:cNvPr id="58" name="Google Shape;58;p11"/>
-          <p:cNvSpPr txBox="1"/>
+          <p:cNvSpPr txBox="1">
+            <a:spLocks noGrp="1"/>
+          </p:cNvSpPr>
           <p:nvPr>
-            <p:ph idx="1" type="body"/>
+            <p:ph type="body" idx="1"/>
           </p:nvPr>
         </p:nvSpPr>
         <p:spPr>
@@ -2037,9 +2275,9 @@
           </a:prstGeom>
         </p:spPr>
         <p:txBody>
-          <a:bodyPr anchorCtr="0" anchor="t" bIns="91425" lIns="91425" spcFirstLastPara="1" rIns="91425" wrap="square" tIns="91425"/>
+          <a:bodyPr spcFirstLastPara="1" wrap="square" lIns="91425" tIns="91425" rIns="91425" bIns="91425" anchor="t" anchorCtr="0"/>
           <a:lstStyle>
-            <a:lvl1pPr indent="-342900" lvl="0" marL="457200" algn="ctr">
+            <a:lvl1pPr marL="457200" lvl="0" indent="-342900" algn="ctr">
               <a:spcBef>
                 <a:spcPts val="0"/>
               </a:spcBef>
@@ -2050,7 +2288,7 @@
               <a:buChar char="●"/>
               <a:defRPr/>
             </a:lvl1pPr>
-            <a:lvl2pPr indent="-317500" lvl="1" marL="914400" algn="ctr">
+            <a:lvl2pPr marL="914400" lvl="1" indent="-317500" algn="ctr">
               <a:spcBef>
                 <a:spcPts val="1600"/>
               </a:spcBef>
@@ -2061,7 +2299,7 @@
               <a:buChar char="○"/>
               <a:defRPr/>
             </a:lvl2pPr>
-            <a:lvl3pPr indent="-317500" lvl="2" marL="1371600" algn="ctr">
+            <a:lvl3pPr marL="1371600" lvl="2" indent="-317500" algn="ctr">
               <a:spcBef>
                 <a:spcPts val="1600"/>
               </a:spcBef>
@@ -2072,7 +2310,7 @@
               <a:buChar char="■"/>
               <a:defRPr/>
             </a:lvl3pPr>
-            <a:lvl4pPr indent="-317500" lvl="3" marL="1828800" algn="ctr">
+            <a:lvl4pPr marL="1828800" lvl="3" indent="-317500" algn="ctr">
               <a:spcBef>
                 <a:spcPts val="1600"/>
               </a:spcBef>
@@ -2083,7 +2321,7 @@
               <a:buChar char="●"/>
               <a:defRPr/>
             </a:lvl4pPr>
-            <a:lvl5pPr indent="-317500" lvl="4" marL="2286000" algn="ctr">
+            <a:lvl5pPr marL="2286000" lvl="4" indent="-317500" algn="ctr">
               <a:spcBef>
                 <a:spcPts val="1600"/>
               </a:spcBef>
@@ -2094,7 +2332,7 @@
               <a:buChar char="○"/>
               <a:defRPr/>
             </a:lvl5pPr>
-            <a:lvl6pPr indent="-317500" lvl="5" marL="2743200" algn="ctr">
+            <a:lvl6pPr marL="2743200" lvl="5" indent="-317500" algn="ctr">
               <a:spcBef>
                 <a:spcPts val="1600"/>
               </a:spcBef>
@@ -2105,7 +2343,7 @@
               <a:buChar char="■"/>
               <a:defRPr/>
             </a:lvl6pPr>
-            <a:lvl7pPr indent="-317500" lvl="6" marL="3200400" algn="ctr">
+            <a:lvl7pPr marL="3200400" lvl="6" indent="-317500" algn="ctr">
               <a:spcBef>
                 <a:spcPts val="1600"/>
               </a:spcBef>
@@ -2116,7 +2354,7 @@
               <a:buChar char="●"/>
               <a:defRPr/>
             </a:lvl7pPr>
-            <a:lvl8pPr indent="-317500" lvl="7" marL="3657600" algn="ctr">
+            <a:lvl8pPr marL="3657600" lvl="7" indent="-317500" algn="ctr">
               <a:spcBef>
                 <a:spcPts val="1600"/>
               </a:spcBef>
@@ -2127,7 +2365,7 @@
               <a:buChar char="○"/>
               <a:defRPr/>
             </a:lvl8pPr>
-            <a:lvl9pPr indent="-317500" lvl="8" marL="4114800" algn="ctr">
+            <a:lvl9pPr marL="4114800" lvl="8" indent="-317500" algn="ctr">
               <a:spcBef>
                 <a:spcPts val="1600"/>
               </a:spcBef>
@@ -2139,15 +2377,19 @@
               <a:defRPr/>
             </a:lvl9pPr>
           </a:lstStyle>
-          <a:p/>
+          <a:p>
+            <a:endParaRPr/>
+          </a:p>
         </p:txBody>
       </p:sp>
       <p:sp>
         <p:nvSpPr>
           <p:cNvPr id="59" name="Google Shape;59;p11"/>
-          <p:cNvSpPr txBox="1"/>
+          <p:cNvSpPr txBox="1">
+            <a:spLocks noGrp="1"/>
+          </p:cNvSpPr>
           <p:nvPr>
-            <p:ph idx="12" type="sldNum"/>
+            <p:ph type="sldNum" idx="12"/>
           </p:nvPr>
         </p:nvSpPr>
         <p:spPr>
@@ -2160,7 +2402,7 @@
           </a:prstGeom>
         </p:spPr>
         <p:txBody>
-          <a:bodyPr anchorCtr="0" anchor="ctr" bIns="91425" lIns="91425" spcFirstLastPara="1" rIns="91425" wrap="square" tIns="91425">
+          <a:bodyPr spcFirstLastPara="1" wrap="square" lIns="91425" tIns="91425" rIns="91425" bIns="91425" anchor="ctr" anchorCtr="0">
             <a:noAutofit/>
           </a:bodyPr>
           <a:lstStyle>
@@ -2202,7 +2444,7 @@
             </a:lvl9pPr>
           </a:lstStyle>
           <a:p>
-            <a:pPr indent="0" lvl="0" marL="0" rtl="0" algn="r">
+            <a:pPr marL="0" lvl="0" indent="0" algn="r" rtl="0">
               <a:spcBef>
                 <a:spcPts val="0"/>
               </a:spcBef>
@@ -2228,11 +2470,11 @@
 </file>
 
 <file path=ppt/slideLayouts/slideLayout11.xml><?xml version="1.0" encoding="utf-8"?>
-<p:sldLayout xmlns:a="http://schemas.openxmlformats.org/drawingml/2006/main" xmlns:r="http://schemas.openxmlformats.org/officeDocument/2006/relationships" xmlns:mc="http://schemas.openxmlformats.org/markup-compatibility/2006" xmlns:mv="urn:schemas-microsoft-com:mac:vml" xmlns:p="http://schemas.openxmlformats.org/presentationml/2006/main" xmlns:c="http://schemas.openxmlformats.org/drawingml/2006/chart" xmlns:dgm="http://schemas.openxmlformats.org/drawingml/2006/diagram" xmlns:o="urn:schemas-microsoft-com:office:office" xmlns:v="urn:schemas-microsoft-com:vml" xmlns:pvml="urn:schemas-microsoft-com:office:powerpoint" xmlns:com="http://schemas.openxmlformats.org/drawingml/2006/compatibility" xmlns:p14="http://schemas.microsoft.com/office/powerpoint/2010/main" xmlns:p15="http://schemas.microsoft.com/office/powerpoint/2012/main" matchingName="Blank" type="blank">
+<p:sldLayout xmlns:a="http://schemas.openxmlformats.org/drawingml/2006/main" xmlns:r="http://schemas.openxmlformats.org/officeDocument/2006/relationships" xmlns:p="http://schemas.openxmlformats.org/presentationml/2006/main" matchingName="Blank" type="blank">
   <p:cSld name="BLANK">
     <p:spTree>
       <p:nvGrpSpPr>
-        <p:cNvPr id="60" name="Shape 60"/>
+        <p:cNvPr id="1" name="Shape 60"/>
         <p:cNvGrpSpPr/>
         <p:nvPr/>
       </p:nvGrpSpPr>
@@ -2247,9 +2489,11 @@
       <p:sp>
         <p:nvSpPr>
           <p:cNvPr id="61" name="Google Shape;61;p12"/>
-          <p:cNvSpPr txBox="1"/>
+          <p:cNvSpPr txBox="1">
+            <a:spLocks noGrp="1"/>
+          </p:cNvSpPr>
           <p:nvPr>
-            <p:ph idx="12" type="sldNum"/>
+            <p:ph type="sldNum" idx="12"/>
           </p:nvPr>
         </p:nvSpPr>
         <p:spPr>
@@ -2262,7 +2506,7 @@
           </a:prstGeom>
         </p:spPr>
         <p:txBody>
-          <a:bodyPr anchorCtr="0" anchor="ctr" bIns="91425" lIns="91425" spcFirstLastPara="1" rIns="91425" wrap="square" tIns="91425">
+          <a:bodyPr spcFirstLastPara="1" wrap="square" lIns="91425" tIns="91425" rIns="91425" bIns="91425" anchor="ctr" anchorCtr="0">
             <a:noAutofit/>
           </a:bodyPr>
           <a:lstStyle>
@@ -2304,7 +2548,7 @@
             </a:lvl9pPr>
           </a:lstStyle>
           <a:p>
-            <a:pPr indent="0" lvl="0" marL="0" rtl="0" algn="r">
+            <a:pPr marL="0" lvl="0" indent="0" algn="r" rtl="0">
               <a:spcBef>
                 <a:spcPts val="0"/>
               </a:spcBef>
@@ -2330,11 +2574,11 @@
 </file>
 
 <file path=ppt/slideLayouts/slideLayout2.xml><?xml version="1.0" encoding="utf-8"?>
-<p:sldLayout xmlns:a="http://schemas.openxmlformats.org/drawingml/2006/main" xmlns:r="http://schemas.openxmlformats.org/officeDocument/2006/relationships" xmlns:mc="http://schemas.openxmlformats.org/markup-compatibility/2006" xmlns:mv="urn:schemas-microsoft-com:mac:vml" xmlns:p="http://schemas.openxmlformats.org/presentationml/2006/main" xmlns:c="http://schemas.openxmlformats.org/drawingml/2006/chart" xmlns:dgm="http://schemas.openxmlformats.org/drawingml/2006/diagram" xmlns:o="urn:schemas-microsoft-com:office:office" xmlns:v="urn:schemas-microsoft-com:vml" xmlns:pvml="urn:schemas-microsoft-com:office:powerpoint" xmlns:com="http://schemas.openxmlformats.org/drawingml/2006/compatibility" xmlns:p14="http://schemas.microsoft.com/office/powerpoint/2010/main" xmlns:p15="http://schemas.microsoft.com/office/powerpoint/2012/main" matchingName="Section header" type="secHead">
+<p:sldLayout xmlns:a="http://schemas.openxmlformats.org/drawingml/2006/main" xmlns:r="http://schemas.openxmlformats.org/officeDocument/2006/relationships" xmlns:p="http://schemas.openxmlformats.org/presentationml/2006/main" matchingName="Section header" type="secHead">
   <p:cSld name="SECTION_HEADER">
     <p:spTree>
       <p:nvGrpSpPr>
-        <p:cNvPr id="21" name="Shape 21"/>
+        <p:cNvPr id="1" name="Shape 21"/>
         <p:cNvGrpSpPr/>
         <p:nvPr/>
       </p:nvGrpSpPr>
@@ -2368,12 +2612,12 @@
           </a:ln>
         </p:spPr>
         <p:txBody>
-          <a:bodyPr anchorCtr="0" anchor="ctr" bIns="91425" lIns="91425" spcFirstLastPara="1" rIns="91425" wrap="square" tIns="91425">
+          <a:bodyPr spcFirstLastPara="1" wrap="square" lIns="91425" tIns="91425" rIns="91425" bIns="91425" anchor="ctr" anchorCtr="0">
             <a:noAutofit/>
           </a:bodyPr>
           <a:lstStyle/>
           <a:p>
-            <a:pPr indent="0" lvl="0" marL="0" rtl="0" algn="l">
+            <a:pPr marL="0" lvl="0" indent="0" algn="l" rtl="0">
               <a:spcBef>
                 <a:spcPts val="0"/>
               </a:spcBef>
@@ -2382,9 +2626,6 @@
               </a:spcAft>
               <a:buNone/>
             </a:pPr>
-            <a:r>
-              <a:t/>
-            </a:r>
             <a:endParaRPr/>
           </a:p>
         </p:txBody>
@@ -2392,7 +2633,9 @@
       <p:sp>
         <p:nvSpPr>
           <p:cNvPr id="23" name="Google Shape;23;p3"/>
-          <p:cNvSpPr txBox="1"/>
+          <p:cNvSpPr txBox="1">
+            <a:spLocks noGrp="1"/>
+          </p:cNvSpPr>
           <p:nvPr>
             <p:ph type="title"/>
           </p:nvPr>
@@ -2407,7 +2650,7 @@
           </a:prstGeom>
         </p:spPr>
         <p:txBody>
-          <a:bodyPr anchorCtr="0" anchor="ctr" bIns="91425" lIns="91425" spcFirstLastPara="1" rIns="91425" wrap="square" tIns="91425"/>
+          <a:bodyPr spcFirstLastPara="1" wrap="square" lIns="91425" tIns="91425" rIns="91425" bIns="91425" anchor="ctr" anchorCtr="0"/>
           <a:lstStyle>
             <a:lvl1pPr lvl="0" algn="ctr">
               <a:spcBef>
@@ -2509,15 +2752,19 @@
               <a:defRPr/>
             </a:lvl9pPr>
           </a:lstStyle>
-          <a:p/>
+          <a:p>
+            <a:endParaRPr/>
+          </a:p>
         </p:txBody>
       </p:sp>
       <p:sp>
         <p:nvSpPr>
           <p:cNvPr id="24" name="Google Shape;24;p3"/>
-          <p:cNvSpPr txBox="1"/>
+          <p:cNvSpPr txBox="1">
+            <a:spLocks noGrp="1"/>
+          </p:cNvSpPr>
           <p:nvPr>
-            <p:ph idx="12" type="sldNum"/>
+            <p:ph type="sldNum" idx="12"/>
           </p:nvPr>
         </p:nvSpPr>
         <p:spPr>
@@ -2530,7 +2777,7 @@
           </a:prstGeom>
         </p:spPr>
         <p:txBody>
-          <a:bodyPr anchorCtr="0" anchor="ctr" bIns="91425" lIns="91425" spcFirstLastPara="1" rIns="91425" wrap="square" tIns="91425">
+          <a:bodyPr spcFirstLastPara="1" wrap="square" lIns="91425" tIns="91425" rIns="91425" bIns="91425" anchor="ctr" anchorCtr="0">
             <a:noAutofit/>
           </a:bodyPr>
           <a:lstStyle>
@@ -2608,7 +2855,7 @@
             </a:lvl9pPr>
           </a:lstStyle>
           <a:p>
-            <a:pPr indent="0" lvl="0" marL="0" rtl="0" algn="r">
+            <a:pPr marL="0" lvl="0" indent="0" algn="r" rtl="0">
               <a:spcBef>
                 <a:spcPts val="0"/>
               </a:spcBef>
@@ -2634,11 +2881,11 @@
 </file>
 
 <file path=ppt/slideLayouts/slideLayout3.xml><?xml version="1.0" encoding="utf-8"?>
-<p:sldLayout xmlns:a="http://schemas.openxmlformats.org/drawingml/2006/main" xmlns:r="http://schemas.openxmlformats.org/officeDocument/2006/relationships" xmlns:mc="http://schemas.openxmlformats.org/markup-compatibility/2006" xmlns:mv="urn:schemas-microsoft-com:mac:vml" xmlns:p="http://schemas.openxmlformats.org/presentationml/2006/main" xmlns:c="http://schemas.openxmlformats.org/drawingml/2006/chart" xmlns:dgm="http://schemas.openxmlformats.org/drawingml/2006/diagram" xmlns:o="urn:schemas-microsoft-com:office:office" xmlns:v="urn:schemas-microsoft-com:vml" xmlns:pvml="urn:schemas-microsoft-com:office:powerpoint" xmlns:com="http://schemas.openxmlformats.org/drawingml/2006/compatibility" xmlns:p14="http://schemas.microsoft.com/office/powerpoint/2010/main" xmlns:p15="http://schemas.microsoft.com/office/powerpoint/2012/main" matchingName="Title and body" type="tx">
+<p:sldLayout xmlns:a="http://schemas.openxmlformats.org/drawingml/2006/main" xmlns:r="http://schemas.openxmlformats.org/officeDocument/2006/relationships" xmlns:p="http://schemas.openxmlformats.org/presentationml/2006/main" matchingName="Title and body" type="tx">
   <p:cSld name="TITLE_AND_BODY">
     <p:spTree>
       <p:nvGrpSpPr>
-        <p:cNvPr id="25" name="Shape 25"/>
+        <p:cNvPr id="1" name="Shape 25"/>
         <p:cNvGrpSpPr/>
         <p:nvPr/>
       </p:nvGrpSpPr>
@@ -2672,12 +2919,12 @@
           </a:ln>
         </p:spPr>
         <p:txBody>
-          <a:bodyPr anchorCtr="0" anchor="ctr" bIns="91425" lIns="91425" spcFirstLastPara="1" rIns="91425" wrap="square" tIns="91425">
+          <a:bodyPr spcFirstLastPara="1" wrap="square" lIns="91425" tIns="91425" rIns="91425" bIns="91425" anchor="ctr" anchorCtr="0">
             <a:noAutofit/>
           </a:bodyPr>
           <a:lstStyle/>
           <a:p>
-            <a:pPr indent="0" lvl="0" marL="0" rtl="0" algn="l">
+            <a:pPr marL="0" lvl="0" indent="0" algn="l" rtl="0">
               <a:spcBef>
                 <a:spcPts val="0"/>
               </a:spcBef>
@@ -2686,9 +2933,6 @@
               </a:spcAft>
               <a:buNone/>
             </a:pPr>
-            <a:r>
-              <a:t/>
-            </a:r>
             <a:endParaRPr/>
           </a:p>
         </p:txBody>
@@ -2696,7 +2940,9 @@
       <p:sp>
         <p:nvSpPr>
           <p:cNvPr id="27" name="Google Shape;27;p4"/>
-          <p:cNvSpPr txBox="1"/>
+          <p:cNvSpPr txBox="1">
+            <a:spLocks noGrp="1"/>
+          </p:cNvSpPr>
           <p:nvPr>
             <p:ph type="title"/>
           </p:nvPr>
@@ -2711,7 +2957,7 @@
           </a:prstGeom>
         </p:spPr>
         <p:txBody>
-          <a:bodyPr anchorCtr="0" anchor="t" bIns="91425" lIns="91425" spcFirstLastPara="1" rIns="91425" wrap="square" tIns="91425"/>
+          <a:bodyPr spcFirstLastPara="1" wrap="square" lIns="91425" tIns="91425" rIns="91425" bIns="91425" anchor="t" anchorCtr="0"/>
           <a:lstStyle>
             <a:lvl1pPr lvl="0">
               <a:spcBef>
@@ -2813,15 +3059,19 @@
               <a:defRPr/>
             </a:lvl9pPr>
           </a:lstStyle>
-          <a:p/>
+          <a:p>
+            <a:endParaRPr/>
+          </a:p>
         </p:txBody>
       </p:sp>
       <p:sp>
         <p:nvSpPr>
           <p:cNvPr id="28" name="Google Shape;28;p4"/>
-          <p:cNvSpPr txBox="1"/>
+          <p:cNvSpPr txBox="1">
+            <a:spLocks noGrp="1"/>
+          </p:cNvSpPr>
           <p:nvPr>
-            <p:ph idx="1" type="body"/>
+            <p:ph type="body" idx="1"/>
           </p:nvPr>
         </p:nvSpPr>
         <p:spPr>
@@ -2834,9 +3084,9 @@
           </a:prstGeom>
         </p:spPr>
         <p:txBody>
-          <a:bodyPr anchorCtr="0" anchor="t" bIns="91425" lIns="91425" spcFirstLastPara="1" rIns="91425" wrap="square" tIns="91425"/>
+          <a:bodyPr spcFirstLastPara="1" wrap="square" lIns="91425" tIns="91425" rIns="91425" bIns="91425" anchor="t" anchorCtr="0"/>
           <a:lstStyle>
-            <a:lvl1pPr indent="-342900" lvl="0" marL="457200">
+            <a:lvl1pPr marL="457200" lvl="0" indent="-342900">
               <a:spcBef>
                 <a:spcPts val="0"/>
               </a:spcBef>
@@ -2847,7 +3097,7 @@
               <a:buChar char="●"/>
               <a:defRPr/>
             </a:lvl1pPr>
-            <a:lvl2pPr indent="-317500" lvl="1" marL="914400">
+            <a:lvl2pPr marL="914400" lvl="1" indent="-317500">
               <a:spcBef>
                 <a:spcPts val="1600"/>
               </a:spcBef>
@@ -2858,7 +3108,7 @@
               <a:buChar char="○"/>
               <a:defRPr/>
             </a:lvl2pPr>
-            <a:lvl3pPr indent="-317500" lvl="2" marL="1371600">
+            <a:lvl3pPr marL="1371600" lvl="2" indent="-317500">
               <a:spcBef>
                 <a:spcPts val="1600"/>
               </a:spcBef>
@@ -2869,7 +3119,7 @@
               <a:buChar char="■"/>
               <a:defRPr/>
             </a:lvl3pPr>
-            <a:lvl4pPr indent="-317500" lvl="3" marL="1828800">
+            <a:lvl4pPr marL="1828800" lvl="3" indent="-317500">
               <a:spcBef>
                 <a:spcPts val="1600"/>
               </a:spcBef>
@@ -2880,7 +3130,7 @@
               <a:buChar char="●"/>
               <a:defRPr/>
             </a:lvl4pPr>
-            <a:lvl5pPr indent="-317500" lvl="4" marL="2286000">
+            <a:lvl5pPr marL="2286000" lvl="4" indent="-317500">
               <a:spcBef>
                 <a:spcPts val="1600"/>
               </a:spcBef>
@@ -2891,7 +3141,7 @@
               <a:buChar char="○"/>
               <a:defRPr/>
             </a:lvl5pPr>
-            <a:lvl6pPr indent="-317500" lvl="5" marL="2743200">
+            <a:lvl6pPr marL="2743200" lvl="5" indent="-317500">
               <a:spcBef>
                 <a:spcPts val="1600"/>
               </a:spcBef>
@@ -2902,7 +3152,7 @@
               <a:buChar char="■"/>
               <a:defRPr/>
             </a:lvl6pPr>
-            <a:lvl7pPr indent="-317500" lvl="6" marL="3200400">
+            <a:lvl7pPr marL="3200400" lvl="6" indent="-317500">
               <a:spcBef>
                 <a:spcPts val="1600"/>
               </a:spcBef>
@@ -2913,7 +3163,7 @@
               <a:buChar char="●"/>
               <a:defRPr/>
             </a:lvl7pPr>
-            <a:lvl8pPr indent="-317500" lvl="7" marL="3657600">
+            <a:lvl8pPr marL="3657600" lvl="7" indent="-317500">
               <a:spcBef>
                 <a:spcPts val="1600"/>
               </a:spcBef>
@@ -2924,7 +3174,7 @@
               <a:buChar char="○"/>
               <a:defRPr/>
             </a:lvl8pPr>
-            <a:lvl9pPr indent="-317500" lvl="8" marL="4114800">
+            <a:lvl9pPr marL="4114800" lvl="8" indent="-317500">
               <a:spcBef>
                 <a:spcPts val="1600"/>
               </a:spcBef>
@@ -2936,15 +3186,19 @@
               <a:defRPr/>
             </a:lvl9pPr>
           </a:lstStyle>
-          <a:p/>
+          <a:p>
+            <a:endParaRPr/>
+          </a:p>
         </p:txBody>
       </p:sp>
       <p:sp>
         <p:nvSpPr>
           <p:cNvPr id="29" name="Google Shape;29;p4"/>
-          <p:cNvSpPr txBox="1"/>
+          <p:cNvSpPr txBox="1">
+            <a:spLocks noGrp="1"/>
+          </p:cNvSpPr>
           <p:nvPr>
-            <p:ph idx="12" type="sldNum"/>
+            <p:ph type="sldNum" idx="12"/>
           </p:nvPr>
         </p:nvSpPr>
         <p:spPr>
@@ -2957,7 +3211,7 @@
           </a:prstGeom>
         </p:spPr>
         <p:txBody>
-          <a:bodyPr anchorCtr="0" anchor="ctr" bIns="91425" lIns="91425" spcFirstLastPara="1" rIns="91425" wrap="square" tIns="91425">
+          <a:bodyPr spcFirstLastPara="1" wrap="square" lIns="91425" tIns="91425" rIns="91425" bIns="91425" anchor="ctr" anchorCtr="0">
             <a:noAutofit/>
           </a:bodyPr>
           <a:lstStyle>
@@ -2999,7 +3253,7 @@
             </a:lvl9pPr>
           </a:lstStyle>
           <a:p>
-            <a:pPr indent="0" lvl="0" marL="0" rtl="0" algn="r">
+            <a:pPr marL="0" lvl="0" indent="0" algn="r" rtl="0">
               <a:spcBef>
                 <a:spcPts val="0"/>
               </a:spcBef>
@@ -3025,11 +3279,11 @@
 </file>
 
 <file path=ppt/slideLayouts/slideLayout4.xml><?xml version="1.0" encoding="utf-8"?>
-<p:sldLayout xmlns:a="http://schemas.openxmlformats.org/drawingml/2006/main" xmlns:r="http://schemas.openxmlformats.org/officeDocument/2006/relationships" xmlns:mc="http://schemas.openxmlformats.org/markup-compatibility/2006" xmlns:mv="urn:schemas-microsoft-com:mac:vml" xmlns:p="http://schemas.openxmlformats.org/presentationml/2006/main" xmlns:c="http://schemas.openxmlformats.org/drawingml/2006/chart" xmlns:dgm="http://schemas.openxmlformats.org/drawingml/2006/diagram" xmlns:o="urn:schemas-microsoft-com:office:office" xmlns:v="urn:schemas-microsoft-com:vml" xmlns:pvml="urn:schemas-microsoft-com:office:powerpoint" xmlns:com="http://schemas.openxmlformats.org/drawingml/2006/compatibility" xmlns:p14="http://schemas.microsoft.com/office/powerpoint/2010/main" xmlns:p15="http://schemas.microsoft.com/office/powerpoint/2012/main" matchingName="Title and two columns" type="twoColTx">
+<p:sldLayout xmlns:a="http://schemas.openxmlformats.org/drawingml/2006/main" xmlns:r="http://schemas.openxmlformats.org/officeDocument/2006/relationships" xmlns:p="http://schemas.openxmlformats.org/presentationml/2006/main" matchingName="Title and two columns" type="twoColTx">
   <p:cSld name="TITLE_AND_TWO_COLUMNS">
     <p:spTree>
       <p:nvGrpSpPr>
-        <p:cNvPr id="30" name="Shape 30"/>
+        <p:cNvPr id="1" name="Shape 30"/>
         <p:cNvGrpSpPr/>
         <p:nvPr/>
       </p:nvGrpSpPr>
@@ -3044,7 +3298,9 @@
       <p:sp>
         <p:nvSpPr>
           <p:cNvPr id="31" name="Google Shape;31;p5"/>
-          <p:cNvSpPr txBox="1"/>
+          <p:cNvSpPr txBox="1">
+            <a:spLocks noGrp="1"/>
+          </p:cNvSpPr>
           <p:nvPr>
             <p:ph type="title"/>
           </p:nvPr>
@@ -3059,7 +3315,7 @@
           </a:prstGeom>
         </p:spPr>
         <p:txBody>
-          <a:bodyPr anchorCtr="0" anchor="t" bIns="91425" lIns="91425" spcFirstLastPara="1" rIns="91425" wrap="square" tIns="91425"/>
+          <a:bodyPr spcFirstLastPara="1" wrap="square" lIns="91425" tIns="91425" rIns="91425" bIns="91425" anchor="t" anchorCtr="0"/>
           <a:lstStyle>
             <a:lvl1pPr lvl="0">
               <a:spcBef>
@@ -3161,15 +3417,19 @@
               <a:defRPr/>
             </a:lvl9pPr>
           </a:lstStyle>
-          <a:p/>
+          <a:p>
+            <a:endParaRPr/>
+          </a:p>
         </p:txBody>
       </p:sp>
       <p:sp>
         <p:nvSpPr>
           <p:cNvPr id="32" name="Google Shape;32;p5"/>
-          <p:cNvSpPr txBox="1"/>
+          <p:cNvSpPr txBox="1">
+            <a:spLocks noGrp="1"/>
+          </p:cNvSpPr>
           <p:nvPr>
-            <p:ph idx="1" type="body"/>
+            <p:ph type="body" idx="1"/>
           </p:nvPr>
         </p:nvSpPr>
         <p:spPr>
@@ -3182,9 +3442,9 @@
           </a:prstGeom>
         </p:spPr>
         <p:txBody>
-          <a:bodyPr anchorCtr="0" anchor="t" bIns="91425" lIns="91425" spcFirstLastPara="1" rIns="91425" wrap="square" tIns="91425"/>
+          <a:bodyPr spcFirstLastPara="1" wrap="square" lIns="91425" tIns="91425" rIns="91425" bIns="91425" anchor="t" anchorCtr="0"/>
           <a:lstStyle>
-            <a:lvl1pPr indent="-317500" lvl="0" marL="457200">
+            <a:lvl1pPr marL="457200" lvl="0" indent="-317500">
               <a:spcBef>
                 <a:spcPts val="0"/>
               </a:spcBef>
@@ -3195,7 +3455,7 @@
               <a:buChar char="●"/>
               <a:defRPr sz="1400"/>
             </a:lvl1pPr>
-            <a:lvl2pPr indent="-304800" lvl="1" marL="914400">
+            <a:lvl2pPr marL="914400" lvl="1" indent="-304800">
               <a:spcBef>
                 <a:spcPts val="1600"/>
               </a:spcBef>
@@ -3206,7 +3466,7 @@
               <a:buChar char="○"/>
               <a:defRPr sz="1200"/>
             </a:lvl2pPr>
-            <a:lvl3pPr indent="-304800" lvl="2" marL="1371600">
+            <a:lvl3pPr marL="1371600" lvl="2" indent="-304800">
               <a:spcBef>
                 <a:spcPts val="1600"/>
               </a:spcBef>
@@ -3217,7 +3477,7 @@
               <a:buChar char="■"/>
               <a:defRPr sz="1200"/>
             </a:lvl3pPr>
-            <a:lvl4pPr indent="-304800" lvl="3" marL="1828800">
+            <a:lvl4pPr marL="1828800" lvl="3" indent="-304800">
               <a:spcBef>
                 <a:spcPts val="1600"/>
               </a:spcBef>
@@ -3228,7 +3488,7 @@
               <a:buChar char="●"/>
               <a:defRPr sz="1200"/>
             </a:lvl4pPr>
-            <a:lvl5pPr indent="-304800" lvl="4" marL="2286000">
+            <a:lvl5pPr marL="2286000" lvl="4" indent="-304800">
               <a:spcBef>
                 <a:spcPts val="1600"/>
               </a:spcBef>
@@ -3239,7 +3499,7 @@
               <a:buChar char="○"/>
               <a:defRPr sz="1200"/>
             </a:lvl5pPr>
-            <a:lvl6pPr indent="-304800" lvl="5" marL="2743200">
+            <a:lvl6pPr marL="2743200" lvl="5" indent="-304800">
               <a:spcBef>
                 <a:spcPts val="1600"/>
               </a:spcBef>
@@ -3250,7 +3510,7 @@
               <a:buChar char="■"/>
               <a:defRPr sz="1200"/>
             </a:lvl6pPr>
-            <a:lvl7pPr indent="-304800" lvl="6" marL="3200400">
+            <a:lvl7pPr marL="3200400" lvl="6" indent="-304800">
               <a:spcBef>
                 <a:spcPts val="1600"/>
               </a:spcBef>
@@ -3261,7 +3521,7 @@
               <a:buChar char="●"/>
               <a:defRPr sz="1200"/>
             </a:lvl7pPr>
-            <a:lvl8pPr indent="-304800" lvl="7" marL="3657600">
+            <a:lvl8pPr marL="3657600" lvl="7" indent="-304800">
               <a:spcBef>
                 <a:spcPts val="1600"/>
               </a:spcBef>
@@ -3272,7 +3532,7 @@
               <a:buChar char="○"/>
               <a:defRPr sz="1200"/>
             </a:lvl8pPr>
-            <a:lvl9pPr indent="-304800" lvl="8" marL="4114800">
+            <a:lvl9pPr marL="4114800" lvl="8" indent="-304800">
               <a:spcBef>
                 <a:spcPts val="1600"/>
               </a:spcBef>
@@ -3284,15 +3544,19 @@
               <a:defRPr sz="1200"/>
             </a:lvl9pPr>
           </a:lstStyle>
-          <a:p/>
+          <a:p>
+            <a:endParaRPr/>
+          </a:p>
         </p:txBody>
       </p:sp>
       <p:sp>
         <p:nvSpPr>
           <p:cNvPr id="33" name="Google Shape;33;p5"/>
-          <p:cNvSpPr txBox="1"/>
+          <p:cNvSpPr txBox="1">
+            <a:spLocks noGrp="1"/>
+          </p:cNvSpPr>
           <p:nvPr>
-            <p:ph idx="2" type="body"/>
+            <p:ph type="body" idx="2"/>
           </p:nvPr>
         </p:nvSpPr>
         <p:spPr>
@@ -3305,9 +3569,9 @@
           </a:prstGeom>
         </p:spPr>
         <p:txBody>
-          <a:bodyPr anchorCtr="0" anchor="t" bIns="91425" lIns="91425" spcFirstLastPara="1" rIns="91425" wrap="square" tIns="91425"/>
+          <a:bodyPr spcFirstLastPara="1" wrap="square" lIns="91425" tIns="91425" rIns="91425" bIns="91425" anchor="t" anchorCtr="0"/>
           <a:lstStyle>
-            <a:lvl1pPr indent="-317500" lvl="0" marL="457200">
+            <a:lvl1pPr marL="457200" lvl="0" indent="-317500">
               <a:spcBef>
                 <a:spcPts val="0"/>
               </a:spcBef>
@@ -3318,7 +3582,7 @@
               <a:buChar char="●"/>
               <a:defRPr sz="1400"/>
             </a:lvl1pPr>
-            <a:lvl2pPr indent="-304800" lvl="1" marL="914400">
+            <a:lvl2pPr marL="914400" lvl="1" indent="-304800">
               <a:spcBef>
                 <a:spcPts val="1600"/>
               </a:spcBef>
@@ -3329,7 +3593,7 @@
               <a:buChar char="○"/>
               <a:defRPr sz="1200"/>
             </a:lvl2pPr>
-            <a:lvl3pPr indent="-304800" lvl="2" marL="1371600">
+            <a:lvl3pPr marL="1371600" lvl="2" indent="-304800">
               <a:spcBef>
                 <a:spcPts val="1600"/>
               </a:spcBef>
@@ -3340,7 +3604,7 @@
               <a:buChar char="■"/>
               <a:defRPr sz="1200"/>
             </a:lvl3pPr>
-            <a:lvl4pPr indent="-304800" lvl="3" marL="1828800">
+            <a:lvl4pPr marL="1828800" lvl="3" indent="-304800">
               <a:spcBef>
                 <a:spcPts val="1600"/>
               </a:spcBef>
@@ -3351,7 +3615,7 @@
               <a:buChar char="●"/>
               <a:defRPr sz="1200"/>
             </a:lvl4pPr>
-            <a:lvl5pPr indent="-304800" lvl="4" marL="2286000">
+            <a:lvl5pPr marL="2286000" lvl="4" indent="-304800">
               <a:spcBef>
                 <a:spcPts val="1600"/>
               </a:spcBef>
@@ -3362,7 +3626,7 @@
               <a:buChar char="○"/>
               <a:defRPr sz="1200"/>
             </a:lvl5pPr>
-            <a:lvl6pPr indent="-304800" lvl="5" marL="2743200">
+            <a:lvl6pPr marL="2743200" lvl="5" indent="-304800">
               <a:spcBef>
                 <a:spcPts val="1600"/>
               </a:spcBef>
@@ -3373,7 +3637,7 @@
               <a:buChar char="■"/>
               <a:defRPr sz="1200"/>
             </a:lvl6pPr>
-            <a:lvl7pPr indent="-304800" lvl="6" marL="3200400">
+            <a:lvl7pPr marL="3200400" lvl="6" indent="-304800">
               <a:spcBef>
                 <a:spcPts val="1600"/>
               </a:spcBef>
@@ -3384,7 +3648,7 @@
               <a:buChar char="●"/>
               <a:defRPr sz="1200"/>
             </a:lvl7pPr>
-            <a:lvl8pPr indent="-304800" lvl="7" marL="3657600">
+            <a:lvl8pPr marL="3657600" lvl="7" indent="-304800">
               <a:spcBef>
                 <a:spcPts val="1600"/>
               </a:spcBef>
@@ -3395,7 +3659,7 @@
               <a:buChar char="○"/>
               <a:defRPr sz="1200"/>
             </a:lvl8pPr>
-            <a:lvl9pPr indent="-304800" lvl="8" marL="4114800">
+            <a:lvl9pPr marL="4114800" lvl="8" indent="-304800">
               <a:spcBef>
                 <a:spcPts val="1600"/>
               </a:spcBef>
@@ -3407,15 +3671,19 @@
               <a:defRPr sz="1200"/>
             </a:lvl9pPr>
           </a:lstStyle>
-          <a:p/>
+          <a:p>
+            <a:endParaRPr/>
+          </a:p>
         </p:txBody>
       </p:sp>
       <p:sp>
         <p:nvSpPr>
           <p:cNvPr id="34" name="Google Shape;34;p5"/>
-          <p:cNvSpPr txBox="1"/>
+          <p:cNvSpPr txBox="1">
+            <a:spLocks noGrp="1"/>
+          </p:cNvSpPr>
           <p:nvPr>
-            <p:ph idx="12" type="sldNum"/>
+            <p:ph type="sldNum" idx="12"/>
           </p:nvPr>
         </p:nvSpPr>
         <p:spPr>
@@ -3428,7 +3696,7 @@
           </a:prstGeom>
         </p:spPr>
         <p:txBody>
-          <a:bodyPr anchorCtr="0" anchor="ctr" bIns="91425" lIns="91425" spcFirstLastPara="1" rIns="91425" wrap="square" tIns="91425">
+          <a:bodyPr spcFirstLastPara="1" wrap="square" lIns="91425" tIns="91425" rIns="91425" bIns="91425" anchor="ctr" anchorCtr="0">
             <a:noAutofit/>
           </a:bodyPr>
           <a:lstStyle>
@@ -3470,7 +3738,7 @@
             </a:lvl9pPr>
           </a:lstStyle>
           <a:p>
-            <a:pPr indent="0" lvl="0" marL="0" rtl="0" algn="r">
+            <a:pPr marL="0" lvl="0" indent="0" algn="r" rtl="0">
               <a:spcBef>
                 <a:spcPts val="0"/>
               </a:spcBef>
@@ -3496,11 +3764,11 @@
 </file>
 
 <file path=ppt/slideLayouts/slideLayout5.xml><?xml version="1.0" encoding="utf-8"?>
-<p:sldLayout xmlns:a="http://schemas.openxmlformats.org/drawingml/2006/main" xmlns:r="http://schemas.openxmlformats.org/officeDocument/2006/relationships" xmlns:mc="http://schemas.openxmlformats.org/markup-compatibility/2006" xmlns:mv="urn:schemas-microsoft-com:mac:vml" xmlns:p="http://schemas.openxmlformats.org/presentationml/2006/main" xmlns:c="http://schemas.openxmlformats.org/drawingml/2006/chart" xmlns:dgm="http://schemas.openxmlformats.org/drawingml/2006/diagram" xmlns:o="urn:schemas-microsoft-com:office:office" xmlns:v="urn:schemas-microsoft-com:vml" xmlns:pvml="urn:schemas-microsoft-com:office:powerpoint" xmlns:com="http://schemas.openxmlformats.org/drawingml/2006/compatibility" xmlns:p14="http://schemas.microsoft.com/office/powerpoint/2010/main" xmlns:p15="http://schemas.microsoft.com/office/powerpoint/2012/main" matchingName="Title only" type="titleOnly">
+<p:sldLayout xmlns:a="http://schemas.openxmlformats.org/drawingml/2006/main" xmlns:r="http://schemas.openxmlformats.org/officeDocument/2006/relationships" xmlns:p="http://schemas.openxmlformats.org/presentationml/2006/main" matchingName="Title only" type="titleOnly">
   <p:cSld name="TITLE_ONLY">
     <p:spTree>
       <p:nvGrpSpPr>
-        <p:cNvPr id="35" name="Shape 35"/>
+        <p:cNvPr id="1" name="Shape 35"/>
         <p:cNvGrpSpPr/>
         <p:nvPr/>
       </p:nvGrpSpPr>
@@ -3515,7 +3783,9 @@
       <p:sp>
         <p:nvSpPr>
           <p:cNvPr id="36" name="Google Shape;36;p6"/>
-          <p:cNvSpPr txBox="1"/>
+          <p:cNvSpPr txBox="1">
+            <a:spLocks noGrp="1"/>
+          </p:cNvSpPr>
           <p:nvPr>
             <p:ph type="title"/>
           </p:nvPr>
@@ -3530,7 +3800,7 @@
           </a:prstGeom>
         </p:spPr>
         <p:txBody>
-          <a:bodyPr anchorCtr="0" anchor="t" bIns="91425" lIns="91425" spcFirstLastPara="1" rIns="91425" wrap="square" tIns="91425"/>
+          <a:bodyPr spcFirstLastPara="1" wrap="square" lIns="91425" tIns="91425" rIns="91425" bIns="91425" anchor="t" anchorCtr="0"/>
           <a:lstStyle>
             <a:lvl1pPr lvl="0">
               <a:spcBef>
@@ -3632,15 +3902,19 @@
               <a:defRPr/>
             </a:lvl9pPr>
           </a:lstStyle>
-          <a:p/>
+          <a:p>
+            <a:endParaRPr/>
+          </a:p>
         </p:txBody>
       </p:sp>
       <p:sp>
         <p:nvSpPr>
           <p:cNvPr id="37" name="Google Shape;37;p6"/>
-          <p:cNvSpPr txBox="1"/>
+          <p:cNvSpPr txBox="1">
+            <a:spLocks noGrp="1"/>
+          </p:cNvSpPr>
           <p:nvPr>
-            <p:ph idx="12" type="sldNum"/>
+            <p:ph type="sldNum" idx="12"/>
           </p:nvPr>
         </p:nvSpPr>
         <p:spPr>
@@ -3653,7 +3927,7 @@
           </a:prstGeom>
         </p:spPr>
         <p:txBody>
-          <a:bodyPr anchorCtr="0" anchor="ctr" bIns="91425" lIns="91425" spcFirstLastPara="1" rIns="91425" wrap="square" tIns="91425">
+          <a:bodyPr spcFirstLastPara="1" wrap="square" lIns="91425" tIns="91425" rIns="91425" bIns="91425" anchor="ctr" anchorCtr="0">
             <a:noAutofit/>
           </a:bodyPr>
           <a:lstStyle>
@@ -3695,7 +3969,7 @@
             </a:lvl9pPr>
           </a:lstStyle>
           <a:p>
-            <a:pPr indent="0" lvl="0" marL="0" rtl="0" algn="r">
+            <a:pPr marL="0" lvl="0" indent="0" algn="r" rtl="0">
               <a:spcBef>
                 <a:spcPts val="0"/>
               </a:spcBef>
@@ -3721,11 +3995,11 @@
 </file>
 
 <file path=ppt/slideLayouts/slideLayout6.xml><?xml version="1.0" encoding="utf-8"?>
-<p:sldLayout xmlns:a="http://schemas.openxmlformats.org/drawingml/2006/main" xmlns:r="http://schemas.openxmlformats.org/officeDocument/2006/relationships" xmlns:mc="http://schemas.openxmlformats.org/markup-compatibility/2006" xmlns:mv="urn:schemas-microsoft-com:mac:vml" xmlns:p="http://schemas.openxmlformats.org/presentationml/2006/main" xmlns:c="http://schemas.openxmlformats.org/drawingml/2006/chart" xmlns:dgm="http://schemas.openxmlformats.org/drawingml/2006/diagram" xmlns:o="urn:schemas-microsoft-com:office:office" xmlns:v="urn:schemas-microsoft-com:vml" xmlns:pvml="urn:schemas-microsoft-com:office:powerpoint" xmlns:com="http://schemas.openxmlformats.org/drawingml/2006/compatibility" xmlns:p14="http://schemas.microsoft.com/office/powerpoint/2010/main" xmlns:p15="http://schemas.microsoft.com/office/powerpoint/2012/main" matchingName="One column text">
+<p:sldLayout xmlns:a="http://schemas.openxmlformats.org/drawingml/2006/main" xmlns:r="http://schemas.openxmlformats.org/officeDocument/2006/relationships" xmlns:p="http://schemas.openxmlformats.org/presentationml/2006/main" matchingName="One column text">
   <p:cSld name="ONE_COLUMN_TEXT">
     <p:spTree>
       <p:nvGrpSpPr>
-        <p:cNvPr id="38" name="Shape 38"/>
+        <p:cNvPr id="1" name="Shape 38"/>
         <p:cNvGrpSpPr/>
         <p:nvPr/>
       </p:nvGrpSpPr>
@@ -3740,7 +4014,9 @@
       <p:sp>
         <p:nvSpPr>
           <p:cNvPr id="39" name="Google Shape;39;p7"/>
-          <p:cNvSpPr txBox="1"/>
+          <p:cNvSpPr txBox="1">
+            <a:spLocks noGrp="1"/>
+          </p:cNvSpPr>
           <p:nvPr>
             <p:ph type="title"/>
           </p:nvPr>
@@ -3755,7 +4031,7 @@
           </a:prstGeom>
         </p:spPr>
         <p:txBody>
-          <a:bodyPr anchorCtr="0" anchor="b" bIns="91425" lIns="91425" spcFirstLastPara="1" rIns="91425" wrap="square" tIns="91425"/>
+          <a:bodyPr spcFirstLastPara="1" wrap="square" lIns="91425" tIns="91425" rIns="91425" bIns="91425" anchor="b" anchorCtr="0"/>
           <a:lstStyle>
             <a:lvl1pPr lvl="0">
               <a:spcBef>
@@ -3857,15 +4133,19 @@
               <a:defRPr sz="2400"/>
             </a:lvl9pPr>
           </a:lstStyle>
-          <a:p/>
+          <a:p>
+            <a:endParaRPr/>
+          </a:p>
         </p:txBody>
       </p:sp>
       <p:sp>
         <p:nvSpPr>
           <p:cNvPr id="40" name="Google Shape;40;p7"/>
-          <p:cNvSpPr txBox="1"/>
+          <p:cNvSpPr txBox="1">
+            <a:spLocks noGrp="1"/>
+          </p:cNvSpPr>
           <p:nvPr>
-            <p:ph idx="1" type="body"/>
+            <p:ph type="body" idx="1"/>
           </p:nvPr>
         </p:nvSpPr>
         <p:spPr>
@@ -3878,9 +4158,9 @@
           </a:prstGeom>
         </p:spPr>
         <p:txBody>
-          <a:bodyPr anchorCtr="0" anchor="t" bIns="91425" lIns="91425" spcFirstLastPara="1" rIns="91425" wrap="square" tIns="91425"/>
+          <a:bodyPr spcFirstLastPara="1" wrap="square" lIns="91425" tIns="91425" rIns="91425" bIns="91425" anchor="t" anchorCtr="0"/>
           <a:lstStyle>
-            <a:lvl1pPr indent="-304800" lvl="0" marL="457200">
+            <a:lvl1pPr marL="457200" lvl="0" indent="-304800">
               <a:spcBef>
                 <a:spcPts val="0"/>
               </a:spcBef>
@@ -3891,7 +4171,7 @@
               <a:buChar char="●"/>
               <a:defRPr sz="1200"/>
             </a:lvl1pPr>
-            <a:lvl2pPr indent="-304800" lvl="1" marL="914400">
+            <a:lvl2pPr marL="914400" lvl="1" indent="-304800">
               <a:spcBef>
                 <a:spcPts val="1600"/>
               </a:spcBef>
@@ -3902,7 +4182,7 @@
               <a:buChar char="○"/>
               <a:defRPr sz="1200"/>
             </a:lvl2pPr>
-            <a:lvl3pPr indent="-304800" lvl="2" marL="1371600">
+            <a:lvl3pPr marL="1371600" lvl="2" indent="-304800">
               <a:spcBef>
                 <a:spcPts val="1600"/>
               </a:spcBef>
@@ -3913,7 +4193,7 @@
               <a:buChar char="■"/>
               <a:defRPr sz="1200"/>
             </a:lvl3pPr>
-            <a:lvl4pPr indent="-304800" lvl="3" marL="1828800">
+            <a:lvl4pPr marL="1828800" lvl="3" indent="-304800">
               <a:spcBef>
                 <a:spcPts val="1600"/>
               </a:spcBef>
@@ -3924,7 +4204,7 @@
               <a:buChar char="●"/>
               <a:defRPr sz="1200"/>
             </a:lvl4pPr>
-            <a:lvl5pPr indent="-304800" lvl="4" marL="2286000">
+            <a:lvl5pPr marL="2286000" lvl="4" indent="-304800">
               <a:spcBef>
                 <a:spcPts val="1600"/>
               </a:spcBef>
@@ -3935,7 +4215,7 @@
               <a:buChar char="○"/>
               <a:defRPr sz="1200"/>
             </a:lvl5pPr>
-            <a:lvl6pPr indent="-304800" lvl="5" marL="2743200">
+            <a:lvl6pPr marL="2743200" lvl="5" indent="-304800">
               <a:spcBef>
                 <a:spcPts val="1600"/>
               </a:spcBef>
@@ -3946,7 +4226,7 @@
               <a:buChar char="■"/>
               <a:defRPr sz="1200"/>
             </a:lvl6pPr>
-            <a:lvl7pPr indent="-304800" lvl="6" marL="3200400">
+            <a:lvl7pPr marL="3200400" lvl="6" indent="-304800">
               <a:spcBef>
                 <a:spcPts val="1600"/>
               </a:spcBef>
@@ -3957,7 +4237,7 @@
               <a:buChar char="●"/>
               <a:defRPr sz="1200"/>
             </a:lvl7pPr>
-            <a:lvl8pPr indent="-304800" lvl="7" marL="3657600">
+            <a:lvl8pPr marL="3657600" lvl="7" indent="-304800">
               <a:spcBef>
                 <a:spcPts val="1600"/>
               </a:spcBef>
@@ -3968,7 +4248,7 @@
               <a:buChar char="○"/>
               <a:defRPr sz="1200"/>
             </a:lvl8pPr>
-            <a:lvl9pPr indent="-304800" lvl="8" marL="4114800">
+            <a:lvl9pPr marL="4114800" lvl="8" indent="-304800">
               <a:spcBef>
                 <a:spcPts val="1600"/>
               </a:spcBef>
@@ -3980,15 +4260,19 @@
               <a:defRPr sz="1200"/>
             </a:lvl9pPr>
           </a:lstStyle>
-          <a:p/>
+          <a:p>
+            <a:endParaRPr/>
+          </a:p>
         </p:txBody>
       </p:sp>
       <p:sp>
         <p:nvSpPr>
           <p:cNvPr id="41" name="Google Shape;41;p7"/>
-          <p:cNvSpPr txBox="1"/>
+          <p:cNvSpPr txBox="1">
+            <a:spLocks noGrp="1"/>
+          </p:cNvSpPr>
           <p:nvPr>
-            <p:ph idx="12" type="sldNum"/>
+            <p:ph type="sldNum" idx="12"/>
           </p:nvPr>
         </p:nvSpPr>
         <p:spPr>
@@ -4001,7 +4285,7 @@
           </a:prstGeom>
         </p:spPr>
         <p:txBody>
-          <a:bodyPr anchorCtr="0" anchor="ctr" bIns="91425" lIns="91425" spcFirstLastPara="1" rIns="91425" wrap="square" tIns="91425">
+          <a:bodyPr spcFirstLastPara="1" wrap="square" lIns="91425" tIns="91425" rIns="91425" bIns="91425" anchor="ctr" anchorCtr="0">
             <a:noAutofit/>
           </a:bodyPr>
           <a:lstStyle>
@@ -4043,7 +4327,7 @@
             </a:lvl9pPr>
           </a:lstStyle>
           <a:p>
-            <a:pPr indent="0" lvl="0" marL="0" rtl="0" algn="r">
+            <a:pPr marL="0" lvl="0" indent="0" algn="r" rtl="0">
               <a:spcBef>
                 <a:spcPts val="0"/>
               </a:spcBef>
@@ -4069,18 +4353,19 @@
 </file>
 
 <file path=ppt/slideLayouts/slideLayout7.xml><?xml version="1.0" encoding="utf-8"?>
-<p:sldLayout xmlns:a="http://schemas.openxmlformats.org/drawingml/2006/main" xmlns:r="http://schemas.openxmlformats.org/officeDocument/2006/relationships" xmlns:mc="http://schemas.openxmlformats.org/markup-compatibility/2006" xmlns:mv="urn:schemas-microsoft-com:mac:vml" xmlns:p="http://schemas.openxmlformats.org/presentationml/2006/main" xmlns:c="http://schemas.openxmlformats.org/drawingml/2006/chart" xmlns:dgm="http://schemas.openxmlformats.org/drawingml/2006/diagram" xmlns:o="urn:schemas-microsoft-com:office:office" xmlns:v="urn:schemas-microsoft-com:vml" xmlns:pvml="urn:schemas-microsoft-com:office:powerpoint" xmlns:com="http://schemas.openxmlformats.org/drawingml/2006/compatibility" xmlns:p14="http://schemas.microsoft.com/office/powerpoint/2010/main" xmlns:p15="http://schemas.microsoft.com/office/powerpoint/2012/main" matchingName="Main point">
+<p:sldLayout xmlns:a="http://schemas.openxmlformats.org/drawingml/2006/main" xmlns:r="http://schemas.openxmlformats.org/officeDocument/2006/relationships" xmlns:p="http://schemas.openxmlformats.org/presentationml/2006/main" matchingName="Main point">
   <p:cSld name="MAIN_POINT">
     <p:bg>
       <p:bgPr>
         <a:solidFill>
           <a:schemeClr val="accent6"/>
         </a:solidFill>
+        <a:effectLst/>
       </p:bgPr>
     </p:bg>
     <p:spTree>
       <p:nvGrpSpPr>
-        <p:cNvPr id="42" name="Shape 42"/>
+        <p:cNvPr id="1" name="Shape 42"/>
         <p:cNvGrpSpPr/>
         <p:nvPr/>
       </p:nvGrpSpPr>
@@ -4095,7 +4380,9 @@
       <p:sp>
         <p:nvSpPr>
           <p:cNvPr id="43" name="Google Shape;43;p8"/>
-          <p:cNvSpPr txBox="1"/>
+          <p:cNvSpPr txBox="1">
+            <a:spLocks noGrp="1"/>
+          </p:cNvSpPr>
           <p:nvPr>
             <p:ph type="title"/>
           </p:nvPr>
@@ -4110,7 +4397,7 @@
           </a:prstGeom>
         </p:spPr>
         <p:txBody>
-          <a:bodyPr anchorCtr="0" anchor="ctr" bIns="91425" lIns="91425" spcFirstLastPara="1" rIns="91425" wrap="square" tIns="91425"/>
+          <a:bodyPr spcFirstLastPara="1" wrap="square" lIns="91425" tIns="91425" rIns="91425" bIns="91425" anchor="ctr" anchorCtr="0"/>
           <a:lstStyle>
             <a:lvl1pPr lvl="0">
               <a:spcBef>
@@ -4124,7 +4411,7 @@
               </a:buClr>
               <a:buSzPts val="5400"/>
               <a:buNone/>
-              <a:defRPr b="0" sz="5400">
+              <a:defRPr sz="5400" b="0">
                 <a:solidFill>
                   <a:schemeClr val="dk2"/>
                 </a:solidFill>
@@ -4142,7 +4429,7 @@
               </a:buClr>
               <a:buSzPts val="5400"/>
               <a:buNone/>
-              <a:defRPr b="0" sz="5400">
+              <a:defRPr sz="5400" b="0">
                 <a:solidFill>
                   <a:schemeClr val="dk2"/>
                 </a:solidFill>
@@ -4160,7 +4447,7 @@
               </a:buClr>
               <a:buSzPts val="5400"/>
               <a:buNone/>
-              <a:defRPr b="0" sz="5400">
+              <a:defRPr sz="5400" b="0">
                 <a:solidFill>
                   <a:schemeClr val="dk2"/>
                 </a:solidFill>
@@ -4178,7 +4465,7 @@
               </a:buClr>
               <a:buSzPts val="5400"/>
               <a:buNone/>
-              <a:defRPr b="0" sz="5400">
+              <a:defRPr sz="5400" b="0">
                 <a:solidFill>
                   <a:schemeClr val="dk2"/>
                 </a:solidFill>
@@ -4196,7 +4483,7 @@
               </a:buClr>
               <a:buSzPts val="5400"/>
               <a:buNone/>
-              <a:defRPr b="0" sz="5400">
+              <a:defRPr sz="5400" b="0">
                 <a:solidFill>
                   <a:schemeClr val="dk2"/>
                 </a:solidFill>
@@ -4214,7 +4501,7 @@
               </a:buClr>
               <a:buSzPts val="5400"/>
               <a:buNone/>
-              <a:defRPr b="0" sz="5400">
+              <a:defRPr sz="5400" b="0">
                 <a:solidFill>
                   <a:schemeClr val="dk2"/>
                 </a:solidFill>
@@ -4232,7 +4519,7 @@
               </a:buClr>
               <a:buSzPts val="5400"/>
               <a:buNone/>
-              <a:defRPr b="0" sz="5400">
+              <a:defRPr sz="5400" b="0">
                 <a:solidFill>
                   <a:schemeClr val="dk2"/>
                 </a:solidFill>
@@ -4250,7 +4537,7 @@
               </a:buClr>
               <a:buSzPts val="5400"/>
               <a:buNone/>
-              <a:defRPr b="0" sz="5400">
+              <a:defRPr sz="5400" b="0">
                 <a:solidFill>
                   <a:schemeClr val="dk2"/>
                 </a:solidFill>
@@ -4268,22 +4555,26 @@
               </a:buClr>
               <a:buSzPts val="5400"/>
               <a:buNone/>
-              <a:defRPr b="0" sz="5400">
+              <a:defRPr sz="5400" b="0">
                 <a:solidFill>
                   <a:schemeClr val="dk2"/>
                 </a:solidFill>
               </a:defRPr>
             </a:lvl9pPr>
           </a:lstStyle>
-          <a:p/>
+          <a:p>
+            <a:endParaRPr/>
+          </a:p>
         </p:txBody>
       </p:sp>
       <p:sp>
         <p:nvSpPr>
           <p:cNvPr id="44" name="Google Shape;44;p8"/>
-          <p:cNvSpPr txBox="1"/>
+          <p:cNvSpPr txBox="1">
+            <a:spLocks noGrp="1"/>
+          </p:cNvSpPr>
           <p:nvPr>
-            <p:ph idx="12" type="sldNum"/>
+            <p:ph type="sldNum" idx="12"/>
           </p:nvPr>
         </p:nvSpPr>
         <p:spPr>
@@ -4296,7 +4587,7 @@
           </a:prstGeom>
         </p:spPr>
         <p:txBody>
-          <a:bodyPr anchorCtr="0" anchor="ctr" bIns="91425" lIns="91425" spcFirstLastPara="1" rIns="91425" wrap="square" tIns="91425">
+          <a:bodyPr spcFirstLastPara="1" wrap="square" lIns="91425" tIns="91425" rIns="91425" bIns="91425" anchor="ctr" anchorCtr="0">
             <a:noAutofit/>
           </a:bodyPr>
           <a:lstStyle>
@@ -4338,7 +4629,7 @@
             </a:lvl9pPr>
           </a:lstStyle>
           <a:p>
-            <a:pPr indent="0" lvl="0" marL="0" rtl="0" algn="r">
+            <a:pPr marL="0" lvl="0" indent="0" algn="r" rtl="0">
               <a:spcBef>
                 <a:spcPts val="0"/>
               </a:spcBef>
@@ -4364,11 +4655,11 @@
 </file>
 
 <file path=ppt/slideLayouts/slideLayout8.xml><?xml version="1.0" encoding="utf-8"?>
-<p:sldLayout xmlns:a="http://schemas.openxmlformats.org/drawingml/2006/main" xmlns:r="http://schemas.openxmlformats.org/officeDocument/2006/relationships" xmlns:mc="http://schemas.openxmlformats.org/markup-compatibility/2006" xmlns:mv="urn:schemas-microsoft-com:mac:vml" xmlns:p="http://schemas.openxmlformats.org/presentationml/2006/main" xmlns:c="http://schemas.openxmlformats.org/drawingml/2006/chart" xmlns:dgm="http://schemas.openxmlformats.org/drawingml/2006/diagram" xmlns:o="urn:schemas-microsoft-com:office:office" xmlns:v="urn:schemas-microsoft-com:vml" xmlns:pvml="urn:schemas-microsoft-com:office:powerpoint" xmlns:com="http://schemas.openxmlformats.org/drawingml/2006/compatibility" xmlns:p14="http://schemas.microsoft.com/office/powerpoint/2010/main" xmlns:p15="http://schemas.microsoft.com/office/powerpoint/2012/main" matchingName="Section title and description">
+<p:sldLayout xmlns:a="http://schemas.openxmlformats.org/drawingml/2006/main" xmlns:r="http://schemas.openxmlformats.org/officeDocument/2006/relationships" xmlns:p="http://schemas.openxmlformats.org/presentationml/2006/main" matchingName="Section title and description">
   <p:cSld name="SECTION_TITLE_AND_DESCRIPTION">
     <p:spTree>
       <p:nvGrpSpPr>
-        <p:cNvPr id="45" name="Shape 45"/>
+        <p:cNvPr id="1" name="Shape 45"/>
         <p:cNvGrpSpPr/>
         <p:nvPr/>
       </p:nvGrpSpPr>
@@ -4402,12 +4693,12 @@
           </a:ln>
         </p:spPr>
         <p:txBody>
-          <a:bodyPr anchorCtr="0" anchor="ctr" bIns="91425" lIns="91425" spcFirstLastPara="1" rIns="91425" wrap="square" tIns="91425">
+          <a:bodyPr spcFirstLastPara="1" wrap="square" lIns="91425" tIns="91425" rIns="91425" bIns="91425" anchor="ctr" anchorCtr="0">
             <a:noAutofit/>
           </a:bodyPr>
           <a:lstStyle/>
           <a:p>
-            <a:pPr indent="0" lvl="0" marL="0" rtl="0" algn="l">
+            <a:pPr marL="0" lvl="0" indent="0" algn="l" rtl="0">
               <a:spcBef>
                 <a:spcPts val="0"/>
               </a:spcBef>
@@ -4416,9 +4707,6 @@
               </a:spcAft>
               <a:buNone/>
             </a:pPr>
-            <a:r>
-              <a:t/>
-            </a:r>
             <a:endParaRPr/>
           </a:p>
         </p:txBody>
@@ -4438,21 +4726,23 @@
             <a:avLst/>
           </a:prstGeom>
           <a:noFill/>
-          <a:ln cap="flat" cmpd="sng" w="19050">
+          <a:ln w="19050" cap="flat" cmpd="sng">
             <a:solidFill>
               <a:schemeClr val="lt1"/>
             </a:solidFill>
             <a:prstDash val="solid"/>
             <a:round/>
-            <a:headEnd len="sm" w="sm" type="none"/>
-            <a:tailEnd len="sm" w="sm" type="none"/>
+            <a:headEnd type="none" w="sm" len="sm"/>
+            <a:tailEnd type="none" w="sm" len="sm"/>
           </a:ln>
         </p:spPr>
       </p:cxnSp>
       <p:sp>
         <p:nvSpPr>
           <p:cNvPr id="48" name="Google Shape;48;p9"/>
-          <p:cNvSpPr txBox="1"/>
+          <p:cNvSpPr txBox="1">
+            <a:spLocks noGrp="1"/>
+          </p:cNvSpPr>
           <p:nvPr>
             <p:ph type="title"/>
           </p:nvPr>
@@ -4467,7 +4757,7 @@
           </a:prstGeom>
         </p:spPr>
         <p:txBody>
-          <a:bodyPr anchorCtr="0" anchor="b" bIns="91425" lIns="91425" spcFirstLastPara="1" rIns="91425" wrap="square" tIns="91425"/>
+          <a:bodyPr spcFirstLastPara="1" wrap="square" lIns="91425" tIns="91425" rIns="91425" bIns="91425" anchor="b" anchorCtr="0"/>
           <a:lstStyle>
             <a:lvl1pPr lvl="0" algn="ctr">
               <a:spcBef>
@@ -4569,15 +4859,19 @@
               <a:defRPr sz="4200"/>
             </a:lvl9pPr>
           </a:lstStyle>
-          <a:p/>
+          <a:p>
+            <a:endParaRPr/>
+          </a:p>
         </p:txBody>
       </p:sp>
       <p:sp>
         <p:nvSpPr>
           <p:cNvPr id="49" name="Google Shape;49;p9"/>
-          <p:cNvSpPr txBox="1"/>
+          <p:cNvSpPr txBox="1">
+            <a:spLocks noGrp="1"/>
+          </p:cNvSpPr>
           <p:nvPr>
-            <p:ph idx="1" type="subTitle"/>
+            <p:ph type="subTitle" idx="1"/>
           </p:nvPr>
         </p:nvSpPr>
         <p:spPr>
@@ -4590,7 +4884,7 @@
           </a:prstGeom>
         </p:spPr>
         <p:txBody>
-          <a:bodyPr anchorCtr="0" anchor="t" bIns="91425" lIns="91425" spcFirstLastPara="1" rIns="91425" wrap="square" tIns="91425"/>
+          <a:bodyPr spcFirstLastPara="1" wrap="square" lIns="91425" tIns="91425" rIns="91425" bIns="91425" anchor="t" anchorCtr="0"/>
           <a:lstStyle>
             <a:lvl1pPr lvl="0" algn="ctr">
               <a:lnSpc>
@@ -4719,15 +5013,19 @@
               <a:defRPr sz="2100"/>
             </a:lvl9pPr>
           </a:lstStyle>
-          <a:p/>
+          <a:p>
+            <a:endParaRPr/>
+          </a:p>
         </p:txBody>
       </p:sp>
       <p:sp>
         <p:nvSpPr>
           <p:cNvPr id="50" name="Google Shape;50;p9"/>
-          <p:cNvSpPr txBox="1"/>
+          <p:cNvSpPr txBox="1">
+            <a:spLocks noGrp="1"/>
+          </p:cNvSpPr>
           <p:nvPr>
-            <p:ph idx="2" type="body"/>
+            <p:ph type="body" idx="2"/>
           </p:nvPr>
         </p:nvSpPr>
         <p:spPr>
@@ -4740,9 +5038,9 @@
           </a:prstGeom>
         </p:spPr>
         <p:txBody>
-          <a:bodyPr anchorCtr="0" anchor="ctr" bIns="91425" lIns="91425" spcFirstLastPara="1" rIns="91425" wrap="square" tIns="91425"/>
+          <a:bodyPr spcFirstLastPara="1" wrap="square" lIns="91425" tIns="91425" rIns="91425" bIns="91425" anchor="ctr" anchorCtr="0"/>
           <a:lstStyle>
-            <a:lvl1pPr indent="-342900" lvl="0" marL="457200">
+            <a:lvl1pPr marL="457200" lvl="0" indent="-342900">
               <a:spcBef>
                 <a:spcPts val="0"/>
               </a:spcBef>
@@ -4760,7 +5058,7 @@
                 </a:solidFill>
               </a:defRPr>
             </a:lvl1pPr>
-            <a:lvl2pPr indent="-317500" lvl="1" marL="914400">
+            <a:lvl2pPr marL="914400" lvl="1" indent="-317500">
               <a:spcBef>
                 <a:spcPts val="1600"/>
               </a:spcBef>
@@ -4778,7 +5076,7 @@
                 </a:solidFill>
               </a:defRPr>
             </a:lvl2pPr>
-            <a:lvl3pPr indent="-317500" lvl="2" marL="1371600">
+            <a:lvl3pPr marL="1371600" lvl="2" indent="-317500">
               <a:spcBef>
                 <a:spcPts val="1600"/>
               </a:spcBef>
@@ -4796,7 +5094,7 @@
                 </a:solidFill>
               </a:defRPr>
             </a:lvl3pPr>
-            <a:lvl4pPr indent="-317500" lvl="3" marL="1828800">
+            <a:lvl4pPr marL="1828800" lvl="3" indent="-317500">
               <a:spcBef>
                 <a:spcPts val="1600"/>
               </a:spcBef>
@@ -4814,7 +5112,7 @@
                 </a:solidFill>
               </a:defRPr>
             </a:lvl4pPr>
-            <a:lvl5pPr indent="-317500" lvl="4" marL="2286000">
+            <a:lvl5pPr marL="2286000" lvl="4" indent="-317500">
               <a:spcBef>
                 <a:spcPts val="1600"/>
               </a:spcBef>
@@ -4832,7 +5130,7 @@
                 </a:solidFill>
               </a:defRPr>
             </a:lvl5pPr>
-            <a:lvl6pPr indent="-317500" lvl="5" marL="2743200">
+            <a:lvl6pPr marL="2743200" lvl="5" indent="-317500">
               <a:spcBef>
                 <a:spcPts val="1600"/>
               </a:spcBef>
@@ -4850,7 +5148,7 @@
                 </a:solidFill>
               </a:defRPr>
             </a:lvl6pPr>
-            <a:lvl7pPr indent="-317500" lvl="6" marL="3200400">
+            <a:lvl7pPr marL="3200400" lvl="6" indent="-317500">
               <a:spcBef>
                 <a:spcPts val="1600"/>
               </a:spcBef>
@@ -4868,7 +5166,7 @@
                 </a:solidFill>
               </a:defRPr>
             </a:lvl7pPr>
-            <a:lvl8pPr indent="-317500" lvl="7" marL="3657600">
+            <a:lvl8pPr marL="3657600" lvl="7" indent="-317500">
               <a:spcBef>
                 <a:spcPts val="1600"/>
               </a:spcBef>
@@ -4886,7 +5184,7 @@
                 </a:solidFill>
               </a:defRPr>
             </a:lvl8pPr>
-            <a:lvl9pPr indent="-317500" lvl="8" marL="4114800">
+            <a:lvl9pPr marL="4114800" lvl="8" indent="-317500">
               <a:spcBef>
                 <a:spcPts val="1600"/>
               </a:spcBef>
@@ -4905,15 +5203,19 @@
               </a:defRPr>
             </a:lvl9pPr>
           </a:lstStyle>
-          <a:p/>
+          <a:p>
+            <a:endParaRPr/>
+          </a:p>
         </p:txBody>
       </p:sp>
       <p:sp>
         <p:nvSpPr>
           <p:cNvPr id="51" name="Google Shape;51;p9"/>
-          <p:cNvSpPr txBox="1"/>
+          <p:cNvSpPr txBox="1">
+            <a:spLocks noGrp="1"/>
+          </p:cNvSpPr>
           <p:nvPr>
-            <p:ph idx="12" type="sldNum"/>
+            <p:ph type="sldNum" idx="12"/>
           </p:nvPr>
         </p:nvSpPr>
         <p:spPr>
@@ -4926,7 +5228,7 @@
           </a:prstGeom>
         </p:spPr>
         <p:txBody>
-          <a:bodyPr anchorCtr="0" anchor="ctr" bIns="91425" lIns="91425" spcFirstLastPara="1" rIns="91425" wrap="square" tIns="91425">
+          <a:bodyPr spcFirstLastPara="1" wrap="square" lIns="91425" tIns="91425" rIns="91425" bIns="91425" anchor="ctr" anchorCtr="0">
             <a:noAutofit/>
           </a:bodyPr>
           <a:lstStyle>
@@ -5004,7 +5306,7 @@
             </a:lvl9pPr>
           </a:lstStyle>
           <a:p>
-            <a:pPr indent="0" lvl="0" marL="0" rtl="0" algn="r">
+            <a:pPr marL="0" lvl="0" indent="0" algn="r" rtl="0">
               <a:spcBef>
                 <a:spcPts val="0"/>
               </a:spcBef>
@@ -5030,11 +5332,11 @@
 </file>
 
 <file path=ppt/slideLayouts/slideLayout9.xml><?xml version="1.0" encoding="utf-8"?>
-<p:sldLayout xmlns:a="http://schemas.openxmlformats.org/drawingml/2006/main" xmlns:r="http://schemas.openxmlformats.org/officeDocument/2006/relationships" xmlns:mc="http://schemas.openxmlformats.org/markup-compatibility/2006" xmlns:mv="urn:schemas-microsoft-com:mac:vml" xmlns:p="http://schemas.openxmlformats.org/presentationml/2006/main" xmlns:c="http://schemas.openxmlformats.org/drawingml/2006/chart" xmlns:dgm="http://schemas.openxmlformats.org/drawingml/2006/diagram" xmlns:o="urn:schemas-microsoft-com:office:office" xmlns:v="urn:schemas-microsoft-com:vml" xmlns:pvml="urn:schemas-microsoft-com:office:powerpoint" xmlns:com="http://schemas.openxmlformats.org/drawingml/2006/compatibility" xmlns:p14="http://schemas.microsoft.com/office/powerpoint/2010/main" xmlns:p15="http://schemas.microsoft.com/office/powerpoint/2012/main" matchingName="Caption">
+<p:sldLayout xmlns:a="http://schemas.openxmlformats.org/drawingml/2006/main" xmlns:r="http://schemas.openxmlformats.org/officeDocument/2006/relationships" xmlns:p="http://schemas.openxmlformats.org/presentationml/2006/main" matchingName="Caption">
   <p:cSld name="CAPTION_ONLY">
     <p:spTree>
       <p:nvGrpSpPr>
-        <p:cNvPr id="52" name="Shape 52"/>
+        <p:cNvPr id="1" name="Shape 52"/>
         <p:cNvGrpSpPr/>
         <p:nvPr/>
       </p:nvGrpSpPr>
@@ -5049,9 +5351,11 @@
       <p:sp>
         <p:nvSpPr>
           <p:cNvPr id="53" name="Google Shape;53;p10"/>
-          <p:cNvSpPr txBox="1"/>
+          <p:cNvSpPr txBox="1">
+            <a:spLocks noGrp="1"/>
+          </p:cNvSpPr>
           <p:nvPr>
-            <p:ph idx="1" type="body"/>
+            <p:ph type="body" idx="1"/>
           </p:nvPr>
         </p:nvSpPr>
         <p:spPr>
@@ -5064,9 +5368,9 @@
           </a:prstGeom>
         </p:spPr>
         <p:txBody>
-          <a:bodyPr anchorCtr="0" anchor="ctr" bIns="91425" lIns="91425" spcFirstLastPara="1" rIns="91425" wrap="square" tIns="91425"/>
+          <a:bodyPr spcFirstLastPara="1" wrap="square" lIns="91425" tIns="91425" rIns="91425" bIns="91425" anchor="ctr" anchorCtr="0"/>
           <a:lstStyle>
-            <a:lvl1pPr indent="-228600" lvl="0" marL="457200">
+            <a:lvl1pPr marL="457200" lvl="0" indent="-228600">
               <a:lnSpc>
                 <a:spcPct val="100000"/>
               </a:lnSpc>
@@ -5087,15 +5391,19 @@
               </a:defRPr>
             </a:lvl1pPr>
           </a:lstStyle>
-          <a:p/>
+          <a:p>
+            <a:endParaRPr/>
+          </a:p>
         </p:txBody>
       </p:sp>
       <p:sp>
         <p:nvSpPr>
           <p:cNvPr id="54" name="Google Shape;54;p10"/>
-          <p:cNvSpPr txBox="1"/>
+          <p:cNvSpPr txBox="1">
+            <a:spLocks noGrp="1"/>
+          </p:cNvSpPr>
           <p:nvPr>
-            <p:ph idx="12" type="sldNum"/>
+            <p:ph type="sldNum" idx="12"/>
           </p:nvPr>
         </p:nvSpPr>
         <p:spPr>
@@ -5108,7 +5416,7 @@
           </a:prstGeom>
         </p:spPr>
         <p:txBody>
-          <a:bodyPr anchorCtr="0" anchor="ctr" bIns="91425" lIns="91425" spcFirstLastPara="1" rIns="91425" wrap="square" tIns="91425">
+          <a:bodyPr spcFirstLastPara="1" wrap="square" lIns="91425" tIns="91425" rIns="91425" bIns="91425" anchor="ctr" anchorCtr="0">
             <a:noAutofit/>
           </a:bodyPr>
           <a:lstStyle>
@@ -5150,7 +5458,7 @@
             </a:lvl9pPr>
           </a:lstStyle>
           <a:p>
-            <a:pPr indent="0" lvl="0" marL="0" rtl="0" algn="r">
+            <a:pPr marL="0" lvl="0" indent="0" algn="r" rtl="0">
               <a:spcBef>
                 <a:spcPts val="0"/>
               </a:spcBef>
@@ -5176,18 +5484,19 @@
 </file>
 
 <file path=ppt/slideMasters/slideMaster1.xml><?xml version="1.0" encoding="utf-8"?>
-<p:sldMaster xmlns:a="http://schemas.openxmlformats.org/drawingml/2006/main" xmlns:r="http://schemas.openxmlformats.org/officeDocument/2006/relationships" xmlns:mc="http://schemas.openxmlformats.org/markup-compatibility/2006" xmlns:mv="urn:schemas-microsoft-com:mac:vml" xmlns:p="http://schemas.openxmlformats.org/presentationml/2006/main" xmlns:c="http://schemas.openxmlformats.org/drawingml/2006/chart" xmlns:dgm="http://schemas.openxmlformats.org/drawingml/2006/diagram" xmlns:o="urn:schemas-microsoft-com:office:office" xmlns:v="urn:schemas-microsoft-com:vml" xmlns:pvml="urn:schemas-microsoft-com:office:powerpoint" xmlns:com="http://schemas.openxmlformats.org/drawingml/2006/compatibility" xmlns:p14="http://schemas.microsoft.com/office/powerpoint/2010/main" xmlns:p15="http://schemas.microsoft.com/office/powerpoint/2012/main">
+<p:sldMaster xmlns:a="http://schemas.openxmlformats.org/drawingml/2006/main" xmlns:r="http://schemas.openxmlformats.org/officeDocument/2006/relationships" xmlns:p="http://schemas.openxmlformats.org/presentationml/2006/main">
   <p:cSld name="tropic">
     <p:bg>
       <p:bgPr>
         <a:solidFill>
           <a:schemeClr val="lt1"/>
         </a:solidFill>
+        <a:effectLst/>
       </p:bgPr>
     </p:bg>
     <p:spTree>
       <p:nvGrpSpPr>
-        <p:cNvPr id="5" name="Shape 5"/>
+        <p:cNvPr id="1" name="Shape 5"/>
         <p:cNvGrpSpPr/>
         <p:nvPr/>
       </p:nvGrpSpPr>
@@ -5202,7 +5511,9 @@
       <p:sp>
         <p:nvSpPr>
           <p:cNvPr id="6" name="Google Shape;6;p1"/>
-          <p:cNvSpPr txBox="1"/>
+          <p:cNvSpPr txBox="1">
+            <a:spLocks noGrp="1"/>
+          </p:cNvSpPr>
           <p:nvPr>
             <p:ph type="title"/>
           </p:nvPr>
@@ -5221,7 +5532,7 @@
           </a:ln>
         </p:spPr>
         <p:txBody>
-          <a:bodyPr anchorCtr="0" anchor="t" bIns="91425" lIns="91425" spcFirstLastPara="1" rIns="91425" wrap="square" tIns="91425"/>
+          <a:bodyPr spcFirstLastPara="1" wrap="square" lIns="91425" tIns="91425" rIns="91425" bIns="91425" anchor="t" anchorCtr="0"/>
           <a:lstStyle>
             <a:lvl1pPr lvl="0">
               <a:spcBef>
@@ -5236,7 +5547,7 @@
               <a:buSzPts val="3600"/>
               <a:buFont typeface="PT Sans Narrow"/>
               <a:buNone/>
-              <a:defRPr b="1" sz="3600">
+              <a:defRPr sz="3600" b="1">
                 <a:solidFill>
                   <a:schemeClr val="accent1"/>
                 </a:solidFill>
@@ -5259,7 +5570,7 @@
               <a:buSzPts val="3600"/>
               <a:buFont typeface="PT Sans Narrow"/>
               <a:buNone/>
-              <a:defRPr b="1" sz="3600">
+              <a:defRPr sz="3600" b="1">
                 <a:solidFill>
                   <a:schemeClr val="accent1"/>
                 </a:solidFill>
@@ -5282,7 +5593,7 @@
               <a:buSzPts val="3600"/>
               <a:buFont typeface="PT Sans Narrow"/>
               <a:buNone/>
-              <a:defRPr b="1" sz="3600">
+              <a:defRPr sz="3600" b="1">
                 <a:solidFill>
                   <a:schemeClr val="accent1"/>
                 </a:solidFill>
@@ -5305,7 +5616,7 @@
               <a:buSzPts val="3600"/>
               <a:buFont typeface="PT Sans Narrow"/>
               <a:buNone/>
-              <a:defRPr b="1" sz="3600">
+              <a:defRPr sz="3600" b="1">
                 <a:solidFill>
                   <a:schemeClr val="accent1"/>
                 </a:solidFill>
@@ -5328,7 +5639,7 @@
               <a:buSzPts val="3600"/>
               <a:buFont typeface="PT Sans Narrow"/>
               <a:buNone/>
-              <a:defRPr b="1" sz="3600">
+              <a:defRPr sz="3600" b="1">
                 <a:solidFill>
                   <a:schemeClr val="accent1"/>
                 </a:solidFill>
@@ -5351,7 +5662,7 @@
               <a:buSzPts val="3600"/>
               <a:buFont typeface="PT Sans Narrow"/>
               <a:buNone/>
-              <a:defRPr b="1" sz="3600">
+              <a:defRPr sz="3600" b="1">
                 <a:solidFill>
                   <a:schemeClr val="accent1"/>
                 </a:solidFill>
@@ -5374,7 +5685,7 @@
               <a:buSzPts val="3600"/>
               <a:buFont typeface="PT Sans Narrow"/>
               <a:buNone/>
-              <a:defRPr b="1" sz="3600">
+              <a:defRPr sz="3600" b="1">
                 <a:solidFill>
                   <a:schemeClr val="accent1"/>
                 </a:solidFill>
@@ -5397,7 +5708,7 @@
               <a:buSzPts val="3600"/>
               <a:buFont typeface="PT Sans Narrow"/>
               <a:buNone/>
-              <a:defRPr b="1" sz="3600">
+              <a:defRPr sz="3600" b="1">
                 <a:solidFill>
                   <a:schemeClr val="accent1"/>
                 </a:solidFill>
@@ -5420,7 +5731,7 @@
               <a:buSzPts val="3600"/>
               <a:buFont typeface="PT Sans Narrow"/>
               <a:buNone/>
-              <a:defRPr b="1" sz="3600">
+              <a:defRPr sz="3600" b="1">
                 <a:solidFill>
                   <a:schemeClr val="accent1"/>
                 </a:solidFill>
@@ -5431,15 +5742,19 @@
               </a:defRPr>
             </a:lvl9pPr>
           </a:lstStyle>
-          <a:p/>
+          <a:p>
+            <a:endParaRPr/>
+          </a:p>
         </p:txBody>
       </p:sp>
       <p:sp>
         <p:nvSpPr>
           <p:cNvPr id="7" name="Google Shape;7;p1"/>
-          <p:cNvSpPr txBox="1"/>
+          <p:cNvSpPr txBox="1">
+            <a:spLocks noGrp="1"/>
+          </p:cNvSpPr>
           <p:nvPr>
-            <p:ph idx="1" type="body"/>
+            <p:ph type="body" idx="1"/>
           </p:nvPr>
         </p:nvSpPr>
         <p:spPr>
@@ -5456,9 +5771,9 @@
           </a:ln>
         </p:spPr>
         <p:txBody>
-          <a:bodyPr anchorCtr="0" anchor="t" bIns="91425" lIns="91425" spcFirstLastPara="1" rIns="91425" wrap="square" tIns="91425"/>
+          <a:bodyPr spcFirstLastPara="1" wrap="square" lIns="91425" tIns="91425" rIns="91425" bIns="91425" anchor="t" anchorCtr="0"/>
           <a:lstStyle>
-            <a:lvl1pPr indent="-342900" lvl="0" marL="457200">
+            <a:lvl1pPr marL="457200" lvl="0" indent="-342900">
               <a:lnSpc>
                 <a:spcPct val="115000"/>
               </a:lnSpc>
@@ -5484,7 +5799,7 @@
                 <a:sym typeface="Open Sans"/>
               </a:defRPr>
             </a:lvl1pPr>
-            <a:lvl2pPr indent="-317500" lvl="1" marL="914400">
+            <a:lvl2pPr marL="914400" lvl="1" indent="-317500">
               <a:lnSpc>
                 <a:spcPct val="115000"/>
               </a:lnSpc>
@@ -5510,7 +5825,7 @@
                 <a:sym typeface="Open Sans"/>
               </a:defRPr>
             </a:lvl2pPr>
-            <a:lvl3pPr indent="-317500" lvl="2" marL="1371600">
+            <a:lvl3pPr marL="1371600" lvl="2" indent="-317500">
               <a:lnSpc>
                 <a:spcPct val="115000"/>
               </a:lnSpc>
@@ -5536,7 +5851,7 @@
                 <a:sym typeface="Open Sans"/>
               </a:defRPr>
             </a:lvl3pPr>
-            <a:lvl4pPr indent="-317500" lvl="3" marL="1828800">
+            <a:lvl4pPr marL="1828800" lvl="3" indent="-317500">
               <a:lnSpc>
                 <a:spcPct val="115000"/>
               </a:lnSpc>
@@ -5562,7 +5877,7 @@
                 <a:sym typeface="Open Sans"/>
               </a:defRPr>
             </a:lvl4pPr>
-            <a:lvl5pPr indent="-317500" lvl="4" marL="2286000">
+            <a:lvl5pPr marL="2286000" lvl="4" indent="-317500">
               <a:lnSpc>
                 <a:spcPct val="115000"/>
               </a:lnSpc>
@@ -5588,7 +5903,7 @@
                 <a:sym typeface="Open Sans"/>
               </a:defRPr>
             </a:lvl5pPr>
-            <a:lvl6pPr indent="-317500" lvl="5" marL="2743200">
+            <a:lvl6pPr marL="2743200" lvl="5" indent="-317500">
               <a:lnSpc>
                 <a:spcPct val="115000"/>
               </a:lnSpc>
@@ -5614,7 +5929,7 @@
                 <a:sym typeface="Open Sans"/>
               </a:defRPr>
             </a:lvl6pPr>
-            <a:lvl7pPr indent="-317500" lvl="6" marL="3200400">
+            <a:lvl7pPr marL="3200400" lvl="6" indent="-317500">
               <a:lnSpc>
                 <a:spcPct val="115000"/>
               </a:lnSpc>
@@ -5640,7 +5955,7 @@
                 <a:sym typeface="Open Sans"/>
               </a:defRPr>
             </a:lvl7pPr>
-            <a:lvl8pPr indent="-317500" lvl="7" marL="3657600">
+            <a:lvl8pPr marL="3657600" lvl="7" indent="-317500">
               <a:lnSpc>
                 <a:spcPct val="115000"/>
               </a:lnSpc>
@@ -5666,7 +5981,7 @@
                 <a:sym typeface="Open Sans"/>
               </a:defRPr>
             </a:lvl8pPr>
-            <a:lvl9pPr indent="-317500" lvl="8" marL="4114800">
+            <a:lvl9pPr marL="4114800" lvl="8" indent="-317500">
               <a:lnSpc>
                 <a:spcPct val="115000"/>
               </a:lnSpc>
@@ -5693,15 +6008,19 @@
               </a:defRPr>
             </a:lvl9pPr>
           </a:lstStyle>
-          <a:p/>
+          <a:p>
+            <a:endParaRPr/>
+          </a:p>
         </p:txBody>
       </p:sp>
       <p:sp>
         <p:nvSpPr>
           <p:cNvPr id="8" name="Google Shape;8;p1"/>
-          <p:cNvSpPr txBox="1"/>
+          <p:cNvSpPr txBox="1">
+            <a:spLocks noGrp="1"/>
+          </p:cNvSpPr>
           <p:nvPr>
-            <p:ph idx="12" type="sldNum"/>
+            <p:ph type="sldNum" idx="12"/>
           </p:nvPr>
         </p:nvSpPr>
         <p:spPr>
@@ -5718,7 +6037,7 @@
           </a:ln>
         </p:spPr>
         <p:txBody>
-          <a:bodyPr anchorCtr="0" anchor="ctr" bIns="91425" lIns="91425" spcFirstLastPara="1" rIns="91425" wrap="square" tIns="91425">
+          <a:bodyPr spcFirstLastPara="1" wrap="square" lIns="91425" tIns="91425" rIns="91425" bIns="91425" anchor="ctr" anchorCtr="0">
             <a:noAutofit/>
           </a:bodyPr>
           <a:lstStyle>
@@ -5832,7 +6151,7 @@
             </a:lvl9pPr>
           </a:lstStyle>
           <a:p>
-            <a:pPr indent="0" lvl="0" marL="0" rtl="0" algn="r">
+            <a:pPr marL="0" lvl="0" indent="0" algn="r" rtl="0">
               <a:spcBef>
                 <a:spcPts val="0"/>
               </a:spcBef>
@@ -5851,7 +6170,7 @@
       </p:sp>
     </p:spTree>
   </p:cSld>
-  <p:clrMap accent1="accent1" accent2="accent2" accent3="accent3" accent4="accent4" accent5="accent5" accent6="accent6" bg1="lt1" bg2="dk2" tx1="dk1" tx2="lt2" folHlink="folHlink" hlink="hlink"/>
+  <p:clrMap bg1="lt1" tx1="dk1" bg2="dk2" tx2="lt2" accent1="accent1" accent2="accent2" accent3="accent3" accent4="accent4" accent5="accent5" accent6="accent6" hlink="hlink" folHlink="folHlink"/>
   <p:sldLayoutIdLst>
     <p:sldLayoutId id="2147483648" r:id="rId1"/>
     <p:sldLayoutId id="2147483649" r:id="rId2"/>
@@ -5865,10 +6184,10 @@
     <p:sldLayoutId id="2147483657" r:id="rId10"/>
     <p:sldLayoutId id="2147483658" r:id="rId11"/>
   </p:sldLayoutIdLst>
-  <p:hf dt="0" ftr="0" hdr="0" sldNum="0"/>
+  <p:hf sldNum="0" hdr="0" ftr="0" dt="0"/>
   <p:txStyles>
     <p:titleStyle>
-      <a:defPPr lvl="0" marR="0" rtl="0" algn="l">
+      <a:defPPr marR="0" lvl="0" algn="l" rtl="0">
         <a:lnSpc>
           <a:spcPct val="100000"/>
         </a:lnSpc>
@@ -5879,7 +6198,7 @@
           <a:spcPts val="0"/>
         </a:spcAft>
       </a:defPPr>
-      <a:lvl1pPr lvl="0" marR="0" rtl="0" algn="l">
+      <a:lvl1pPr marR="0" lvl="0" algn="l" rtl="0">
         <a:lnSpc>
           <a:spcPct val="100000"/>
         </a:lnSpc>
@@ -5893,7 +6212,7 @@
           <a:srgbClr val="000000"/>
         </a:buClr>
         <a:buFont typeface="Arial"/>
-        <a:defRPr b="0" i="0" sz="1400" u="none" cap="none" strike="noStrike">
+        <a:defRPr sz="1400" b="0" i="0" u="none" strike="noStrike" cap="none">
           <a:solidFill>
             <a:srgbClr val="000000"/>
           </a:solidFill>
@@ -5903,7 +6222,7 @@
           <a:sym typeface="Arial"/>
         </a:defRPr>
       </a:lvl1pPr>
-      <a:lvl2pPr lvl="1" marR="0" rtl="0" algn="l">
+      <a:lvl2pPr marR="0" lvl="1" algn="l" rtl="0">
         <a:lnSpc>
           <a:spcPct val="100000"/>
         </a:lnSpc>
@@ -5917,7 +6236,7 @@
           <a:srgbClr val="000000"/>
         </a:buClr>
         <a:buFont typeface="Arial"/>
-        <a:defRPr b="0" i="0" sz="1400" u="none" cap="none" strike="noStrike">
+        <a:defRPr sz="1400" b="0" i="0" u="none" strike="noStrike" cap="none">
           <a:solidFill>
             <a:srgbClr val="000000"/>
           </a:solidFill>
@@ -5927,7 +6246,7 @@
           <a:sym typeface="Arial"/>
         </a:defRPr>
       </a:lvl2pPr>
-      <a:lvl3pPr lvl="2" marR="0" rtl="0" algn="l">
+      <a:lvl3pPr marR="0" lvl="2" algn="l" rtl="0">
         <a:lnSpc>
           <a:spcPct val="100000"/>
         </a:lnSpc>
@@ -5941,7 +6260,7 @@
           <a:srgbClr val="000000"/>
         </a:buClr>
         <a:buFont typeface="Arial"/>
-        <a:defRPr b="0" i="0" sz="1400" u="none" cap="none" strike="noStrike">
+        <a:defRPr sz="1400" b="0" i="0" u="none" strike="noStrike" cap="none">
           <a:solidFill>
             <a:srgbClr val="000000"/>
           </a:solidFill>
@@ -5951,7 +6270,7 @@
           <a:sym typeface="Arial"/>
         </a:defRPr>
       </a:lvl3pPr>
-      <a:lvl4pPr lvl="3" marR="0" rtl="0" algn="l">
+      <a:lvl4pPr marR="0" lvl="3" algn="l" rtl="0">
         <a:lnSpc>
           <a:spcPct val="100000"/>
         </a:lnSpc>
@@ -5965,7 +6284,7 @@
           <a:srgbClr val="000000"/>
         </a:buClr>
         <a:buFont typeface="Arial"/>
-        <a:defRPr b="0" i="0" sz="1400" u="none" cap="none" strike="noStrike">
+        <a:defRPr sz="1400" b="0" i="0" u="none" strike="noStrike" cap="none">
           <a:solidFill>
             <a:srgbClr val="000000"/>
           </a:solidFill>
@@ -5975,7 +6294,7 @@
           <a:sym typeface="Arial"/>
         </a:defRPr>
       </a:lvl4pPr>
-      <a:lvl5pPr lvl="4" marR="0" rtl="0" algn="l">
+      <a:lvl5pPr marR="0" lvl="4" algn="l" rtl="0">
         <a:lnSpc>
           <a:spcPct val="100000"/>
         </a:lnSpc>
@@ -5989,7 +6308,7 @@
           <a:srgbClr val="000000"/>
         </a:buClr>
         <a:buFont typeface="Arial"/>
-        <a:defRPr b="0" i="0" sz="1400" u="none" cap="none" strike="noStrike">
+        <a:defRPr sz="1400" b="0" i="0" u="none" strike="noStrike" cap="none">
           <a:solidFill>
             <a:srgbClr val="000000"/>
           </a:solidFill>
@@ -5999,7 +6318,7 @@
           <a:sym typeface="Arial"/>
         </a:defRPr>
       </a:lvl5pPr>
-      <a:lvl6pPr lvl="5" marR="0" rtl="0" algn="l">
+      <a:lvl6pPr marR="0" lvl="5" algn="l" rtl="0">
         <a:lnSpc>
           <a:spcPct val="100000"/>
         </a:lnSpc>
@@ -6013,7 +6332,7 @@
           <a:srgbClr val="000000"/>
         </a:buClr>
         <a:buFont typeface="Arial"/>
-        <a:defRPr b="0" i="0" sz="1400" u="none" cap="none" strike="noStrike">
+        <a:defRPr sz="1400" b="0" i="0" u="none" strike="noStrike" cap="none">
           <a:solidFill>
             <a:srgbClr val="000000"/>
           </a:solidFill>
@@ -6023,7 +6342,7 @@
           <a:sym typeface="Arial"/>
         </a:defRPr>
       </a:lvl6pPr>
-      <a:lvl7pPr lvl="6" marR="0" rtl="0" algn="l">
+      <a:lvl7pPr marR="0" lvl="6" algn="l" rtl="0">
         <a:lnSpc>
           <a:spcPct val="100000"/>
         </a:lnSpc>
@@ -6037,7 +6356,7 @@
           <a:srgbClr val="000000"/>
         </a:buClr>
         <a:buFont typeface="Arial"/>
-        <a:defRPr b="0" i="0" sz="1400" u="none" cap="none" strike="noStrike">
+        <a:defRPr sz="1400" b="0" i="0" u="none" strike="noStrike" cap="none">
           <a:solidFill>
             <a:srgbClr val="000000"/>
           </a:solidFill>
@@ -6047,7 +6366,7 @@
           <a:sym typeface="Arial"/>
         </a:defRPr>
       </a:lvl7pPr>
-      <a:lvl8pPr lvl="7" marR="0" rtl="0" algn="l">
+      <a:lvl8pPr marR="0" lvl="7" algn="l" rtl="0">
         <a:lnSpc>
           <a:spcPct val="100000"/>
         </a:lnSpc>
@@ -6061,7 +6380,7 @@
           <a:srgbClr val="000000"/>
         </a:buClr>
         <a:buFont typeface="Arial"/>
-        <a:defRPr b="0" i="0" sz="1400" u="none" cap="none" strike="noStrike">
+        <a:defRPr sz="1400" b="0" i="0" u="none" strike="noStrike" cap="none">
           <a:solidFill>
             <a:srgbClr val="000000"/>
           </a:solidFill>
@@ -6071,7 +6390,7 @@
           <a:sym typeface="Arial"/>
         </a:defRPr>
       </a:lvl8pPr>
-      <a:lvl9pPr lvl="8" marR="0" rtl="0" algn="l">
+      <a:lvl9pPr marR="0" lvl="8" algn="l" rtl="0">
         <a:lnSpc>
           <a:spcPct val="100000"/>
         </a:lnSpc>
@@ -6085,7 +6404,7 @@
           <a:srgbClr val="000000"/>
         </a:buClr>
         <a:buFont typeface="Arial"/>
-        <a:defRPr b="0" i="0" sz="1400" u="none" cap="none" strike="noStrike">
+        <a:defRPr sz="1400" b="0" i="0" u="none" strike="noStrike" cap="none">
           <a:solidFill>
             <a:srgbClr val="000000"/>
           </a:solidFill>
@@ -6097,7 +6416,7 @@
       </a:lvl9pPr>
     </p:titleStyle>
     <p:bodyStyle>
-      <a:defPPr lvl="0" marR="0" rtl="0" algn="l">
+      <a:defPPr marR="0" lvl="0" algn="l" rtl="0">
         <a:lnSpc>
           <a:spcPct val="100000"/>
         </a:lnSpc>
@@ -6108,7 +6427,7 @@
           <a:spcPts val="0"/>
         </a:spcAft>
       </a:defPPr>
-      <a:lvl1pPr lvl="0" marR="0" rtl="0" algn="l">
+      <a:lvl1pPr marR="0" lvl="0" algn="l" rtl="0">
         <a:lnSpc>
           <a:spcPct val="100000"/>
         </a:lnSpc>
@@ -6122,7 +6441,7 @@
           <a:srgbClr val="000000"/>
         </a:buClr>
         <a:buFont typeface="Arial"/>
-        <a:defRPr b="0" i="0" sz="1400" u="none" cap="none" strike="noStrike">
+        <a:defRPr sz="1400" b="0" i="0" u="none" strike="noStrike" cap="none">
           <a:solidFill>
             <a:srgbClr val="000000"/>
           </a:solidFill>
@@ -6132,7 +6451,7 @@
           <a:sym typeface="Arial"/>
         </a:defRPr>
       </a:lvl1pPr>
-      <a:lvl2pPr lvl="1" marR="0" rtl="0" algn="l">
+      <a:lvl2pPr marR="0" lvl="1" algn="l" rtl="0">
         <a:lnSpc>
           <a:spcPct val="100000"/>
         </a:lnSpc>
@@ -6146,7 +6465,7 @@
           <a:srgbClr val="000000"/>
         </a:buClr>
         <a:buFont typeface="Arial"/>
-        <a:defRPr b="0" i="0" sz="1400" u="none" cap="none" strike="noStrike">
+        <a:defRPr sz="1400" b="0" i="0" u="none" strike="noStrike" cap="none">
           <a:solidFill>
             <a:srgbClr val="000000"/>
           </a:solidFill>
@@ -6156,7 +6475,7 @@
           <a:sym typeface="Arial"/>
         </a:defRPr>
       </a:lvl2pPr>
-      <a:lvl3pPr lvl="2" marR="0" rtl="0" algn="l">
+      <a:lvl3pPr marR="0" lvl="2" algn="l" rtl="0">
         <a:lnSpc>
           <a:spcPct val="100000"/>
         </a:lnSpc>
@@ -6170,7 +6489,7 @@
           <a:srgbClr val="000000"/>
         </a:buClr>
         <a:buFont typeface="Arial"/>
-        <a:defRPr b="0" i="0" sz="1400" u="none" cap="none" strike="noStrike">
+        <a:defRPr sz="1400" b="0" i="0" u="none" strike="noStrike" cap="none">
           <a:solidFill>
             <a:srgbClr val="000000"/>
           </a:solidFill>
@@ -6180,7 +6499,7 @@
           <a:sym typeface="Arial"/>
         </a:defRPr>
       </a:lvl3pPr>
-      <a:lvl4pPr lvl="3" marR="0" rtl="0" algn="l">
+      <a:lvl4pPr marR="0" lvl="3" algn="l" rtl="0">
         <a:lnSpc>
           <a:spcPct val="100000"/>
         </a:lnSpc>
@@ -6194,7 +6513,7 @@
           <a:srgbClr val="000000"/>
         </a:buClr>
         <a:buFont typeface="Arial"/>
-        <a:defRPr b="0" i="0" sz="1400" u="none" cap="none" strike="noStrike">
+        <a:defRPr sz="1400" b="0" i="0" u="none" strike="noStrike" cap="none">
           <a:solidFill>
             <a:srgbClr val="000000"/>
           </a:solidFill>
@@ -6204,7 +6523,7 @@
           <a:sym typeface="Arial"/>
         </a:defRPr>
       </a:lvl4pPr>
-      <a:lvl5pPr lvl="4" marR="0" rtl="0" algn="l">
+      <a:lvl5pPr marR="0" lvl="4" algn="l" rtl="0">
         <a:lnSpc>
           <a:spcPct val="100000"/>
         </a:lnSpc>
@@ -6218,7 +6537,7 @@
           <a:srgbClr val="000000"/>
         </a:buClr>
         <a:buFont typeface="Arial"/>
-        <a:defRPr b="0" i="0" sz="1400" u="none" cap="none" strike="noStrike">
+        <a:defRPr sz="1400" b="0" i="0" u="none" strike="noStrike" cap="none">
           <a:solidFill>
             <a:srgbClr val="000000"/>
           </a:solidFill>
@@ -6228,7 +6547,7 @@
           <a:sym typeface="Arial"/>
         </a:defRPr>
       </a:lvl5pPr>
-      <a:lvl6pPr lvl="5" marR="0" rtl="0" algn="l">
+      <a:lvl6pPr marR="0" lvl="5" algn="l" rtl="0">
         <a:lnSpc>
           <a:spcPct val="100000"/>
         </a:lnSpc>
@@ -6242,7 +6561,7 @@
           <a:srgbClr val="000000"/>
         </a:buClr>
         <a:buFont typeface="Arial"/>
-        <a:defRPr b="0" i="0" sz="1400" u="none" cap="none" strike="noStrike">
+        <a:defRPr sz="1400" b="0" i="0" u="none" strike="noStrike" cap="none">
           <a:solidFill>
             <a:srgbClr val="000000"/>
           </a:solidFill>
@@ -6252,7 +6571,7 @@
           <a:sym typeface="Arial"/>
         </a:defRPr>
       </a:lvl6pPr>
-      <a:lvl7pPr lvl="6" marR="0" rtl="0" algn="l">
+      <a:lvl7pPr marR="0" lvl="6" algn="l" rtl="0">
         <a:lnSpc>
           <a:spcPct val="100000"/>
         </a:lnSpc>
@@ -6266,7 +6585,7 @@
           <a:srgbClr val="000000"/>
         </a:buClr>
         <a:buFont typeface="Arial"/>
-        <a:defRPr b="0" i="0" sz="1400" u="none" cap="none" strike="noStrike">
+        <a:defRPr sz="1400" b="0" i="0" u="none" strike="noStrike" cap="none">
           <a:solidFill>
             <a:srgbClr val="000000"/>
           </a:solidFill>
@@ -6276,7 +6595,7 @@
           <a:sym typeface="Arial"/>
         </a:defRPr>
       </a:lvl7pPr>
-      <a:lvl8pPr lvl="7" marR="0" rtl="0" algn="l">
+      <a:lvl8pPr marR="0" lvl="7" algn="l" rtl="0">
         <a:lnSpc>
           <a:spcPct val="100000"/>
         </a:lnSpc>
@@ -6290,7 +6609,7 @@
           <a:srgbClr val="000000"/>
         </a:buClr>
         <a:buFont typeface="Arial"/>
-        <a:defRPr b="0" i="0" sz="1400" u="none" cap="none" strike="noStrike">
+        <a:defRPr sz="1400" b="0" i="0" u="none" strike="noStrike" cap="none">
           <a:solidFill>
             <a:srgbClr val="000000"/>
           </a:solidFill>
@@ -6300,7 +6619,7 @@
           <a:sym typeface="Arial"/>
         </a:defRPr>
       </a:lvl8pPr>
-      <a:lvl9pPr lvl="8" marR="0" rtl="0" algn="l">
+      <a:lvl9pPr marR="0" lvl="8" algn="l" rtl="0">
         <a:lnSpc>
           <a:spcPct val="100000"/>
         </a:lnSpc>
@@ -6314,7 +6633,7 @@
           <a:srgbClr val="000000"/>
         </a:buClr>
         <a:buFont typeface="Arial"/>
-        <a:defRPr b="0" i="0" sz="1400" u="none" cap="none" strike="noStrike">
+        <a:defRPr sz="1400" b="0" i="0" u="none" strike="noStrike" cap="none">
           <a:solidFill>
             <a:srgbClr val="000000"/>
           </a:solidFill>
@@ -6326,7 +6645,7 @@
       </a:lvl9pPr>
     </p:bodyStyle>
     <p:otherStyle>
-      <a:defPPr lvl="0" marR="0" rtl="0" algn="l">
+      <a:defPPr marR="0" lvl="0" algn="l" rtl="0">
         <a:lnSpc>
           <a:spcPct val="100000"/>
         </a:lnSpc>
@@ -6337,7 +6656,7 @@
           <a:spcPts val="0"/>
         </a:spcAft>
       </a:defPPr>
-      <a:lvl1pPr lvl="0" marR="0" rtl="0" algn="l">
+      <a:lvl1pPr marR="0" lvl="0" algn="l" rtl="0">
         <a:lnSpc>
           <a:spcPct val="100000"/>
         </a:lnSpc>
@@ -6351,7 +6670,7 @@
           <a:srgbClr val="000000"/>
         </a:buClr>
         <a:buFont typeface="Arial"/>
-        <a:defRPr b="0" i="0" sz="1400" u="none" cap="none" strike="noStrike">
+        <a:defRPr sz="1400" b="0" i="0" u="none" strike="noStrike" cap="none">
           <a:solidFill>
             <a:srgbClr val="000000"/>
           </a:solidFill>
@@ -6361,7 +6680,7 @@
           <a:sym typeface="Arial"/>
         </a:defRPr>
       </a:lvl1pPr>
-      <a:lvl2pPr lvl="1" marR="0" rtl="0" algn="l">
+      <a:lvl2pPr marR="0" lvl="1" algn="l" rtl="0">
         <a:lnSpc>
           <a:spcPct val="100000"/>
         </a:lnSpc>
@@ -6375,7 +6694,7 @@
           <a:srgbClr val="000000"/>
         </a:buClr>
         <a:buFont typeface="Arial"/>
-        <a:defRPr b="0" i="0" sz="1400" u="none" cap="none" strike="noStrike">
+        <a:defRPr sz="1400" b="0" i="0" u="none" strike="noStrike" cap="none">
           <a:solidFill>
             <a:srgbClr val="000000"/>
           </a:solidFill>
@@ -6385,7 +6704,7 @@
           <a:sym typeface="Arial"/>
         </a:defRPr>
       </a:lvl2pPr>
-      <a:lvl3pPr lvl="2" marR="0" rtl="0" algn="l">
+      <a:lvl3pPr marR="0" lvl="2" algn="l" rtl="0">
         <a:lnSpc>
           <a:spcPct val="100000"/>
         </a:lnSpc>
@@ -6399,7 +6718,7 @@
           <a:srgbClr val="000000"/>
         </a:buClr>
         <a:buFont typeface="Arial"/>
-        <a:defRPr b="0" i="0" sz="1400" u="none" cap="none" strike="noStrike">
+        <a:defRPr sz="1400" b="0" i="0" u="none" strike="noStrike" cap="none">
           <a:solidFill>
             <a:srgbClr val="000000"/>
           </a:solidFill>
@@ -6409,7 +6728,7 @@
           <a:sym typeface="Arial"/>
         </a:defRPr>
       </a:lvl3pPr>
-      <a:lvl4pPr lvl="3" marR="0" rtl="0" algn="l">
+      <a:lvl4pPr marR="0" lvl="3" algn="l" rtl="0">
         <a:lnSpc>
           <a:spcPct val="100000"/>
         </a:lnSpc>
@@ -6423,7 +6742,7 @@
           <a:srgbClr val="000000"/>
         </a:buClr>
         <a:buFont typeface="Arial"/>
-        <a:defRPr b="0" i="0" sz="1400" u="none" cap="none" strike="noStrike">
+        <a:defRPr sz="1400" b="0" i="0" u="none" strike="noStrike" cap="none">
           <a:solidFill>
             <a:srgbClr val="000000"/>
           </a:solidFill>
@@ -6433,7 +6752,7 @@
           <a:sym typeface="Arial"/>
         </a:defRPr>
       </a:lvl4pPr>
-      <a:lvl5pPr lvl="4" marR="0" rtl="0" algn="l">
+      <a:lvl5pPr marR="0" lvl="4" algn="l" rtl="0">
         <a:lnSpc>
           <a:spcPct val="100000"/>
         </a:lnSpc>
@@ -6447,7 +6766,7 @@
           <a:srgbClr val="000000"/>
         </a:buClr>
         <a:buFont typeface="Arial"/>
-        <a:defRPr b="0" i="0" sz="1400" u="none" cap="none" strike="noStrike">
+        <a:defRPr sz="1400" b="0" i="0" u="none" strike="noStrike" cap="none">
           <a:solidFill>
             <a:srgbClr val="000000"/>
           </a:solidFill>
@@ -6457,7 +6776,7 @@
           <a:sym typeface="Arial"/>
         </a:defRPr>
       </a:lvl5pPr>
-      <a:lvl6pPr lvl="5" marR="0" rtl="0" algn="l">
+      <a:lvl6pPr marR="0" lvl="5" algn="l" rtl="0">
         <a:lnSpc>
           <a:spcPct val="100000"/>
         </a:lnSpc>
@@ -6471,7 +6790,7 @@
           <a:srgbClr val="000000"/>
         </a:buClr>
         <a:buFont typeface="Arial"/>
-        <a:defRPr b="0" i="0" sz="1400" u="none" cap="none" strike="noStrike">
+        <a:defRPr sz="1400" b="0" i="0" u="none" strike="noStrike" cap="none">
           <a:solidFill>
             <a:srgbClr val="000000"/>
           </a:solidFill>
@@ -6481,7 +6800,7 @@
           <a:sym typeface="Arial"/>
         </a:defRPr>
       </a:lvl6pPr>
-      <a:lvl7pPr lvl="6" marR="0" rtl="0" algn="l">
+      <a:lvl7pPr marR="0" lvl="6" algn="l" rtl="0">
         <a:lnSpc>
           <a:spcPct val="100000"/>
         </a:lnSpc>
@@ -6495,7 +6814,7 @@
           <a:srgbClr val="000000"/>
         </a:buClr>
         <a:buFont typeface="Arial"/>
-        <a:defRPr b="0" i="0" sz="1400" u="none" cap="none" strike="noStrike">
+        <a:defRPr sz="1400" b="0" i="0" u="none" strike="noStrike" cap="none">
           <a:solidFill>
             <a:srgbClr val="000000"/>
           </a:solidFill>
@@ -6505,7 +6824,7 @@
           <a:sym typeface="Arial"/>
         </a:defRPr>
       </a:lvl7pPr>
-      <a:lvl8pPr lvl="7" marR="0" rtl="0" algn="l">
+      <a:lvl8pPr marR="0" lvl="7" algn="l" rtl="0">
         <a:lnSpc>
           <a:spcPct val="100000"/>
         </a:lnSpc>
@@ -6519,7 +6838,7 @@
           <a:srgbClr val="000000"/>
         </a:buClr>
         <a:buFont typeface="Arial"/>
-        <a:defRPr b="0" i="0" sz="1400" u="none" cap="none" strike="noStrike">
+        <a:defRPr sz="1400" b="0" i="0" u="none" strike="noStrike" cap="none">
           <a:solidFill>
             <a:srgbClr val="000000"/>
           </a:solidFill>
@@ -6529,7 +6848,7 @@
           <a:sym typeface="Arial"/>
         </a:defRPr>
       </a:lvl8pPr>
-      <a:lvl9pPr lvl="8" marR="0" rtl="0" algn="l">
+      <a:lvl9pPr marR="0" lvl="8" algn="l" rtl="0">
         <a:lnSpc>
           <a:spcPct val="100000"/>
         </a:lnSpc>
@@ -6543,7 +6862,7 @@
           <a:srgbClr val="000000"/>
         </a:buClr>
         <a:buFont typeface="Arial"/>
-        <a:defRPr b="0" i="0" sz="1400" u="none" cap="none" strike="noStrike">
+        <a:defRPr sz="1400" b="0" i="0" u="none" strike="noStrike" cap="none">
           <a:solidFill>
             <a:srgbClr val="000000"/>
           </a:solidFill>
@@ -6559,11 +6878,11 @@
 </file>
 
 <file path=ppt/slides/slide1.xml><?xml version="1.0" encoding="utf-8"?>
-<p:sld xmlns:a="http://schemas.openxmlformats.org/drawingml/2006/main" xmlns:r="http://schemas.openxmlformats.org/officeDocument/2006/relationships" xmlns:mc="http://schemas.openxmlformats.org/markup-compatibility/2006" xmlns:mv="urn:schemas-microsoft-com:mac:vml" xmlns:p="http://schemas.openxmlformats.org/presentationml/2006/main" xmlns:c="http://schemas.openxmlformats.org/drawingml/2006/chart" xmlns:dgm="http://schemas.openxmlformats.org/drawingml/2006/diagram" xmlns:o="urn:schemas-microsoft-com:office:office" xmlns:v="urn:schemas-microsoft-com:vml" xmlns:pvml="urn:schemas-microsoft-com:office:powerpoint" xmlns:com="http://schemas.openxmlformats.org/drawingml/2006/compatibility" xmlns:p14="http://schemas.microsoft.com/office/powerpoint/2010/main" xmlns:p15="http://schemas.microsoft.com/office/powerpoint/2012/main">
+<p:sld xmlns:a="http://schemas.openxmlformats.org/drawingml/2006/main" xmlns:r="http://schemas.openxmlformats.org/officeDocument/2006/relationships" xmlns:p="http://schemas.openxmlformats.org/presentationml/2006/main">
   <p:cSld>
     <p:spTree>
       <p:nvGrpSpPr>
-        <p:cNvPr id="65" name="Shape 65"/>
+        <p:cNvPr id="1" name="Shape 65"/>
         <p:cNvGrpSpPr/>
         <p:nvPr/>
       </p:nvGrpSpPr>
@@ -6578,7 +6897,9 @@
       <p:sp>
         <p:nvSpPr>
           <p:cNvPr id="66" name="Google Shape;66;p13"/>
-          <p:cNvSpPr txBox="1"/>
+          <p:cNvSpPr txBox="1">
+            <a:spLocks noGrp="1"/>
+          </p:cNvSpPr>
           <p:nvPr>
             <p:ph type="ctrTitle"/>
           </p:nvPr>
@@ -6593,12 +6914,12 @@
           </a:prstGeom>
         </p:spPr>
         <p:txBody>
-          <a:bodyPr anchorCtr="0" anchor="b" bIns="91425" lIns="91425" spcFirstLastPara="1" rIns="91425" wrap="square" tIns="91425">
+          <a:bodyPr spcFirstLastPara="1" wrap="square" lIns="91425" tIns="91425" rIns="91425" bIns="91425" anchor="b" anchorCtr="0">
             <a:noAutofit/>
           </a:bodyPr>
           <a:lstStyle/>
           <a:p>
-            <a:pPr indent="0" lvl="0" marL="0" rtl="0" algn="ctr">
+            <a:pPr marL="0" lvl="0" indent="0" algn="ctr" rtl="0">
               <a:spcBef>
                 <a:spcPts val="0"/>
               </a:spcBef>
@@ -6609,24 +6930,12 @@
             </a:pPr>
             <a:r>
               <a:rPr lang="en" sz="4800"/>
-              <a:t>Creating decision-making tools </a:t>
-            </a:r>
-            <a:r>
-              <a:rPr lang="en" sz="4800"/>
-              <a:t>for </a:t>
-            </a:r>
-            <a:r>
-              <a:rPr lang="en" sz="4800"/>
-              <a:t>selecting</a:t>
-            </a:r>
-            <a:r>
-              <a:rPr lang="en" sz="4800"/>
-              <a:t> Opportunity Zones</a:t>
+              <a:t>Creating decision-making tools for selecting Opportunity Zones</a:t>
             </a:r>
             <a:endParaRPr sz="4800"/>
           </a:p>
           <a:p>
-            <a:pPr indent="0" lvl="0" marL="0" rtl="0" algn="ctr">
+            <a:pPr marL="0" lvl="0" indent="0" algn="ctr" rtl="0">
               <a:spcBef>
                 <a:spcPts val="0"/>
               </a:spcBef>
@@ -6646,9 +6955,11 @@
       <p:sp>
         <p:nvSpPr>
           <p:cNvPr id="67" name="Google Shape;67;p13"/>
-          <p:cNvSpPr txBox="1"/>
+          <p:cNvSpPr txBox="1">
+            <a:spLocks noGrp="1"/>
+          </p:cNvSpPr>
           <p:nvPr>
-            <p:ph idx="1" type="subTitle"/>
+            <p:ph type="subTitle" idx="1"/>
           </p:nvPr>
         </p:nvSpPr>
         <p:spPr>
@@ -6661,12 +6972,12 @@
           </a:prstGeom>
         </p:spPr>
         <p:txBody>
-          <a:bodyPr anchorCtr="0" anchor="t" bIns="91425" lIns="91425" spcFirstLastPara="1" rIns="91425" wrap="square" tIns="91425">
+          <a:bodyPr spcFirstLastPara="1" wrap="square" lIns="91425" tIns="91425" rIns="91425" bIns="91425" anchor="t" anchorCtr="0">
             <a:noAutofit/>
           </a:bodyPr>
           <a:lstStyle/>
           <a:p>
-            <a:pPr indent="0" lvl="0" marL="0" rtl="0" algn="ctr">
+            <a:pPr marL="0" lvl="0" indent="0" algn="ctr" rtl="0">
               <a:spcBef>
                 <a:spcPts val="0"/>
               </a:spcBef>
@@ -6682,7 +6993,7 @@
             <a:endParaRPr/>
           </a:p>
           <a:p>
-            <a:pPr indent="0" lvl="0" marL="0" rtl="0" algn="ctr">
+            <a:pPr marL="0" lvl="0" indent="0" algn="ctr" rtl="0">
               <a:spcBef>
                 <a:spcPts val="0"/>
               </a:spcBef>
@@ -6691,13 +7002,10 @@
               </a:spcAft>
               <a:buNone/>
             </a:pPr>
-            <a:r>
-              <a:t/>
-            </a:r>
             <a:endParaRPr sz="1200"/>
           </a:p>
           <a:p>
-            <a:pPr indent="0" lvl="0" marL="0" rtl="0" algn="ctr">
+            <a:pPr marL="0" lvl="0" indent="0" algn="ctr" rtl="0">
               <a:spcBef>
                 <a:spcPts val="0"/>
               </a:spcBef>
@@ -6706,13 +7014,10 @@
               </a:spcAft>
               <a:buNone/>
             </a:pPr>
-            <a:r>
-              <a:t/>
-            </a:r>
             <a:endParaRPr sz="1200"/>
           </a:p>
           <a:p>
-            <a:pPr indent="0" lvl="0" marL="0" rtl="0" algn="ctr">
+            <a:pPr marL="0" lvl="0" indent="0" algn="ctr" rtl="0">
               <a:spcBef>
                 <a:spcPts val="0"/>
               </a:spcBef>
@@ -6721,13 +7026,10 @@
               </a:spcAft>
               <a:buNone/>
             </a:pPr>
-            <a:r>
-              <a:t/>
-            </a:r>
             <a:endParaRPr sz="1200"/>
           </a:p>
           <a:p>
-            <a:pPr indent="0" lvl="0" marL="0" rtl="0" algn="ctr">
+            <a:pPr marL="0" lvl="0" indent="0" algn="ctr" rtl="0">
               <a:spcBef>
                 <a:spcPts val="0"/>
               </a:spcBef>
@@ -6753,11 +7055,11 @@
 </file>
 
 <file path=ppt/slides/slide2.xml><?xml version="1.0" encoding="utf-8"?>
-<p:sld xmlns:a="http://schemas.openxmlformats.org/drawingml/2006/main" xmlns:r="http://schemas.openxmlformats.org/officeDocument/2006/relationships" xmlns:mc="http://schemas.openxmlformats.org/markup-compatibility/2006" xmlns:mv="urn:schemas-microsoft-com:mac:vml" xmlns:p="http://schemas.openxmlformats.org/presentationml/2006/main" xmlns:c="http://schemas.openxmlformats.org/drawingml/2006/chart" xmlns:dgm="http://schemas.openxmlformats.org/drawingml/2006/diagram" xmlns:o="urn:schemas-microsoft-com:office:office" xmlns:v="urn:schemas-microsoft-com:vml" xmlns:pvml="urn:schemas-microsoft-com:office:powerpoint" xmlns:com="http://schemas.openxmlformats.org/drawingml/2006/compatibility" xmlns:p14="http://schemas.microsoft.com/office/powerpoint/2010/main" xmlns:p15="http://schemas.microsoft.com/office/powerpoint/2012/main">
+<p:sld xmlns:a="http://schemas.openxmlformats.org/drawingml/2006/main" xmlns:r="http://schemas.openxmlformats.org/officeDocument/2006/relationships" xmlns:p="http://schemas.openxmlformats.org/presentationml/2006/main">
   <p:cSld>
     <p:spTree>
       <p:nvGrpSpPr>
-        <p:cNvPr id="71" name="Shape 71"/>
+        <p:cNvPr id="1" name="Shape 71"/>
         <p:cNvGrpSpPr/>
         <p:nvPr/>
       </p:nvGrpSpPr>
@@ -6772,7 +7074,9 @@
       <p:sp>
         <p:nvSpPr>
           <p:cNvPr id="72" name="Google Shape;72;p14"/>
-          <p:cNvSpPr txBox="1"/>
+          <p:cNvSpPr txBox="1">
+            <a:spLocks noGrp="1"/>
+          </p:cNvSpPr>
           <p:nvPr>
             <p:ph type="title"/>
           </p:nvPr>
@@ -6787,12 +7091,12 @@
           </a:prstGeom>
         </p:spPr>
         <p:txBody>
-          <a:bodyPr anchorCtr="0" anchor="t" bIns="91425" lIns="91425" spcFirstLastPara="1" rIns="91425" wrap="square" tIns="91425">
+          <a:bodyPr spcFirstLastPara="1" wrap="square" lIns="91425" tIns="91425" rIns="91425" bIns="91425" anchor="t" anchorCtr="0">
             <a:noAutofit/>
           </a:bodyPr>
           <a:lstStyle/>
           <a:p>
-            <a:pPr indent="0" lvl="0" marL="0" rtl="0" algn="l">
+            <a:pPr marL="0" lvl="0" indent="0" algn="l" rtl="0">
               <a:spcBef>
                 <a:spcPts val="0"/>
               </a:spcBef>
@@ -6805,16 +7109,18 @@
               <a:rPr lang="en"/>
               <a:t>What is an Opportunity Zone?</a:t>
             </a:r>
-            <a:endParaRPr/>
+            <a:endParaRPr dirty="0"/>
           </a:p>
         </p:txBody>
       </p:sp>
       <p:sp>
         <p:nvSpPr>
           <p:cNvPr id="73" name="Google Shape;73;p14"/>
-          <p:cNvSpPr txBox="1"/>
+          <p:cNvSpPr txBox="1">
+            <a:spLocks noGrp="1"/>
+          </p:cNvSpPr>
           <p:nvPr>
-            <p:ph idx="1" type="body"/>
+            <p:ph type="body" idx="1"/>
           </p:nvPr>
         </p:nvSpPr>
         <p:spPr>
@@ -6827,12 +7133,12 @@
           </a:prstGeom>
         </p:spPr>
         <p:txBody>
-          <a:bodyPr anchorCtr="0" anchor="t" bIns="91425" lIns="91425" spcFirstLastPara="1" rIns="91425" wrap="square" tIns="91425">
+          <a:bodyPr spcFirstLastPara="1" wrap="square" lIns="91425" tIns="91425" rIns="91425" bIns="91425" anchor="t" anchorCtr="0">
             <a:noAutofit/>
           </a:bodyPr>
           <a:lstStyle/>
           <a:p>
-            <a:pPr indent="-419100" lvl="0" marL="457200" rtl="0" algn="l">
+            <a:pPr marL="457200" lvl="0" indent="-419100" algn="l" rtl="0">
               <a:spcBef>
                 <a:spcPts val="0"/>
               </a:spcBef>
@@ -6843,7 +7149,7 @@
               <a:buChar char="●"/>
             </a:pPr>
             <a:r>
-              <a:rPr lang="en" sz="3000">
+              <a:rPr lang="en" sz="3000" dirty="0">
                 <a:solidFill>
                   <a:srgbClr val="222222"/>
                 </a:solidFill>
@@ -6858,7 +7164,7 @@
               <a:t>The </a:t>
             </a:r>
             <a:r>
-              <a:rPr b="1" lang="en" sz="3000">
+              <a:rPr lang="en" sz="3000" b="1" dirty="0">
                 <a:solidFill>
                   <a:srgbClr val="222222"/>
                 </a:solidFill>
@@ -6873,7 +7179,7 @@
               <a:t>Opportunity Zones</a:t>
             </a:r>
             <a:r>
-              <a:rPr lang="en" sz="3000">
+              <a:rPr lang="en" sz="3000" dirty="0">
                 <a:solidFill>
                   <a:srgbClr val="222222"/>
                 </a:solidFill>
@@ -6885,9 +7191,39 @@
                 <a:cs typeface="Roboto"/>
                 <a:sym typeface="Roboto"/>
               </a:rPr>
-              <a:t> incentive is a new community investment program established by Congress in the Tax Cuts and Jobs Act of 2017 to encourage long-term investments in low-income urban and rural communities nationwide.</a:t>
+              <a:t> incentive is a new community investment program established by Congress in the Tax Cuts and Jobs Act of 2017 to encourage long-term investments in low-income urban and rural communities nationwide </a:t>
             </a:r>
-            <a:endParaRPr sz="3000"/>
+            <a:r>
+              <a:rPr lang="en-US" sz="3000" dirty="0">
+                <a:solidFill>
+                  <a:srgbClr val="222222"/>
+                </a:solidFill>
+                <a:highlight>
+                  <a:srgbClr val="FFFFFF"/>
+                </a:highlight>
+                <a:latin typeface="Roboto"/>
+                <a:ea typeface="Roboto"/>
+                <a:cs typeface="Roboto"/>
+                <a:sym typeface="Roboto"/>
+              </a:rPr>
+              <a:t>by providing tax benefits to investors</a:t>
+            </a:r>
+            <a:r>
+              <a:rPr lang="en" sz="3000" dirty="0">
+                <a:solidFill>
+                  <a:srgbClr val="222222"/>
+                </a:solidFill>
+                <a:highlight>
+                  <a:srgbClr val="FFFFFF"/>
+                </a:highlight>
+                <a:latin typeface="Roboto"/>
+                <a:ea typeface="Roboto"/>
+                <a:cs typeface="Roboto"/>
+                <a:sym typeface="Roboto"/>
+              </a:rPr>
+              <a:t>.</a:t>
+            </a:r>
+            <a:endParaRPr sz="3000" dirty="0"/>
           </a:p>
         </p:txBody>
       </p:sp>
@@ -6900,11 +7236,11 @@
 </file>
 
 <file path=ppt/slides/slide3.xml><?xml version="1.0" encoding="utf-8"?>
-<p:sld xmlns:a="http://schemas.openxmlformats.org/drawingml/2006/main" xmlns:r="http://schemas.openxmlformats.org/officeDocument/2006/relationships" xmlns:mc="http://schemas.openxmlformats.org/markup-compatibility/2006" xmlns:mv="urn:schemas-microsoft-com:mac:vml" xmlns:p="http://schemas.openxmlformats.org/presentationml/2006/main" xmlns:c="http://schemas.openxmlformats.org/drawingml/2006/chart" xmlns:dgm="http://schemas.openxmlformats.org/drawingml/2006/diagram" xmlns:o="urn:schemas-microsoft-com:office:office" xmlns:v="urn:schemas-microsoft-com:vml" xmlns:pvml="urn:schemas-microsoft-com:office:powerpoint" xmlns:com="http://schemas.openxmlformats.org/drawingml/2006/compatibility" xmlns:p14="http://schemas.microsoft.com/office/powerpoint/2010/main" xmlns:p15="http://schemas.microsoft.com/office/powerpoint/2012/main">
+<p:sld xmlns:a="http://schemas.openxmlformats.org/drawingml/2006/main" xmlns:r="http://schemas.openxmlformats.org/officeDocument/2006/relationships" xmlns:p="http://schemas.openxmlformats.org/presentationml/2006/main">
   <p:cSld>
     <p:spTree>
       <p:nvGrpSpPr>
-        <p:cNvPr id="77" name="Shape 77"/>
+        <p:cNvPr id="1" name="Shape 77"/>
         <p:cNvGrpSpPr/>
         <p:nvPr/>
       </p:nvGrpSpPr>
@@ -6919,7 +7255,9 @@
       <p:sp>
         <p:nvSpPr>
           <p:cNvPr id="78" name="Google Shape;78;p15"/>
-          <p:cNvSpPr txBox="1"/>
+          <p:cNvSpPr txBox="1">
+            <a:spLocks noGrp="1"/>
+          </p:cNvSpPr>
           <p:nvPr>
             <p:ph type="title"/>
           </p:nvPr>
@@ -6934,12 +7272,12 @@
           </a:prstGeom>
         </p:spPr>
         <p:txBody>
-          <a:bodyPr anchorCtr="0" anchor="t" bIns="91425" lIns="91425" spcFirstLastPara="1" rIns="91425" wrap="square" tIns="91425">
+          <a:bodyPr spcFirstLastPara="1" wrap="square" lIns="91425" tIns="91425" rIns="91425" bIns="91425" anchor="t" anchorCtr="0">
             <a:noAutofit/>
           </a:bodyPr>
           <a:lstStyle/>
           <a:p>
-            <a:pPr indent="0" lvl="0" marL="0" rtl="0" algn="l">
+            <a:pPr marL="0" lvl="0" indent="0" algn="l" rtl="0">
               <a:spcBef>
                 <a:spcPts val="0"/>
               </a:spcBef>
@@ -6959,9 +7297,11 @@
       <p:sp>
         <p:nvSpPr>
           <p:cNvPr id="79" name="Google Shape;79;p15"/>
-          <p:cNvSpPr txBox="1"/>
+          <p:cNvSpPr txBox="1">
+            <a:spLocks noGrp="1"/>
+          </p:cNvSpPr>
           <p:nvPr>
-            <p:ph idx="1" type="body"/>
+            <p:ph type="body" idx="1"/>
           </p:nvPr>
         </p:nvSpPr>
         <p:spPr>
@@ -6974,12 +7314,12 @@
           </a:prstGeom>
         </p:spPr>
         <p:txBody>
-          <a:bodyPr anchorCtr="0" anchor="t" bIns="91425" lIns="91425" spcFirstLastPara="1" rIns="91425" wrap="square" tIns="91425">
+          <a:bodyPr spcFirstLastPara="1" wrap="square" lIns="91425" tIns="91425" rIns="91425" bIns="91425" anchor="t" anchorCtr="0">
             <a:noAutofit/>
           </a:bodyPr>
           <a:lstStyle/>
           <a:p>
-            <a:pPr indent="-342900" lvl="0" marL="457200" rtl="0" algn="l">
+            <a:pPr marL="457200" lvl="0" indent="-342900" algn="l" rtl="0">
               <a:spcBef>
                 <a:spcPts val="1000"/>
               </a:spcBef>
@@ -6994,7 +7334,7 @@
               <a:t>Provide </a:t>
             </a:r>
             <a:r>
-              <a:rPr b="1" lang="en"/>
+              <a:rPr lang="en" b="1"/>
               <a:t>investors</a:t>
             </a:r>
             <a:r>
@@ -7004,7 +7344,7 @@
             <a:endParaRPr/>
           </a:p>
           <a:p>
-            <a:pPr indent="-342900" lvl="0" marL="457200" rtl="0" algn="l">
+            <a:pPr marL="457200" lvl="0" indent="-342900" algn="l" rtl="0">
               <a:spcBef>
                 <a:spcPts val="1600"/>
               </a:spcBef>
@@ -7015,29 +7355,17 @@
               <a:buChar char="●"/>
             </a:pPr>
             <a:r>
-              <a:rPr b="1" lang="en"/>
-              <a:t>I</a:t>
-            </a:r>
-            <a:r>
-              <a:rPr b="1" lang="en"/>
-              <a:t>nvestors </a:t>
+              <a:rPr lang="en" b="1"/>
+              <a:t>Investors </a:t>
             </a:r>
             <a:r>
               <a:rPr lang="en"/>
-              <a:t>could be a</a:t>
-            </a:r>
-            <a:r>
-              <a:rPr lang="en"/>
-              <a:t>nyone that wants to buy real estate or invest in local business in these zone</a:t>
-            </a:r>
-            <a:r>
-              <a:rPr lang="en"/>
-              <a:t>s</a:t>
+              <a:t>could be anyone that wants to buy real estate or invest in local business in these zones</a:t>
             </a:r>
             <a:endParaRPr/>
           </a:p>
           <a:p>
-            <a:pPr indent="-342900" lvl="0" marL="457200" rtl="0" algn="l">
+            <a:pPr marL="457200" lvl="0" indent="-342900" algn="l" rtl="0">
               <a:spcBef>
                 <a:spcPts val="1600"/>
               </a:spcBef>
@@ -7049,14 +7377,10 @@
             </a:pPr>
             <a:r>
               <a:rPr lang="en"/>
-              <a:t>It will also p</a:t>
+              <a:t>It will also provide </a:t>
             </a:r>
             <a:r>
-              <a:rPr lang="en"/>
-              <a:t>rovide </a:t>
-            </a:r>
-            <a:r>
-              <a:rPr b="1" lang="en"/>
+              <a:rPr lang="en" b="1"/>
               <a:t>local governments</a:t>
             </a:r>
             <a:r>
@@ -7064,7 +7388,7 @@
               <a:t> and </a:t>
             </a:r>
             <a:r>
-              <a:rPr b="1" lang="en"/>
+              <a:rPr lang="en" b="1"/>
               <a:t>Chambers of Commerce</a:t>
             </a:r>
             <a:r>
@@ -7074,7 +7398,7 @@
             <a:endParaRPr/>
           </a:p>
           <a:p>
-            <a:pPr indent="-342900" lvl="0" marL="457200" rtl="0" algn="l">
+            <a:pPr marL="457200" lvl="0" indent="-342900" algn="l" rtl="0">
               <a:spcBef>
                 <a:spcPts val="1000"/>
               </a:spcBef>
@@ -7089,13 +7413,13 @@
               <a:t>We chose Cook County in Chicago as a </a:t>
             </a:r>
             <a:r>
-              <a:rPr b="1" lang="en"/>
+              <a:rPr lang="en" b="1"/>
               <a:t>proof of concept</a:t>
             </a:r>
             <a:endParaRPr b="1"/>
           </a:p>
           <a:p>
-            <a:pPr indent="-342900" lvl="0" marL="457200" rtl="0" algn="l">
+            <a:pPr marL="457200" lvl="0" indent="-342900" algn="l" rtl="0">
               <a:spcBef>
                 <a:spcPts val="1000"/>
               </a:spcBef>
@@ -7106,7 +7430,7 @@
               <a:buChar char="●"/>
             </a:pPr>
             <a:r>
-              <a:rPr b="1" lang="en"/>
+              <a:rPr lang="en" b="1"/>
               <a:t>135</a:t>
             </a:r>
             <a:r>
@@ -7126,11 +7450,64 @@
 </file>
 
 <file path=ppt/slides/slide4.xml><?xml version="1.0" encoding="utf-8"?>
-<p:sld xmlns:a="http://schemas.openxmlformats.org/drawingml/2006/main" xmlns:r="http://schemas.openxmlformats.org/officeDocument/2006/relationships" xmlns:mc="http://schemas.openxmlformats.org/markup-compatibility/2006" xmlns:mv="urn:schemas-microsoft-com:mac:vml" xmlns:p="http://schemas.openxmlformats.org/presentationml/2006/main" xmlns:c="http://schemas.openxmlformats.org/drawingml/2006/chart" xmlns:dgm="http://schemas.openxmlformats.org/drawingml/2006/diagram" xmlns:o="urn:schemas-microsoft-com:office:office" xmlns:v="urn:schemas-microsoft-com:vml" xmlns:pvml="urn:schemas-microsoft-com:office:powerpoint" xmlns:com="http://schemas.openxmlformats.org/drawingml/2006/compatibility" xmlns:p14="http://schemas.microsoft.com/office/powerpoint/2010/main" xmlns:p15="http://schemas.microsoft.com/office/powerpoint/2012/main">
+<p:sld xmlns:a="http://schemas.openxmlformats.org/drawingml/2006/main" xmlns:r="http://schemas.openxmlformats.org/officeDocument/2006/relationships" xmlns:p="http://schemas.openxmlformats.org/presentationml/2006/main">
   <p:cSld>
     <p:spTree>
       <p:nvGrpSpPr>
-        <p:cNvPr id="83" name="Shape 83"/>
+        <p:cNvPr id="1" name="Shape 83"/>
+        <p:cNvGrpSpPr/>
+        <p:nvPr/>
+      </p:nvGrpSpPr>
+      <p:grpSpPr>
+        <a:xfrm>
+          <a:off x="0" y="0"/>
+          <a:ext cx="0" cy="0"/>
+          <a:chOff x="0" y="0"/>
+          <a:chExt cx="0" cy="0"/>
+        </a:xfrm>
+      </p:grpSpPr>
+      <p:pic>
+        <p:nvPicPr>
+          <p:cNvPr id="84" name="Google Shape;84;p16"/>
+          <p:cNvPicPr preferRelativeResize="0"/>
+          <p:nvPr/>
+        </p:nvPicPr>
+        <p:blipFill>
+          <a:blip r:embed="rId3">
+            <a:alphaModFix/>
+          </a:blip>
+          <a:stretch>
+            <a:fillRect/>
+          </a:stretch>
+        </p:blipFill>
+        <p:spPr>
+          <a:xfrm>
+            <a:off x="1420588" y="152400"/>
+            <a:ext cx="6302836" cy="4838699"/>
+          </a:xfrm>
+          <a:prstGeom prst="rect">
+            <a:avLst/>
+          </a:prstGeom>
+          <a:noFill/>
+          <a:ln>
+            <a:noFill/>
+          </a:ln>
+        </p:spPr>
+      </p:pic>
+    </p:spTree>
+  </p:cSld>
+  <p:clrMapOvr>
+    <a:masterClrMapping/>
+  </p:clrMapOvr>
+</p:sld>
+</file>
+
+<file path=ppt/slides/slide5.xml><?xml version="1.0" encoding="utf-8"?>
+<p:sld xmlns:a="http://schemas.openxmlformats.org/drawingml/2006/main" xmlns:r="http://schemas.openxmlformats.org/officeDocument/2006/relationships" xmlns:p="http://schemas.openxmlformats.org/presentationml/2006/main">
+  <p:cSld>
+    <p:spTree>
+      <p:nvGrpSpPr>
+        <p:cNvPr id="1" name="Shape 88"/>
         <p:cNvGrpSpPr/>
         <p:nvPr/>
       </p:nvGrpSpPr>
@@ -7144,8 +7521,10 @@
       </p:grpSpPr>
       <p:sp>
         <p:nvSpPr>
-          <p:cNvPr id="84" name="Google Shape;84;p16"/>
-          <p:cNvSpPr txBox="1"/>
+          <p:cNvPr id="89" name="Google Shape;89;p17"/>
+          <p:cNvSpPr txBox="1">
+            <a:spLocks noGrp="1"/>
+          </p:cNvSpPr>
           <p:nvPr>
             <p:ph type="title"/>
           </p:nvPr>
@@ -7160,12 +7539,12 @@
           </a:prstGeom>
         </p:spPr>
         <p:txBody>
-          <a:bodyPr anchorCtr="0" anchor="t" bIns="91425" lIns="91425" spcFirstLastPara="1" rIns="91425" wrap="square" tIns="91425">
+          <a:bodyPr spcFirstLastPara="1" wrap="square" lIns="91425" tIns="91425" rIns="91425" bIns="91425" anchor="t" anchorCtr="0">
             <a:noAutofit/>
           </a:bodyPr>
           <a:lstStyle/>
           <a:p>
-            <a:pPr indent="0" lvl="0" marL="0" rtl="0" algn="l">
+            <a:pPr marL="0" lvl="0" indent="0" algn="l" rtl="0">
               <a:lnSpc>
                 <a:spcPct val="115000"/>
               </a:lnSpc>
@@ -7187,10 +7566,12 @@
       </p:sp>
       <p:sp>
         <p:nvSpPr>
-          <p:cNvPr id="85" name="Google Shape;85;p16"/>
-          <p:cNvSpPr txBox="1"/>
+          <p:cNvPr id="90" name="Google Shape;90;p17"/>
+          <p:cNvSpPr txBox="1">
+            <a:spLocks noGrp="1"/>
+          </p:cNvSpPr>
           <p:nvPr>
-            <p:ph idx="1" type="body"/>
+            <p:ph type="body" idx="1"/>
           </p:nvPr>
         </p:nvSpPr>
         <p:spPr>
@@ -7203,12 +7584,12 @@
           </a:prstGeom>
         </p:spPr>
         <p:txBody>
-          <a:bodyPr anchorCtr="0" anchor="t" bIns="91425" lIns="91425" spcFirstLastPara="1" rIns="91425" wrap="square" tIns="91425">
+          <a:bodyPr spcFirstLastPara="1" wrap="square" lIns="91425" tIns="91425" rIns="91425" bIns="91425" anchor="t" anchorCtr="0">
             <a:noAutofit/>
           </a:bodyPr>
           <a:lstStyle/>
           <a:p>
-            <a:pPr indent="-342900" lvl="0" marL="457200" rtl="0" algn="l">
+            <a:pPr marL="457200" lvl="0" indent="-342900" algn="l" rtl="0">
               <a:spcBef>
                 <a:spcPts val="0"/>
               </a:spcBef>
@@ -7225,7 +7606,7 @@
             <a:endParaRPr/>
           </a:p>
           <a:p>
-            <a:pPr indent="-342900" lvl="0" marL="457200" rtl="0" algn="l">
+            <a:pPr marL="457200" lvl="0" indent="-342900" algn="l" rtl="0">
               <a:spcBef>
                 <a:spcPts val="0"/>
               </a:spcBef>
@@ -7242,7 +7623,7 @@
             <a:endParaRPr/>
           </a:p>
           <a:p>
-            <a:pPr indent="-342900" lvl="0" marL="457200" rtl="0" algn="l">
+            <a:pPr marL="457200" lvl="0" indent="-342900" algn="l" rtl="0">
               <a:spcBef>
                 <a:spcPts val="0"/>
               </a:spcBef>
@@ -7259,7 +7640,7 @@
             <a:endParaRPr/>
           </a:p>
           <a:p>
-            <a:pPr indent="-342900" lvl="0" marL="457200" rtl="0" algn="l">
+            <a:pPr marL="457200" lvl="0" indent="-342900" algn="l" rtl="0">
               <a:spcBef>
                 <a:spcPts val="0"/>
               </a:spcBef>
@@ -7276,7 +7657,7 @@
             <a:endParaRPr/>
           </a:p>
           <a:p>
-            <a:pPr indent="-342900" lvl="0" marL="457200" rtl="0" algn="l">
+            <a:pPr marL="457200" lvl="0" indent="-342900" algn="l" rtl="0">
               <a:spcBef>
                 <a:spcPts val="0"/>
               </a:spcBef>
@@ -7293,7 +7674,7 @@
             <a:endParaRPr/>
           </a:p>
           <a:p>
-            <a:pPr indent="-342900" lvl="0" marL="457200" rtl="0" algn="l">
+            <a:pPr marL="457200" lvl="0" indent="-342900" algn="l" rtl="0">
               <a:spcBef>
                 <a:spcPts val="0"/>
               </a:spcBef>
@@ -7319,12 +7700,12 @@
 </p:sld>
 </file>
 
-<file path=ppt/slides/slide5.xml><?xml version="1.0" encoding="utf-8"?>
-<p:sld xmlns:a="http://schemas.openxmlformats.org/drawingml/2006/main" xmlns:r="http://schemas.openxmlformats.org/officeDocument/2006/relationships" xmlns:mc="http://schemas.openxmlformats.org/markup-compatibility/2006" xmlns:mv="urn:schemas-microsoft-com:mac:vml" xmlns:p="http://schemas.openxmlformats.org/presentationml/2006/main" xmlns:c="http://schemas.openxmlformats.org/drawingml/2006/chart" xmlns:dgm="http://schemas.openxmlformats.org/drawingml/2006/diagram" xmlns:o="urn:schemas-microsoft-com:office:office" xmlns:v="urn:schemas-microsoft-com:vml" xmlns:pvml="urn:schemas-microsoft-com:office:powerpoint" xmlns:com="http://schemas.openxmlformats.org/drawingml/2006/compatibility" xmlns:p14="http://schemas.microsoft.com/office/powerpoint/2010/main" xmlns:p15="http://schemas.microsoft.com/office/powerpoint/2012/main">
+<file path=ppt/slides/slide6.xml><?xml version="1.0" encoding="utf-8"?>
+<p:sld xmlns:a="http://schemas.openxmlformats.org/drawingml/2006/main" xmlns:r="http://schemas.openxmlformats.org/officeDocument/2006/relationships" xmlns:p="http://schemas.openxmlformats.org/presentationml/2006/main">
   <p:cSld>
     <p:spTree>
       <p:nvGrpSpPr>
-        <p:cNvPr id="89" name="Shape 89"/>
+        <p:cNvPr id="1" name="Shape 94"/>
         <p:cNvGrpSpPr/>
         <p:nvPr/>
       </p:nvGrpSpPr>
@@ -7338,8 +7719,10 @@
       </p:grpSpPr>
       <p:sp>
         <p:nvSpPr>
-          <p:cNvPr id="90" name="Google Shape;90;p17"/>
-          <p:cNvSpPr txBox="1"/>
+          <p:cNvPr id="95" name="Google Shape;95;p18"/>
+          <p:cNvSpPr txBox="1">
+            <a:spLocks noGrp="1"/>
+          </p:cNvSpPr>
           <p:nvPr>
             <p:ph type="title"/>
           </p:nvPr>
@@ -7354,12 +7737,12 @@
           </a:prstGeom>
         </p:spPr>
         <p:txBody>
-          <a:bodyPr anchorCtr="0" anchor="t" bIns="91425" lIns="91425" spcFirstLastPara="1" rIns="91425" wrap="square" tIns="91425">
+          <a:bodyPr spcFirstLastPara="1" wrap="square" lIns="91425" tIns="91425" rIns="91425" bIns="91425" anchor="t" anchorCtr="0">
             <a:noAutofit/>
           </a:bodyPr>
           <a:lstStyle/>
           <a:p>
-            <a:pPr indent="0" lvl="0" marL="0" rtl="0" algn="l">
+            <a:pPr marL="0" lvl="0" indent="0" algn="l" rtl="0">
               <a:spcBef>
                 <a:spcPts val="0"/>
               </a:spcBef>
@@ -7378,10 +7761,12 @@
       </p:sp>
       <p:sp>
         <p:nvSpPr>
-          <p:cNvPr id="91" name="Google Shape;91;p17"/>
-          <p:cNvSpPr txBox="1"/>
+          <p:cNvPr id="96" name="Google Shape;96;p18"/>
+          <p:cNvSpPr txBox="1">
+            <a:spLocks noGrp="1"/>
+          </p:cNvSpPr>
           <p:nvPr>
-            <p:ph idx="1" type="body"/>
+            <p:ph type="body" idx="1"/>
           </p:nvPr>
         </p:nvSpPr>
         <p:spPr>
@@ -7394,12 +7779,12 @@
           </a:prstGeom>
         </p:spPr>
         <p:txBody>
-          <a:bodyPr anchorCtr="0" anchor="t" bIns="91425" lIns="91425" spcFirstLastPara="1" rIns="91425" wrap="square" tIns="91425">
+          <a:bodyPr spcFirstLastPara="1" wrap="square" lIns="91425" tIns="91425" rIns="91425" bIns="91425" anchor="t" anchorCtr="0">
             <a:noAutofit/>
           </a:bodyPr>
           <a:lstStyle/>
           <a:p>
-            <a:pPr indent="0" lvl="0" marL="0" rtl="0" algn="l">
+            <a:pPr marL="0" lvl="0" indent="0" algn="l" rtl="0">
               <a:spcBef>
                 <a:spcPts val="0"/>
               </a:spcBef>
@@ -7409,17 +7794,13 @@
               <a:buNone/>
             </a:pPr>
             <a:r>
-              <a:rPr b="1" lang="en"/>
-              <a:t>This is what we used to build our app</a:t>
-            </a:r>
-            <a:r>
-              <a:rPr b="1" lang="en"/>
-              <a:t>:</a:t>
+              <a:rPr lang="en" b="1"/>
+              <a:t>This is what we used to build our app:</a:t>
             </a:r>
             <a:endParaRPr b="1"/>
           </a:p>
           <a:p>
-            <a:pPr indent="0" lvl="0" marL="0" marR="0" rtl="0" algn="l">
+            <a:pPr marL="0" marR="0" lvl="0" indent="0" algn="l" rtl="0">
               <a:lnSpc>
                 <a:spcPct val="115000"/>
               </a:lnSpc>
@@ -7431,19 +7812,18 @@
               </a:spcAft>
               <a:buNone/>
             </a:pPr>
-            <a:r>
-              <a:t/>
-            </a:r>
             <a:endParaRPr/>
           </a:p>
         </p:txBody>
       </p:sp>
       <p:sp>
         <p:nvSpPr>
-          <p:cNvPr id="92" name="Google Shape;92;p17"/>
-          <p:cNvSpPr txBox="1"/>
+          <p:cNvPr id="97" name="Google Shape;97;p18"/>
+          <p:cNvSpPr txBox="1">
+            <a:spLocks noGrp="1"/>
+          </p:cNvSpPr>
           <p:nvPr>
-            <p:ph idx="1" type="body"/>
+            <p:ph type="body" idx="1"/>
           </p:nvPr>
         </p:nvSpPr>
         <p:spPr>
@@ -7456,12 +7836,12 @@
           </a:prstGeom>
         </p:spPr>
         <p:txBody>
-          <a:bodyPr anchorCtr="0" anchor="t" bIns="91425" lIns="91425" spcFirstLastPara="1" rIns="91425" wrap="square" tIns="91425">
+          <a:bodyPr spcFirstLastPara="1" wrap="square" lIns="91425" tIns="91425" rIns="91425" bIns="91425" anchor="t" anchorCtr="0">
             <a:noAutofit/>
           </a:bodyPr>
           <a:lstStyle/>
           <a:p>
-            <a:pPr indent="-342900" lvl="0" marL="457200" rtl="0" algn="l">
+            <a:pPr marL="457200" lvl="0" indent="-342900" algn="l" rtl="0">
               <a:spcBef>
                 <a:spcPts val="0"/>
               </a:spcBef>
@@ -7478,7 +7858,7 @@
             <a:endParaRPr/>
           </a:p>
           <a:p>
-            <a:pPr indent="-317500" lvl="1" marL="914400" rtl="0" algn="l">
+            <a:pPr marL="914400" lvl="1" indent="-317500" algn="l" rtl="0">
               <a:spcBef>
                 <a:spcPts val="0"/>
               </a:spcBef>
@@ -7495,7 +7875,7 @@
             <a:endParaRPr/>
           </a:p>
           <a:p>
-            <a:pPr indent="-317500" lvl="1" marL="914400" rtl="0" algn="l">
+            <a:pPr marL="914400" lvl="1" indent="-317500" algn="l" rtl="0">
               <a:spcBef>
                 <a:spcPts val="0"/>
               </a:spcBef>
@@ -7512,7 +7892,7 @@
             <a:endParaRPr/>
           </a:p>
           <a:p>
-            <a:pPr indent="-317500" lvl="1" marL="914400" rtl="0" algn="l">
+            <a:pPr marL="914400" lvl="1" indent="-317500" algn="l" rtl="0">
               <a:spcBef>
                 <a:spcPts val="0"/>
               </a:spcBef>
@@ -7529,7 +7909,7 @@
             <a:endParaRPr/>
           </a:p>
           <a:p>
-            <a:pPr indent="-342900" lvl="0" marL="457200" rtl="0" algn="l">
+            <a:pPr marL="457200" lvl="0" indent="-342900" algn="l" rtl="0">
               <a:spcBef>
                 <a:spcPts val="0"/>
               </a:spcBef>
@@ -7546,7 +7926,7 @@
             <a:endParaRPr/>
           </a:p>
           <a:p>
-            <a:pPr indent="-317500" lvl="1" marL="914400" rtl="0" algn="l">
+            <a:pPr marL="914400" lvl="1" indent="-317500" algn="l" rtl="0">
               <a:spcBef>
                 <a:spcPts val="0"/>
               </a:spcBef>
@@ -7563,7 +7943,7 @@
             <a:endParaRPr/>
           </a:p>
           <a:p>
-            <a:pPr indent="-317500" lvl="1" marL="914400" rtl="0" algn="l">
+            <a:pPr marL="914400" lvl="1" indent="-317500" algn="l" rtl="0">
               <a:spcBef>
                 <a:spcPts val="0"/>
               </a:spcBef>
@@ -7580,7 +7960,7 @@
             <a:endParaRPr/>
           </a:p>
           <a:p>
-            <a:pPr indent="-317500" lvl="1" marL="914400" rtl="0" algn="l">
+            <a:pPr marL="914400" lvl="1" indent="-317500" algn="l" rtl="0">
               <a:spcBef>
                 <a:spcPts val="0"/>
               </a:spcBef>
@@ -7597,7 +7977,7 @@
             <a:endParaRPr/>
           </a:p>
           <a:p>
-            <a:pPr indent="-317500" lvl="1" marL="914400" rtl="0" algn="l">
+            <a:pPr marL="914400" lvl="1" indent="-317500" algn="l" rtl="0">
               <a:spcBef>
                 <a:spcPts val="0"/>
               </a:spcBef>
@@ -7614,7 +7994,7 @@
             <a:endParaRPr/>
           </a:p>
           <a:p>
-            <a:pPr indent="-317500" lvl="1" marL="914400" rtl="0" algn="l">
+            <a:pPr marL="914400" lvl="1" indent="-317500" algn="l" rtl="0">
               <a:spcBef>
                 <a:spcPts val="0"/>
               </a:spcBef>
@@ -7631,45 +8011,27 @@
             <a:endParaRPr/>
           </a:p>
           <a:p>
-            <a:pPr indent="-317500" lvl="1" marL="914400" rtl="0" algn="l">
-              <a:spcBef>
-                <a:spcPts val="0"/>
-              </a:spcBef>
-              <a:spcAft>
-                <a:spcPts val="0"/>
-              </a:spcAft>
-              <a:buSzPts val="1400"/>
-              <a:buChar char="○"/>
+            <a:pPr marL="0" lvl="0" indent="0" algn="l" rtl="0">
+              <a:spcBef>
+                <a:spcPts val="1600"/>
+              </a:spcBef>
+              <a:spcAft>
+                <a:spcPts val="1600"/>
+              </a:spcAft>
+              <a:buNone/>
             </a:pPr>
-            <a:r>
-              <a:rPr lang="en"/>
-              <a:t>Popper.js</a:t>
-            </a:r>
-            <a:endParaRPr/>
-          </a:p>
-          <a:p>
-            <a:pPr indent="0" lvl="0" marL="0" rtl="0" algn="l">
-              <a:spcBef>
-                <a:spcPts val="1600"/>
-              </a:spcBef>
-              <a:spcAft>
-                <a:spcPts val="1600"/>
-              </a:spcAft>
-              <a:buNone/>
-            </a:pPr>
-            <a:r>
-              <a:t/>
-            </a:r>
             <a:endParaRPr/>
           </a:p>
         </p:txBody>
       </p:sp>
       <p:sp>
         <p:nvSpPr>
-          <p:cNvPr id="93" name="Google Shape;93;p17"/>
-          <p:cNvSpPr txBox="1"/>
+          <p:cNvPr id="98" name="Google Shape;98;p18"/>
+          <p:cNvSpPr txBox="1">
+            <a:spLocks noGrp="1"/>
+          </p:cNvSpPr>
           <p:nvPr>
-            <p:ph idx="1" type="body"/>
+            <p:ph type="body" idx="1"/>
           </p:nvPr>
         </p:nvSpPr>
         <p:spPr>
@@ -7682,12 +8044,12 @@
           </a:prstGeom>
         </p:spPr>
         <p:txBody>
-          <a:bodyPr anchorCtr="0" anchor="t" bIns="91425" lIns="91425" spcFirstLastPara="1" rIns="91425" wrap="square" tIns="91425">
+          <a:bodyPr spcFirstLastPara="1" wrap="square" lIns="91425" tIns="91425" rIns="91425" bIns="91425" anchor="t" anchorCtr="0">
             <a:noAutofit/>
           </a:bodyPr>
           <a:lstStyle/>
           <a:p>
-            <a:pPr indent="-342900" lvl="0" marL="457200" rtl="0" algn="l">
+            <a:pPr marL="457200" lvl="0" indent="-342900" algn="l" rtl="0">
               <a:spcBef>
                 <a:spcPts val="0"/>
               </a:spcBef>
@@ -7704,7 +8066,7 @@
             <a:endParaRPr/>
           </a:p>
           <a:p>
-            <a:pPr indent="-317500" lvl="1" marL="914400" rtl="0" algn="l">
+            <a:pPr marL="914400" lvl="1" indent="-317500" algn="l" rtl="0">
               <a:spcBef>
                 <a:spcPts val="0"/>
               </a:spcBef>
@@ -7721,7 +8083,7 @@
             <a:endParaRPr/>
           </a:p>
           <a:p>
-            <a:pPr indent="-317500" lvl="1" marL="914400" rtl="0" algn="l">
+            <a:pPr marL="914400" lvl="1" indent="-317500" algn="l" rtl="0">
               <a:spcBef>
                 <a:spcPts val="0"/>
               </a:spcBef>
@@ -7738,7 +8100,7 @@
             <a:endParaRPr/>
           </a:p>
           <a:p>
-            <a:pPr indent="-317500" lvl="1" marL="914400" rtl="0" algn="l">
+            <a:pPr marL="914400" lvl="1" indent="-317500" algn="l" rtl="0">
               <a:spcBef>
                 <a:spcPts val="0"/>
               </a:spcBef>
@@ -7755,7 +8117,7 @@
             <a:endParaRPr/>
           </a:p>
           <a:p>
-            <a:pPr indent="-317500" lvl="1" marL="914400" rtl="0" algn="l">
+            <a:pPr marL="914400" lvl="1" indent="-317500" algn="l" rtl="0">
               <a:spcBef>
                 <a:spcPts val="0"/>
               </a:spcBef>
@@ -7772,7 +8134,7 @@
             <a:endParaRPr/>
           </a:p>
           <a:p>
-            <a:pPr indent="-317500" lvl="1" marL="914400" rtl="0" algn="l">
+            <a:pPr marL="914400" lvl="1" indent="-317500" algn="l" rtl="0">
               <a:spcBef>
                 <a:spcPts val="0"/>
               </a:spcBef>
@@ -7789,7 +8151,7 @@
             <a:endParaRPr/>
           </a:p>
           <a:p>
-            <a:pPr indent="-342900" lvl="0" marL="457200" rtl="0" algn="l">
+            <a:pPr marL="457200" lvl="0" indent="-342900" algn="l" rtl="0">
               <a:spcBef>
                 <a:spcPts val="0"/>
               </a:spcBef>
@@ -7806,7 +8168,7 @@
             <a:endParaRPr/>
           </a:p>
           <a:p>
-            <a:pPr indent="-317500" lvl="1" marL="914400" rtl="0" algn="l">
+            <a:pPr marL="914400" lvl="1" indent="-317500" algn="l" rtl="0">
               <a:spcBef>
                 <a:spcPts val="0"/>
               </a:spcBef>
@@ -7823,7 +8185,7 @@
             <a:endParaRPr/>
           </a:p>
           <a:p>
-            <a:pPr indent="-317500" lvl="1" marL="914400" rtl="0" algn="l">
+            <a:pPr marL="914400" lvl="1" indent="-317500" algn="l" rtl="0">
               <a:spcBef>
                 <a:spcPts val="0"/>
               </a:spcBef>
@@ -7840,7 +8202,7 @@
             <a:endParaRPr/>
           </a:p>
           <a:p>
-            <a:pPr indent="0" lvl="0" marL="457200" marR="0" rtl="0" algn="l">
+            <a:pPr marL="457200" marR="0" lvl="0" indent="0" algn="l" rtl="0">
               <a:lnSpc>
                 <a:spcPct val="115000"/>
               </a:lnSpc>
@@ -7852,9 +8214,6 @@
               </a:spcAft>
               <a:buNone/>
             </a:pPr>
-            <a:r>
-              <a:t/>
-            </a:r>
             <a:endParaRPr/>
           </a:p>
         </p:txBody>
@@ -7868,7 +8227,7 @@
 </file>
 
 <file path=ppt/theme/theme1.xml><?xml version="1.0" encoding="utf-8"?>
-<a:theme xmlns:a="http://schemas.openxmlformats.org/drawingml/2006/main" xmlns:r="http://schemas.openxmlformats.org/officeDocument/2006/relationships" name="Tropic">
+<a:theme xmlns:a="http://schemas.openxmlformats.org/drawingml/2006/main" name="Tropic">
   <a:themeElements>
     <a:clrScheme name="Tropic">
       <a:dk1>
@@ -8143,11 +8502,13 @@
       </a:bgFillStyleLst>
     </a:fmtScheme>
   </a:themeElements>
+  <a:objectDefaults/>
+  <a:extraClrSchemeLst/>
 </a:theme>
 </file>
 
 <file path=ppt/theme/theme2.xml><?xml version="1.0" encoding="utf-8"?>
-<a:theme xmlns:a="http://schemas.openxmlformats.org/drawingml/2006/main" xmlns:r="http://schemas.openxmlformats.org/officeDocument/2006/relationships">
+<a:theme xmlns:a="http://schemas.openxmlformats.org/drawingml/2006/main">
   <a:themeElements>
     <a:clrScheme name="Default">
       <a:dk1>
@@ -8422,5 +8783,7 @@
       </a:bgFillStyleLst>
     </a:fmtScheme>
   </a:themeElements>
+  <a:objectDefaults/>
+  <a:extraClrSchemeLst/>
 </a:theme>
 </file>
</xml_diff>